<commit_message>
[build.js] Complete presentation with performance section
</commit_message>
<xml_diff>
--- a/build.js/build.js.pptx
+++ b/build.js/build.js.pptx
@@ -5,7 +5,7 @@
     <p:sldMasterId id="2147483648" r:id="rId1"/>
   </p:sldMasterIdLst>
   <p:notesMasterIdLst>
-    <p:notesMasterId r:id="rId22"/>
+    <p:notesMasterId r:id="rId26"/>
   </p:notesMasterIdLst>
   <p:sldIdLst>
     <p:sldId id="256" r:id="rId2"/>
@@ -18,16 +18,20 @@
     <p:sldId id="270" r:id="rId9"/>
     <p:sldId id="271" r:id="rId10"/>
     <p:sldId id="273" r:id="rId11"/>
-    <p:sldId id="274" r:id="rId12"/>
-    <p:sldId id="275" r:id="rId13"/>
-    <p:sldId id="260" r:id="rId14"/>
-    <p:sldId id="261" r:id="rId15"/>
-    <p:sldId id="262" r:id="rId16"/>
-    <p:sldId id="263" r:id="rId17"/>
-    <p:sldId id="264" r:id="rId18"/>
-    <p:sldId id="265" r:id="rId19"/>
-    <p:sldId id="266" r:id="rId20"/>
-    <p:sldId id="267" r:id="rId21"/>
+    <p:sldId id="276" r:id="rId12"/>
+    <p:sldId id="277" r:id="rId13"/>
+    <p:sldId id="278" r:id="rId14"/>
+    <p:sldId id="279" r:id="rId15"/>
+    <p:sldId id="274" r:id="rId16"/>
+    <p:sldId id="275" r:id="rId17"/>
+    <p:sldId id="260" r:id="rId18"/>
+    <p:sldId id="261" r:id="rId19"/>
+    <p:sldId id="262" r:id="rId20"/>
+    <p:sldId id="263" r:id="rId21"/>
+    <p:sldId id="264" r:id="rId22"/>
+    <p:sldId id="265" r:id="rId23"/>
+    <p:sldId id="266" r:id="rId24"/>
+    <p:sldId id="267" r:id="rId25"/>
   </p:sldIdLst>
   <p:sldSz cx="12192000" cy="6858000"/>
   <p:notesSz cx="6858000" cy="9144000"/>
@@ -216,7 +220,7 @@
           <a:p>
             <a:fld id="{AC748ECC-83EC-469C-8E6A-91CD1E881330}" type="datetimeFigureOut">
               <a:rPr lang="en-US" smtClean="0"/>
-              <a:t>6/10/2014</a:t>
+              <a:t>6/11/2014</a:t>
             </a:fld>
             <a:endParaRPr lang="en-US"/>
           </a:p>
@@ -711,7 +715,58 @@
           <a:bodyPr/>
           <a:lstStyle/>
           <a:p>
-            <a:pPr lvl="1"/>
+            <a:pPr marL="628650" lvl="1" indent="-171450">
+              <a:buFontTx/>
+              <a:buChar char="-"/>
+            </a:pPr>
+            <a:r>
+              <a:rPr lang="en-US" dirty="0" smtClean="0"/>
+              <a:t>If</a:t>
+            </a:r>
+            <a:r>
+              <a:rPr lang="en-US" baseline="0" dirty="0" smtClean="0"/>
+              <a:t> we change 1 coffee file of 10K, all this files will be reworked</a:t>
+            </a:r>
+          </a:p>
+          <a:p>
+            <a:pPr marL="628650" lvl="1" indent="-171450">
+              <a:buFontTx/>
+              <a:buChar char="-"/>
+            </a:pPr>
+            <a:r>
+              <a:rPr lang="en-US" baseline="0" dirty="0" smtClean="0"/>
+              <a:t>There’s plugins for cover all this glitches, but it becomes a monkey patch instead of normal usage</a:t>
+            </a:r>
+          </a:p>
+          <a:p>
+            <a:pPr marL="628650" lvl="1" indent="-171450">
+              <a:buFontTx/>
+              <a:buChar char="-"/>
+            </a:pPr>
+            <a:r>
+              <a:rPr lang="en-US" dirty="0" smtClean="0"/>
+              <a:t>Each task uses its own</a:t>
+            </a:r>
+            <a:r>
+              <a:rPr lang="en-US" baseline="0" dirty="0" smtClean="0"/>
+              <a:t> </a:t>
+            </a:r>
+            <a:r>
+              <a:rPr lang="en-US" baseline="0" dirty="0" err="1" smtClean="0"/>
+              <a:t>stdin</a:t>
+            </a:r>
+            <a:r>
+              <a:rPr lang="en-US" baseline="0" dirty="0" smtClean="0"/>
+              <a:t>/</a:t>
+            </a:r>
+            <a:r>
+              <a:rPr lang="en-US" baseline="0" dirty="0" err="1" smtClean="0"/>
+              <a:t>stdout</a:t>
+            </a:r>
+            <a:r>
+              <a:rPr lang="en-US" baseline="0" dirty="0" smtClean="0"/>
+              <a:t>, so for X sequential task grunt abuse with endless file reading/writing </a:t>
+            </a:r>
             <a:endParaRPr lang="en-US" dirty="0" smtClean="0"/>
           </a:p>
           <a:p>
@@ -753,7 +808,7 @@
     </p:spTree>
     <p:extLst>
       <p:ext uri="{BB962C8B-B14F-4D97-AF65-F5344CB8AC3E}">
-        <p14:creationId xmlns:p14="http://schemas.microsoft.com/office/powerpoint/2010/main" val="3895385980"/>
+        <p14:creationId xmlns:p14="http://schemas.microsoft.com/office/powerpoint/2010/main" val="3818322269"/>
       </p:ext>
     </p:extLst>
   </p:cSld>
@@ -807,12 +862,33 @@
           <a:bodyPr/>
           <a:lstStyle/>
           <a:p>
-            <a:pPr lvl="1"/>
+            <a:pPr marL="171450" indent="-171450">
+              <a:buFontTx/>
+              <a:buChar char="-"/>
+            </a:pPr>
+            <a:r>
+              <a:rPr lang="en-US" dirty="0" smtClean="0"/>
+              <a:t>Multithreading</a:t>
+            </a:r>
+            <a:r>
+              <a:rPr lang="en-US" baseline="0" dirty="0" smtClean="0"/>
+              <a:t> out of the box</a:t>
+            </a:r>
             <a:endParaRPr lang="en-US" dirty="0" smtClean="0"/>
           </a:p>
           <a:p>
-            <a:pPr lvl="1"/>
-            <a:endParaRPr lang="en-US" dirty="0" smtClean="0"/>
+            <a:pPr marL="171450" indent="-171450">
+              <a:buFontTx/>
+              <a:buChar char="-"/>
+            </a:pPr>
+            <a:r>
+              <a:rPr lang="en-US" dirty="0" smtClean="0"/>
+              <a:t>Can</a:t>
+            </a:r>
+            <a:r>
+              <a:rPr lang="en-US" baseline="0" dirty="0" smtClean="0"/>
+              <a:t> out of the box support different type of tasks in different process</a:t>
+            </a:r>
           </a:p>
           <a:p>
             <a:pPr marL="171450" indent="-171450">
@@ -849,7 +925,7 @@
     </p:spTree>
     <p:extLst>
       <p:ext uri="{BB962C8B-B14F-4D97-AF65-F5344CB8AC3E}">
-        <p14:creationId xmlns:p14="http://schemas.microsoft.com/office/powerpoint/2010/main" val="2567141826"/>
+        <p14:creationId xmlns:p14="http://schemas.microsoft.com/office/powerpoint/2010/main" val="2106483374"/>
       </p:ext>
     </p:extLst>
   </p:cSld>
@@ -908,14 +984,14 @@
               <a:buChar char="-"/>
             </a:pPr>
             <a:r>
-              <a:rPr lang="en-US" dirty="0" smtClean="0"/>
-              <a:t>Brendan saved us form </a:t>
-            </a:r>
-            <a:r>
-              <a:rPr lang="en-US" dirty="0" err="1" smtClean="0"/>
-              <a:t>vbscript</a:t>
-            </a:r>
-            <a:endParaRPr lang="en-US" dirty="0"/>
+              <a:rPr lang="en-US" noProof="0" dirty="0" smtClean="0"/>
+              <a:t>Strange</a:t>
+            </a:r>
+            <a:r>
+              <a:rPr lang="en-US" baseline="0" noProof="0" dirty="0" smtClean="0"/>
+              <a:t> but the only grunt does not support multithreading</a:t>
+            </a:r>
+            <a:endParaRPr lang="en-US" noProof="0" dirty="0"/>
           </a:p>
         </p:txBody>
       </p:sp>
@@ -945,7 +1021,7 @@
     </p:spTree>
     <p:extLst>
       <p:ext uri="{BB962C8B-B14F-4D97-AF65-F5344CB8AC3E}">
-        <p14:creationId xmlns:p14="http://schemas.microsoft.com/office/powerpoint/2010/main" val="1526428441"/>
+        <p14:creationId xmlns:p14="http://schemas.microsoft.com/office/powerpoint/2010/main" val="48717363"/>
       </p:ext>
     </p:extLst>
   </p:cSld>
@@ -999,9 +1075,9 @@
           <a:bodyPr/>
           <a:lstStyle/>
           <a:p>
-            <a:pPr marL="171450" indent="-171450">
+            <a:pPr marL="0" indent="0">
               <a:buFontTx/>
-              <a:buChar char="-"/>
+              <a:buNone/>
             </a:pPr>
             <a:endParaRPr lang="en-US" dirty="0"/>
           </a:p>
@@ -1033,7 +1109,7 @@
     </p:spTree>
     <p:extLst>
       <p:ext uri="{BB962C8B-B14F-4D97-AF65-F5344CB8AC3E}">
-        <p14:creationId xmlns:p14="http://schemas.microsoft.com/office/powerpoint/2010/main" val="2831815247"/>
+        <p14:creationId xmlns:p14="http://schemas.microsoft.com/office/powerpoint/2010/main" val="1702901514"/>
       </p:ext>
     </p:extLst>
   </p:cSld>
@@ -1087,6 +1163,14 @@
           <a:bodyPr/>
           <a:lstStyle/>
           <a:p>
+            <a:pPr lvl="1"/>
+            <a:endParaRPr lang="en-US" dirty="0" smtClean="0"/>
+          </a:p>
+          <a:p>
+            <a:pPr lvl="1"/>
+            <a:endParaRPr lang="en-US" dirty="0" smtClean="0"/>
+          </a:p>
+          <a:p>
             <a:pPr marL="171450" indent="-171450">
               <a:buFontTx/>
               <a:buChar char="-"/>
@@ -1121,7 +1205,7 @@
     </p:spTree>
     <p:extLst>
       <p:ext uri="{BB962C8B-B14F-4D97-AF65-F5344CB8AC3E}">
-        <p14:creationId xmlns:p14="http://schemas.microsoft.com/office/powerpoint/2010/main" val="2167955836"/>
+        <p14:creationId xmlns:p14="http://schemas.microsoft.com/office/powerpoint/2010/main" val="3895385980"/>
       </p:ext>
     </p:extLst>
   </p:cSld>
@@ -1175,6 +1259,14 @@
           <a:bodyPr/>
           <a:lstStyle/>
           <a:p>
+            <a:pPr lvl="1"/>
+            <a:endParaRPr lang="en-US" dirty="0" smtClean="0"/>
+          </a:p>
+          <a:p>
+            <a:pPr lvl="1"/>
+            <a:endParaRPr lang="en-US" dirty="0" smtClean="0"/>
+          </a:p>
+          <a:p>
             <a:pPr marL="171450" indent="-171450">
               <a:buFontTx/>
               <a:buChar char="-"/>
@@ -1200,7 +1292,7 @@
           <a:p>
             <a:fld id="{1248D640-4A2F-4A8C-8E2D-3C6025A34183}" type="slidenum">
               <a:rPr lang="en-US" smtClean="0"/>
-              <a:t>18</a:t>
+              <a:t>16</a:t>
             </a:fld>
             <a:endParaRPr lang="en-US"/>
           </a:p>
@@ -1209,7 +1301,7 @@
     </p:spTree>
     <p:extLst>
       <p:ext uri="{BB962C8B-B14F-4D97-AF65-F5344CB8AC3E}">
-        <p14:creationId xmlns:p14="http://schemas.microsoft.com/office/powerpoint/2010/main" val="57330581"/>
+        <p14:creationId xmlns:p14="http://schemas.microsoft.com/office/powerpoint/2010/main" val="2567141826"/>
       </p:ext>
     </p:extLst>
   </p:cSld>
@@ -1267,6 +1359,190 @@
               <a:buFontTx/>
               <a:buChar char="-"/>
             </a:pPr>
+            <a:r>
+              <a:rPr lang="en-US" dirty="0" smtClean="0"/>
+              <a:t>Brendan saved us form </a:t>
+            </a:r>
+            <a:r>
+              <a:rPr lang="en-US" dirty="0" err="1" smtClean="0"/>
+              <a:t>vbscript</a:t>
+            </a:r>
+            <a:endParaRPr lang="en-US" dirty="0"/>
+          </a:p>
+        </p:txBody>
+      </p:sp>
+      <p:sp>
+        <p:nvSpPr>
+          <p:cNvPr id="4" name="Slide Number Placeholder 3"/>
+          <p:cNvSpPr>
+            <a:spLocks noGrp="1"/>
+          </p:cNvSpPr>
+          <p:nvPr>
+            <p:ph type="sldNum" sz="quarter" idx="10"/>
+          </p:nvPr>
+        </p:nvSpPr>
+        <p:spPr/>
+        <p:txBody>
+          <a:bodyPr/>
+          <a:lstStyle/>
+          <a:p>
+            <a:fld id="{1248D640-4A2F-4A8C-8E2D-3C6025A34183}" type="slidenum">
+              <a:rPr lang="en-US" smtClean="0"/>
+              <a:t>17</a:t>
+            </a:fld>
+            <a:endParaRPr lang="en-US"/>
+          </a:p>
+        </p:txBody>
+      </p:sp>
+    </p:spTree>
+    <p:extLst>
+      <p:ext uri="{BB962C8B-B14F-4D97-AF65-F5344CB8AC3E}">
+        <p14:creationId xmlns:p14="http://schemas.microsoft.com/office/powerpoint/2010/main" val="1526428441"/>
+      </p:ext>
+    </p:extLst>
+  </p:cSld>
+  <p:clrMapOvr>
+    <a:masterClrMapping/>
+  </p:clrMapOvr>
+</p:notes>
+</file>
+
+<file path=ppt/notesSlides/notesSlide17.xml><?xml version="1.0" encoding="utf-8"?>
+<p:notes xmlns:a="http://schemas.openxmlformats.org/drawingml/2006/main" xmlns:r="http://schemas.openxmlformats.org/officeDocument/2006/relationships" xmlns:p="http://schemas.openxmlformats.org/presentationml/2006/main">
+  <p:cSld>
+    <p:spTree>
+      <p:nvGrpSpPr>
+        <p:cNvPr id="1" name=""/>
+        <p:cNvGrpSpPr/>
+        <p:nvPr/>
+      </p:nvGrpSpPr>
+      <p:grpSpPr>
+        <a:xfrm>
+          <a:off x="0" y="0"/>
+          <a:ext cx="0" cy="0"/>
+          <a:chOff x="0" y="0"/>
+          <a:chExt cx="0" cy="0"/>
+        </a:xfrm>
+      </p:grpSpPr>
+      <p:sp>
+        <p:nvSpPr>
+          <p:cNvPr id="2" name="Slide Image Placeholder 1"/>
+          <p:cNvSpPr>
+            <a:spLocks noGrp="1" noRot="1" noChangeAspect="1"/>
+          </p:cNvSpPr>
+          <p:nvPr>
+            <p:ph type="sldImg"/>
+          </p:nvPr>
+        </p:nvSpPr>
+        <p:spPr/>
+      </p:sp>
+      <p:sp>
+        <p:nvSpPr>
+          <p:cNvPr id="3" name="Notes Placeholder 2"/>
+          <p:cNvSpPr>
+            <a:spLocks noGrp="1"/>
+          </p:cNvSpPr>
+          <p:nvPr>
+            <p:ph type="body" idx="1"/>
+          </p:nvPr>
+        </p:nvSpPr>
+        <p:spPr/>
+        <p:txBody>
+          <a:bodyPr/>
+          <a:lstStyle/>
+          <a:p>
+            <a:pPr marL="171450" indent="-171450">
+              <a:buFontTx/>
+              <a:buChar char="-"/>
+            </a:pPr>
+            <a:endParaRPr lang="en-US" dirty="0"/>
+          </a:p>
+        </p:txBody>
+      </p:sp>
+      <p:sp>
+        <p:nvSpPr>
+          <p:cNvPr id="4" name="Slide Number Placeholder 3"/>
+          <p:cNvSpPr>
+            <a:spLocks noGrp="1"/>
+          </p:cNvSpPr>
+          <p:nvPr>
+            <p:ph type="sldNum" sz="quarter" idx="10"/>
+          </p:nvPr>
+        </p:nvSpPr>
+        <p:spPr/>
+        <p:txBody>
+          <a:bodyPr/>
+          <a:lstStyle/>
+          <a:p>
+            <a:fld id="{1248D640-4A2F-4A8C-8E2D-3C6025A34183}" type="slidenum">
+              <a:rPr lang="en-US" smtClean="0"/>
+              <a:t>18</a:t>
+            </a:fld>
+            <a:endParaRPr lang="en-US"/>
+          </a:p>
+        </p:txBody>
+      </p:sp>
+    </p:spTree>
+    <p:extLst>
+      <p:ext uri="{BB962C8B-B14F-4D97-AF65-F5344CB8AC3E}">
+        <p14:creationId xmlns:p14="http://schemas.microsoft.com/office/powerpoint/2010/main" val="2831815247"/>
+      </p:ext>
+    </p:extLst>
+  </p:cSld>
+  <p:clrMapOvr>
+    <a:masterClrMapping/>
+  </p:clrMapOvr>
+</p:notes>
+</file>
+
+<file path=ppt/notesSlides/notesSlide18.xml><?xml version="1.0" encoding="utf-8"?>
+<p:notes xmlns:a="http://schemas.openxmlformats.org/drawingml/2006/main" xmlns:r="http://schemas.openxmlformats.org/officeDocument/2006/relationships" xmlns:p="http://schemas.openxmlformats.org/presentationml/2006/main">
+  <p:cSld>
+    <p:spTree>
+      <p:nvGrpSpPr>
+        <p:cNvPr id="1" name=""/>
+        <p:cNvGrpSpPr/>
+        <p:nvPr/>
+      </p:nvGrpSpPr>
+      <p:grpSpPr>
+        <a:xfrm>
+          <a:off x="0" y="0"/>
+          <a:ext cx="0" cy="0"/>
+          <a:chOff x="0" y="0"/>
+          <a:chExt cx="0" cy="0"/>
+        </a:xfrm>
+      </p:grpSpPr>
+      <p:sp>
+        <p:nvSpPr>
+          <p:cNvPr id="2" name="Slide Image Placeholder 1"/>
+          <p:cNvSpPr>
+            <a:spLocks noGrp="1" noRot="1" noChangeAspect="1"/>
+          </p:cNvSpPr>
+          <p:nvPr>
+            <p:ph type="sldImg"/>
+          </p:nvPr>
+        </p:nvSpPr>
+        <p:spPr/>
+      </p:sp>
+      <p:sp>
+        <p:nvSpPr>
+          <p:cNvPr id="3" name="Notes Placeholder 2"/>
+          <p:cNvSpPr>
+            <a:spLocks noGrp="1"/>
+          </p:cNvSpPr>
+          <p:nvPr>
+            <p:ph type="body" idx="1"/>
+          </p:nvPr>
+        </p:nvSpPr>
+        <p:spPr/>
+        <p:txBody>
+          <a:bodyPr/>
+          <a:lstStyle/>
+          <a:p>
+            <a:pPr marL="171450" indent="-171450">
+              <a:buFontTx/>
+              <a:buChar char="-"/>
+            </a:pPr>
             <a:endParaRPr lang="en-US" dirty="0"/>
           </a:p>
         </p:txBody>
@@ -1297,7 +1573,95 @@
     </p:spTree>
     <p:extLst>
       <p:ext uri="{BB962C8B-B14F-4D97-AF65-F5344CB8AC3E}">
-        <p14:creationId xmlns:p14="http://schemas.microsoft.com/office/powerpoint/2010/main" val="481549292"/>
+        <p14:creationId xmlns:p14="http://schemas.microsoft.com/office/powerpoint/2010/main" val="2167955836"/>
+      </p:ext>
+    </p:extLst>
+  </p:cSld>
+  <p:clrMapOvr>
+    <a:masterClrMapping/>
+  </p:clrMapOvr>
+</p:notes>
+</file>
+
+<file path=ppt/notesSlides/notesSlide19.xml><?xml version="1.0" encoding="utf-8"?>
+<p:notes xmlns:a="http://schemas.openxmlformats.org/drawingml/2006/main" xmlns:r="http://schemas.openxmlformats.org/officeDocument/2006/relationships" xmlns:p="http://schemas.openxmlformats.org/presentationml/2006/main">
+  <p:cSld>
+    <p:spTree>
+      <p:nvGrpSpPr>
+        <p:cNvPr id="1" name=""/>
+        <p:cNvGrpSpPr/>
+        <p:nvPr/>
+      </p:nvGrpSpPr>
+      <p:grpSpPr>
+        <a:xfrm>
+          <a:off x="0" y="0"/>
+          <a:ext cx="0" cy="0"/>
+          <a:chOff x="0" y="0"/>
+          <a:chExt cx="0" cy="0"/>
+        </a:xfrm>
+      </p:grpSpPr>
+      <p:sp>
+        <p:nvSpPr>
+          <p:cNvPr id="2" name="Slide Image Placeholder 1"/>
+          <p:cNvSpPr>
+            <a:spLocks noGrp="1" noRot="1" noChangeAspect="1"/>
+          </p:cNvSpPr>
+          <p:nvPr>
+            <p:ph type="sldImg"/>
+          </p:nvPr>
+        </p:nvSpPr>
+        <p:spPr/>
+      </p:sp>
+      <p:sp>
+        <p:nvSpPr>
+          <p:cNvPr id="3" name="Notes Placeholder 2"/>
+          <p:cNvSpPr>
+            <a:spLocks noGrp="1"/>
+          </p:cNvSpPr>
+          <p:nvPr>
+            <p:ph type="body" idx="1"/>
+          </p:nvPr>
+        </p:nvSpPr>
+        <p:spPr/>
+        <p:txBody>
+          <a:bodyPr/>
+          <a:lstStyle/>
+          <a:p>
+            <a:pPr marL="171450" indent="-171450">
+              <a:buFontTx/>
+              <a:buChar char="-"/>
+            </a:pPr>
+            <a:endParaRPr lang="en-US" dirty="0"/>
+          </a:p>
+        </p:txBody>
+      </p:sp>
+      <p:sp>
+        <p:nvSpPr>
+          <p:cNvPr id="4" name="Slide Number Placeholder 3"/>
+          <p:cNvSpPr>
+            <a:spLocks noGrp="1"/>
+          </p:cNvSpPr>
+          <p:nvPr>
+            <p:ph type="sldNum" sz="quarter" idx="10"/>
+          </p:nvPr>
+        </p:nvSpPr>
+        <p:spPr/>
+        <p:txBody>
+          <a:bodyPr/>
+          <a:lstStyle/>
+          <a:p>
+            <a:fld id="{1248D640-4A2F-4A8C-8E2D-3C6025A34183}" type="slidenum">
+              <a:rPr lang="en-US" smtClean="0"/>
+              <a:t>22</a:t>
+            </a:fld>
+            <a:endParaRPr lang="en-US"/>
+          </a:p>
+        </p:txBody>
+      </p:sp>
+    </p:spTree>
+    <p:extLst>
+      <p:ext uri="{BB962C8B-B14F-4D97-AF65-F5344CB8AC3E}">
+        <p14:creationId xmlns:p14="http://schemas.microsoft.com/office/powerpoint/2010/main" val="57330581"/>
       </p:ext>
     </p:extLst>
   </p:cSld>
@@ -1382,6 +1746,94 @@
     <p:extLst>
       <p:ext uri="{BB962C8B-B14F-4D97-AF65-F5344CB8AC3E}">
         <p14:creationId xmlns:p14="http://schemas.microsoft.com/office/powerpoint/2010/main" val="1155058327"/>
+      </p:ext>
+    </p:extLst>
+  </p:cSld>
+  <p:clrMapOvr>
+    <a:masterClrMapping/>
+  </p:clrMapOvr>
+</p:notes>
+</file>
+
+<file path=ppt/notesSlides/notesSlide20.xml><?xml version="1.0" encoding="utf-8"?>
+<p:notes xmlns:a="http://schemas.openxmlformats.org/drawingml/2006/main" xmlns:r="http://schemas.openxmlformats.org/officeDocument/2006/relationships" xmlns:p="http://schemas.openxmlformats.org/presentationml/2006/main">
+  <p:cSld>
+    <p:spTree>
+      <p:nvGrpSpPr>
+        <p:cNvPr id="1" name=""/>
+        <p:cNvGrpSpPr/>
+        <p:nvPr/>
+      </p:nvGrpSpPr>
+      <p:grpSpPr>
+        <a:xfrm>
+          <a:off x="0" y="0"/>
+          <a:ext cx="0" cy="0"/>
+          <a:chOff x="0" y="0"/>
+          <a:chExt cx="0" cy="0"/>
+        </a:xfrm>
+      </p:grpSpPr>
+      <p:sp>
+        <p:nvSpPr>
+          <p:cNvPr id="2" name="Slide Image Placeholder 1"/>
+          <p:cNvSpPr>
+            <a:spLocks noGrp="1" noRot="1" noChangeAspect="1"/>
+          </p:cNvSpPr>
+          <p:nvPr>
+            <p:ph type="sldImg"/>
+          </p:nvPr>
+        </p:nvSpPr>
+        <p:spPr/>
+      </p:sp>
+      <p:sp>
+        <p:nvSpPr>
+          <p:cNvPr id="3" name="Notes Placeholder 2"/>
+          <p:cNvSpPr>
+            <a:spLocks noGrp="1"/>
+          </p:cNvSpPr>
+          <p:nvPr>
+            <p:ph type="body" idx="1"/>
+          </p:nvPr>
+        </p:nvSpPr>
+        <p:spPr/>
+        <p:txBody>
+          <a:bodyPr/>
+          <a:lstStyle/>
+          <a:p>
+            <a:pPr marL="171450" indent="-171450">
+              <a:buFontTx/>
+              <a:buChar char="-"/>
+            </a:pPr>
+            <a:endParaRPr lang="en-US" dirty="0"/>
+          </a:p>
+        </p:txBody>
+      </p:sp>
+      <p:sp>
+        <p:nvSpPr>
+          <p:cNvPr id="4" name="Slide Number Placeholder 3"/>
+          <p:cNvSpPr>
+            <a:spLocks noGrp="1"/>
+          </p:cNvSpPr>
+          <p:nvPr>
+            <p:ph type="sldNum" sz="quarter" idx="10"/>
+          </p:nvPr>
+        </p:nvSpPr>
+        <p:spPr/>
+        <p:txBody>
+          <a:bodyPr/>
+          <a:lstStyle/>
+          <a:p>
+            <a:fld id="{1248D640-4A2F-4A8C-8E2D-3C6025A34183}" type="slidenum">
+              <a:rPr lang="en-US" smtClean="0"/>
+              <a:t>23</a:t>
+            </a:fld>
+            <a:endParaRPr lang="en-US"/>
+          </a:p>
+        </p:txBody>
+      </p:sp>
+    </p:spTree>
+    <p:extLst>
+      <p:ext uri="{BB962C8B-B14F-4D97-AF65-F5344CB8AC3E}">
+        <p14:creationId xmlns:p14="http://schemas.microsoft.com/office/powerpoint/2010/main" val="481549292"/>
       </p:ext>
     </p:extLst>
   </p:cSld>
@@ -2254,7 +2706,7 @@
           <a:p>
             <a:fld id="{527E59FF-7924-489C-A8FF-6E19C22AECA0}" type="datetimeFigureOut">
               <a:rPr lang="en-US" smtClean="0"/>
-              <a:t>6/10/2014</a:t>
+              <a:t>6/11/2014</a:t>
             </a:fld>
             <a:endParaRPr lang="en-US"/>
           </a:p>
@@ -2424,7 +2876,7 @@
           <a:p>
             <a:fld id="{527E59FF-7924-489C-A8FF-6E19C22AECA0}" type="datetimeFigureOut">
               <a:rPr lang="en-US" smtClean="0"/>
-              <a:t>6/10/2014</a:t>
+              <a:t>6/11/2014</a:t>
             </a:fld>
             <a:endParaRPr lang="en-US"/>
           </a:p>
@@ -2604,7 +3056,7 @@
           <a:p>
             <a:fld id="{527E59FF-7924-489C-A8FF-6E19C22AECA0}" type="datetimeFigureOut">
               <a:rPr lang="en-US" smtClean="0"/>
-              <a:t>6/10/2014</a:t>
+              <a:t>6/11/2014</a:t>
             </a:fld>
             <a:endParaRPr lang="en-US"/>
           </a:p>
@@ -2774,7 +3226,7 @@
           <a:p>
             <a:fld id="{527E59FF-7924-489C-A8FF-6E19C22AECA0}" type="datetimeFigureOut">
               <a:rPr lang="en-US" smtClean="0"/>
-              <a:t>6/10/2014</a:t>
+              <a:t>6/11/2014</a:t>
             </a:fld>
             <a:endParaRPr lang="en-US"/>
           </a:p>
@@ -3020,7 +3472,7 @@
           <a:p>
             <a:fld id="{527E59FF-7924-489C-A8FF-6E19C22AECA0}" type="datetimeFigureOut">
               <a:rPr lang="en-US" smtClean="0"/>
-              <a:t>6/10/2014</a:t>
+              <a:t>6/11/2014</a:t>
             </a:fld>
             <a:endParaRPr lang="en-US"/>
           </a:p>
@@ -3252,7 +3704,7 @@
           <a:p>
             <a:fld id="{527E59FF-7924-489C-A8FF-6E19C22AECA0}" type="datetimeFigureOut">
               <a:rPr lang="en-US" smtClean="0"/>
-              <a:t>6/10/2014</a:t>
+              <a:t>6/11/2014</a:t>
             </a:fld>
             <a:endParaRPr lang="en-US"/>
           </a:p>
@@ -3619,7 +4071,7 @@
           <a:p>
             <a:fld id="{527E59FF-7924-489C-A8FF-6E19C22AECA0}" type="datetimeFigureOut">
               <a:rPr lang="en-US" smtClean="0"/>
-              <a:t>6/10/2014</a:t>
+              <a:t>6/11/2014</a:t>
             </a:fld>
             <a:endParaRPr lang="en-US"/>
           </a:p>
@@ -3737,7 +4189,7 @@
           <a:p>
             <a:fld id="{527E59FF-7924-489C-A8FF-6E19C22AECA0}" type="datetimeFigureOut">
               <a:rPr lang="en-US" smtClean="0"/>
-              <a:t>6/10/2014</a:t>
+              <a:t>6/11/2014</a:t>
             </a:fld>
             <a:endParaRPr lang="en-US"/>
           </a:p>
@@ -3832,7 +4284,7 @@
           <a:p>
             <a:fld id="{527E59FF-7924-489C-A8FF-6E19C22AECA0}" type="datetimeFigureOut">
               <a:rPr lang="en-US" smtClean="0"/>
-              <a:t>6/10/2014</a:t>
+              <a:t>6/11/2014</a:t>
             </a:fld>
             <a:endParaRPr lang="en-US"/>
           </a:p>
@@ -4109,7 +4561,7 @@
           <a:p>
             <a:fld id="{527E59FF-7924-489C-A8FF-6E19C22AECA0}" type="datetimeFigureOut">
               <a:rPr lang="en-US" smtClean="0"/>
-              <a:t>6/10/2014</a:t>
+              <a:t>6/11/2014</a:t>
             </a:fld>
             <a:endParaRPr lang="en-US"/>
           </a:p>
@@ -4362,7 +4814,7 @@
           <a:p>
             <a:fld id="{527E59FF-7924-489C-A8FF-6E19C22AECA0}" type="datetimeFigureOut">
               <a:rPr lang="en-US" smtClean="0"/>
-              <a:t>6/10/2014</a:t>
+              <a:t>6/11/2014</a:t>
             </a:fld>
             <a:endParaRPr lang="en-US"/>
           </a:p>
@@ -4575,7 +5027,7 @@
           <a:p>
             <a:fld id="{527E59FF-7924-489C-A8FF-6E19C22AECA0}" type="datetimeFigureOut">
               <a:rPr lang="en-US" smtClean="0"/>
-              <a:t>6/10/2014</a:t>
+              <a:t>6/11/2014</a:t>
             </a:fld>
             <a:endParaRPr lang="en-US"/>
           </a:p>
@@ -5068,8 +5520,8 @@
         </p:nvSpPr>
         <p:spPr>
           <a:xfrm>
-            <a:off x="2607179" y="2894681"/>
-            <a:ext cx="7340125" cy="714738"/>
+            <a:off x="0" y="2894681"/>
+            <a:ext cx="12191999" cy="714738"/>
           </a:xfrm>
         </p:spPr>
         <p:txBody>
@@ -5126,26 +5578,86 @@
         </p:nvSpPr>
         <p:spPr>
           <a:xfrm>
-            <a:off x="2607179" y="2894681"/>
-            <a:ext cx="7340125" cy="714738"/>
+            <a:off x="838200" y="365126"/>
+            <a:ext cx="10515600" cy="714738"/>
           </a:xfrm>
         </p:spPr>
         <p:txBody>
           <a:bodyPr/>
           <a:lstStyle/>
           <a:p>
-            <a:pPr algn="ctr"/>
-            <a:r>
-              <a:rPr lang="en-US" dirty="0"/>
-              <a:t>Documentation</a:t>
-            </a:r>
+            <a:r>
+              <a:rPr lang="en-US" dirty="0" smtClean="0"/>
+              <a:t>Grunt</a:t>
+            </a:r>
+            <a:endParaRPr lang="en-US" dirty="0"/>
+          </a:p>
+        </p:txBody>
+      </p:sp>
+      <p:sp>
+        <p:nvSpPr>
+          <p:cNvPr id="3" name="Content Placeholder 2"/>
+          <p:cNvSpPr>
+            <a:spLocks noGrp="1"/>
+          </p:cNvSpPr>
+          <p:nvPr>
+            <p:ph idx="1"/>
+          </p:nvPr>
+        </p:nvSpPr>
+        <p:spPr>
+          <a:xfrm>
+            <a:off x="838200" y="1715020"/>
+            <a:ext cx="10515600" cy="3899568"/>
+          </a:xfrm>
+        </p:spPr>
+        <p:txBody>
+          <a:bodyPr/>
+          <a:lstStyle/>
+          <a:p>
+            <a:endParaRPr lang="en-US" dirty="0" smtClean="0"/>
+          </a:p>
+          <a:p>
+            <a:r>
+              <a:rPr lang="en-US" dirty="0" smtClean="0"/>
+              <a:t>Seems to be slow, no multithreading support</a:t>
+            </a:r>
+            <a:endParaRPr lang="en-US" dirty="0" smtClean="0"/>
+          </a:p>
+          <a:p>
+            <a:endParaRPr lang="en-US" dirty="0" smtClean="0"/>
+          </a:p>
+          <a:p>
+            <a:r>
+              <a:rPr lang="en-US" dirty="0" smtClean="0"/>
+              <a:t>Without supplementary plugins cannot work with modifications caching</a:t>
+            </a:r>
+            <a:endParaRPr lang="en-US" dirty="0" smtClean="0"/>
+          </a:p>
+          <a:p>
+            <a:endParaRPr lang="en-US" dirty="0" smtClean="0"/>
+          </a:p>
+          <a:p>
+            <a:r>
+              <a:rPr lang="en-US" dirty="0" smtClean="0"/>
+              <a:t>Expansive dataflow</a:t>
+            </a:r>
+            <a:endParaRPr lang="en-US" dirty="0" smtClean="0"/>
+          </a:p>
+          <a:p>
+            <a:endParaRPr lang="en-US" dirty="0" smtClean="0"/>
+          </a:p>
+          <a:p>
+            <a:pPr marL="0" indent="0">
+              <a:buNone/>
+            </a:pPr>
+            <a:endParaRPr lang="en-US" dirty="0" smtClean="0"/>
           </a:p>
         </p:txBody>
       </p:sp>
     </p:spTree>
     <p:extLst>
       <p:ext uri="{BB962C8B-B14F-4D97-AF65-F5344CB8AC3E}">
-        <p14:creationId xmlns:p14="http://schemas.microsoft.com/office/powerpoint/2010/main" val="3757615107"/>
+        <p14:creationId xmlns:p14="http://schemas.microsoft.com/office/powerpoint/2010/main" val="4175260004"/>
       </p:ext>
     </p:extLst>
   </p:cSld>
@@ -5184,64 +5696,6 @@
         </p:nvSpPr>
         <p:spPr>
           <a:xfrm>
-            <a:off x="2607179" y="2894681"/>
-            <a:ext cx="7340125" cy="714738"/>
-          </a:xfrm>
-        </p:spPr>
-        <p:txBody>
-          <a:bodyPr/>
-          <a:lstStyle/>
-          <a:p>
-            <a:pPr algn="ctr"/>
-            <a:r>
-              <a:rPr lang="en-US" dirty="0"/>
-              <a:t>Extensions and extensibility</a:t>
-            </a:r>
-          </a:p>
-        </p:txBody>
-      </p:sp>
-    </p:spTree>
-    <p:extLst>
-      <p:ext uri="{BB962C8B-B14F-4D97-AF65-F5344CB8AC3E}">
-        <p14:creationId xmlns:p14="http://schemas.microsoft.com/office/powerpoint/2010/main" val="2507215514"/>
-      </p:ext>
-    </p:extLst>
-  </p:cSld>
-  <p:clrMapOvr>
-    <a:masterClrMapping/>
-  </p:clrMapOvr>
-</p:sld>
-</file>
-
-<file path=ppt/slides/slide13.xml><?xml version="1.0" encoding="utf-8"?>
-<p:sld xmlns:a="http://schemas.openxmlformats.org/drawingml/2006/main" xmlns:r="http://schemas.openxmlformats.org/officeDocument/2006/relationships" xmlns:p="http://schemas.openxmlformats.org/presentationml/2006/main">
-  <p:cSld>
-    <p:spTree>
-      <p:nvGrpSpPr>
-        <p:cNvPr id="1" name=""/>
-        <p:cNvGrpSpPr/>
-        <p:nvPr/>
-      </p:nvGrpSpPr>
-      <p:grpSpPr>
-        <a:xfrm>
-          <a:off x="0" y="0"/>
-          <a:ext cx="0" cy="0"/>
-          <a:chOff x="0" y="0"/>
-          <a:chExt cx="0" cy="0"/>
-        </a:xfrm>
-      </p:grpSpPr>
-      <p:sp>
-        <p:nvSpPr>
-          <p:cNvPr id="2" name="Title 1"/>
-          <p:cNvSpPr>
-            <a:spLocks noGrp="1"/>
-          </p:cNvSpPr>
-          <p:nvPr>
-            <p:ph type="title"/>
-          </p:nvPr>
-        </p:nvSpPr>
-        <p:spPr>
-          <a:xfrm>
             <a:off x="838200" y="365126"/>
             <a:ext cx="10515600" cy="714738"/>
           </a:xfrm>
@@ -5252,7 +5706,7 @@
           <a:p>
             <a:r>
               <a:rPr lang="en-US" dirty="0" smtClean="0"/>
-              <a:t>Allah speaking …</a:t>
+              <a:t>Gulp</a:t>
             </a:r>
             <a:endParaRPr lang="en-US" dirty="0"/>
           </a:p>
@@ -5271,629 +5725,39 @@
         <p:spPr>
           <a:xfrm>
             <a:off x="838200" y="1227909"/>
-            <a:ext cx="10515600" cy="4949054"/>
+            <a:ext cx="10515600" cy="1478715"/>
           </a:xfrm>
         </p:spPr>
         <p:txBody>
-          <a:bodyPr/>
-          <a:lstStyle/>
+          <a:bodyPr>
+            <a:normAutofit lnSpcReduction="10000"/>
+          </a:bodyPr>
+          <a:lstStyle/>
+          <a:p>
+            <a:r>
+              <a:rPr lang="en-US" dirty="0" smtClean="0"/>
+              <a:t>Indicates nice performance at all</a:t>
+            </a:r>
+          </a:p>
           <a:p>
             <a:endParaRPr lang="en-US" dirty="0" smtClean="0"/>
           </a:p>
           <a:p>
-            <a:pPr marL="0" indent="0">
-              <a:buNone/>
-            </a:pPr>
             <a:r>
               <a:rPr lang="en-US" dirty="0" smtClean="0"/>
-              <a:t>JavaScript had to look like Java only less so, be Java’s dumb kid brother or boy-hostage sidekick.</a:t>
-            </a:r>
-          </a:p>
-          <a:p>
-            <a:pPr marL="0" indent="0">
-              <a:buNone/>
-            </a:pPr>
-            <a:endParaRPr lang="en-US" dirty="0"/>
-          </a:p>
-          <a:p>
-            <a:pPr marL="0" indent="0">
-              <a:buNone/>
-            </a:pPr>
+              <a:t>Mono I/O thread for all nested operations</a:t>
+            </a:r>
             <a:r>
               <a:rPr lang="en-US" dirty="0" smtClean="0"/>
-              <a:t>Plus, I had to be done in ten days or something worse than </a:t>
+              <a:t> on </a:t>
             </a:r>
             <a:r>
               <a:rPr lang="en-US" dirty="0" err="1" smtClean="0"/>
-              <a:t>Javascript</a:t>
-            </a:r>
-            <a:r>
-              <a:rPr lang="en-US" dirty="0" smtClean="0"/>
-              <a:t> would have happened.</a:t>
-            </a:r>
-          </a:p>
-          <a:p>
-            <a:pPr marL="0" indent="0">
-              <a:buNone/>
-            </a:pPr>
-            <a:endParaRPr lang="en-US" dirty="0"/>
-          </a:p>
-          <a:p>
-            <a:pPr marL="0" indent="0">
-              <a:buNone/>
-            </a:pPr>
-            <a:r>
-              <a:rPr lang="en-CA" dirty="0" smtClean="0"/>
-              <a:t>I'll do better in the next life.</a:t>
+              <a:t>fs</a:t>
             </a:r>
             <a:endParaRPr lang="en-US" dirty="0" smtClean="0"/>
           </a:p>
           <a:p>
-            <a:pPr marL="0" indent="0">
-              <a:buNone/>
-            </a:pPr>
-            <a:endParaRPr lang="en-US" dirty="0"/>
-          </a:p>
-          <a:p>
-            <a:pPr marL="0" indent="0" algn="r">
-              <a:buNone/>
-            </a:pPr>
-            <a:r>
-              <a:rPr lang="en-US" dirty="0" smtClean="0"/>
-              <a:t>Brendan </a:t>
-            </a:r>
-            <a:r>
-              <a:rPr lang="en-US" dirty="0" err="1" smtClean="0"/>
-              <a:t>Eich</a:t>
-            </a:r>
-            <a:r>
-              <a:rPr lang="en-US" dirty="0" smtClean="0"/>
-              <a:t> (creator of JavaScript)</a:t>
-            </a:r>
-            <a:endParaRPr lang="en-US" dirty="0"/>
-          </a:p>
-        </p:txBody>
-      </p:sp>
-    </p:spTree>
-    <p:extLst>
-      <p:ext uri="{BB962C8B-B14F-4D97-AF65-F5344CB8AC3E}">
-        <p14:creationId xmlns:p14="http://schemas.microsoft.com/office/powerpoint/2010/main" val="4049175971"/>
-      </p:ext>
-    </p:extLst>
-  </p:cSld>
-  <p:clrMapOvr>
-    <a:masterClrMapping/>
-  </p:clrMapOvr>
-</p:sld>
-</file>
-
-<file path=ppt/slides/slide14.xml><?xml version="1.0" encoding="utf-8"?>
-<p:sld xmlns:a="http://schemas.openxmlformats.org/drawingml/2006/main" xmlns:r="http://schemas.openxmlformats.org/officeDocument/2006/relationships" xmlns:p="http://schemas.openxmlformats.org/presentationml/2006/main">
-  <p:cSld>
-    <p:spTree>
-      <p:nvGrpSpPr>
-        <p:cNvPr id="1" name=""/>
-        <p:cNvGrpSpPr/>
-        <p:nvPr/>
-      </p:nvGrpSpPr>
-      <p:grpSpPr>
-        <a:xfrm>
-          <a:off x="0" y="0"/>
-          <a:ext cx="0" cy="0"/>
-          <a:chOff x="0" y="0"/>
-          <a:chExt cx="0" cy="0"/>
-        </a:xfrm>
-      </p:grpSpPr>
-      <p:sp>
-        <p:nvSpPr>
-          <p:cNvPr id="2" name="Title 1"/>
-          <p:cNvSpPr>
-            <a:spLocks noGrp="1"/>
-          </p:cNvSpPr>
-          <p:nvPr>
-            <p:ph type="title"/>
-          </p:nvPr>
-        </p:nvSpPr>
-        <p:spPr>
-          <a:xfrm>
-            <a:off x="838200" y="365126"/>
-            <a:ext cx="10515600" cy="714738"/>
-          </a:xfrm>
-        </p:spPr>
-        <p:txBody>
-          <a:bodyPr/>
-          <a:lstStyle/>
-          <a:p>
-            <a:r>
-              <a:rPr lang="en-US" dirty="0" smtClean="0"/>
-              <a:t>Coffee in the real life</a:t>
-            </a:r>
-            <a:endParaRPr lang="en-US" dirty="0"/>
-          </a:p>
-        </p:txBody>
-      </p:sp>
-      <p:sp>
-        <p:nvSpPr>
-          <p:cNvPr id="3" name="Content Placeholder 2"/>
-          <p:cNvSpPr>
-            <a:spLocks noGrp="1"/>
-          </p:cNvSpPr>
-          <p:nvPr>
-            <p:ph idx="1"/>
-          </p:nvPr>
-        </p:nvSpPr>
-        <p:spPr>
-          <a:xfrm>
-            <a:off x="838200" y="1227909"/>
-            <a:ext cx="10515600" cy="4949054"/>
-          </a:xfrm>
-        </p:spPr>
-        <p:txBody>
-          <a:bodyPr/>
-          <a:lstStyle/>
-          <a:p>
-            <a:endParaRPr lang="en-US" dirty="0" smtClean="0"/>
-          </a:p>
-          <a:p>
-            <a:r>
-              <a:rPr lang="en-US" dirty="0" smtClean="0"/>
-              <a:t>Open-source, hosted on </a:t>
-            </a:r>
-            <a:r>
-              <a:rPr lang="en-US" dirty="0" err="1" smtClean="0"/>
-              <a:t>Github</a:t>
-            </a:r>
-            <a:endParaRPr lang="en-US" dirty="0" smtClean="0"/>
-          </a:p>
-          <a:p>
-            <a:endParaRPr lang="en-US" dirty="0" smtClean="0"/>
-          </a:p>
-          <a:p>
-            <a:r>
-              <a:rPr lang="en-US" dirty="0" smtClean="0"/>
-              <a:t>11</a:t>
-            </a:r>
-            <a:r>
-              <a:rPr lang="en-US" baseline="30000" dirty="0" smtClean="0"/>
-              <a:t>th</a:t>
-            </a:r>
-            <a:r>
-              <a:rPr lang="en-US" dirty="0" smtClean="0"/>
-              <a:t> most popular language on </a:t>
-            </a:r>
-            <a:r>
-              <a:rPr lang="en-US" dirty="0" err="1" smtClean="0"/>
-              <a:t>Github</a:t>
-            </a:r>
-            <a:endParaRPr lang="en-US" dirty="0" smtClean="0"/>
-          </a:p>
-          <a:p>
-            <a:endParaRPr lang="en-US" dirty="0" smtClean="0"/>
-          </a:p>
-          <a:p>
-            <a:r>
-              <a:rPr lang="en-US" dirty="0" smtClean="0"/>
-              <a:t>How did Coffee  get its name?</a:t>
-            </a:r>
-          </a:p>
-          <a:p>
-            <a:pPr lvl="1"/>
-            <a:r>
-              <a:rPr lang="en-US" dirty="0" smtClean="0"/>
-              <a:t>Coffee was designed to become “</a:t>
-            </a:r>
-            <a:r>
-              <a:rPr lang="en-US" dirty="0" err="1" smtClean="0"/>
-              <a:t>Unfancy</a:t>
-            </a:r>
-            <a:r>
-              <a:rPr lang="en-US" dirty="0"/>
-              <a:t> </a:t>
-            </a:r>
-            <a:r>
-              <a:rPr lang="en-US" dirty="0" smtClean="0"/>
-              <a:t>JavaScript”. Java is a fancy word for coffee, so </a:t>
-            </a:r>
-            <a:r>
-              <a:rPr lang="en-US" dirty="0" err="1" smtClean="0"/>
-              <a:t>unfancy</a:t>
-            </a:r>
-            <a:r>
-              <a:rPr lang="en-US" dirty="0" smtClean="0"/>
-              <a:t> JavaScript is </a:t>
-            </a:r>
-            <a:r>
-              <a:rPr lang="en-US" dirty="0" err="1" smtClean="0"/>
-              <a:t>CoffeeScript</a:t>
-            </a:r>
-            <a:r>
-              <a:rPr lang="en-US" dirty="0"/>
-              <a:t>.</a:t>
-            </a:r>
-            <a:endParaRPr lang="en-US" dirty="0" smtClean="0"/>
-          </a:p>
-          <a:p>
-            <a:endParaRPr lang="en-US" dirty="0" smtClean="0"/>
-          </a:p>
-          <a:p>
-            <a:pPr marL="0" indent="0">
-              <a:buNone/>
-            </a:pPr>
-            <a:endParaRPr lang="en-US" dirty="0"/>
-          </a:p>
-        </p:txBody>
-      </p:sp>
-    </p:spTree>
-    <p:extLst>
-      <p:ext uri="{BB962C8B-B14F-4D97-AF65-F5344CB8AC3E}">
-        <p14:creationId xmlns:p14="http://schemas.microsoft.com/office/powerpoint/2010/main" val="405746719"/>
-      </p:ext>
-    </p:extLst>
-  </p:cSld>
-  <p:clrMapOvr>
-    <a:masterClrMapping/>
-  </p:clrMapOvr>
-</p:sld>
-</file>
-
-<file path=ppt/slides/slide15.xml><?xml version="1.0" encoding="utf-8"?>
-<p:sld xmlns:a="http://schemas.openxmlformats.org/drawingml/2006/main" xmlns:r="http://schemas.openxmlformats.org/officeDocument/2006/relationships" xmlns:p="http://schemas.openxmlformats.org/presentationml/2006/main">
-  <p:cSld>
-    <p:spTree>
-      <p:nvGrpSpPr>
-        <p:cNvPr id="1" name=""/>
-        <p:cNvGrpSpPr/>
-        <p:nvPr/>
-      </p:nvGrpSpPr>
-      <p:grpSpPr>
-        <a:xfrm>
-          <a:off x="0" y="0"/>
-          <a:ext cx="0" cy="0"/>
-          <a:chOff x="0" y="0"/>
-          <a:chExt cx="0" cy="0"/>
-        </a:xfrm>
-      </p:grpSpPr>
-      <p:sp>
-        <p:nvSpPr>
-          <p:cNvPr id="2" name="Title 1"/>
-          <p:cNvSpPr>
-            <a:spLocks noGrp="1"/>
-          </p:cNvSpPr>
-          <p:nvPr>
-            <p:ph type="title"/>
-          </p:nvPr>
-        </p:nvSpPr>
-        <p:spPr>
-          <a:xfrm>
-            <a:off x="838200" y="365126"/>
-            <a:ext cx="10515600" cy="714738"/>
-          </a:xfrm>
-        </p:spPr>
-        <p:txBody>
-          <a:bodyPr/>
-          <a:lstStyle/>
-          <a:p>
-            <a:r>
-              <a:rPr lang="en-US" dirty="0" smtClean="0"/>
-              <a:t>Typescript as rival?</a:t>
-            </a:r>
-            <a:endParaRPr lang="en-US" dirty="0"/>
-          </a:p>
-        </p:txBody>
-      </p:sp>
-      <p:sp>
-        <p:nvSpPr>
-          <p:cNvPr id="3" name="Content Placeholder 2"/>
-          <p:cNvSpPr>
-            <a:spLocks noGrp="1"/>
-          </p:cNvSpPr>
-          <p:nvPr>
-            <p:ph idx="1"/>
-          </p:nvPr>
-        </p:nvSpPr>
-        <p:spPr>
-          <a:xfrm>
-            <a:off x="838200" y="1227909"/>
-            <a:ext cx="10515600" cy="4949054"/>
-          </a:xfrm>
-        </p:spPr>
-        <p:txBody>
-          <a:bodyPr/>
-          <a:lstStyle/>
-          <a:p>
-            <a:endParaRPr lang="en-US" dirty="0" smtClean="0"/>
-          </a:p>
-          <a:p>
-            <a:r>
-              <a:rPr lang="en-US" dirty="0" smtClean="0"/>
-              <a:t>Created in October 2012, but still in preview</a:t>
-            </a:r>
-          </a:p>
-          <a:p>
-            <a:endParaRPr lang="en-US" dirty="0" smtClean="0"/>
-          </a:p>
-          <a:p>
-            <a:r>
-              <a:rPr lang="en-US" dirty="0" smtClean="0"/>
-              <a:t>Open-source, hosted on </a:t>
-            </a:r>
-            <a:r>
-              <a:rPr lang="en-US" dirty="0" err="1" smtClean="0"/>
-              <a:t>CodePlex</a:t>
-            </a:r>
-            <a:endParaRPr lang="en-US" dirty="0" smtClean="0"/>
-          </a:p>
-          <a:p>
-            <a:endParaRPr lang="en-US" dirty="0"/>
-          </a:p>
-          <a:p>
-            <a:r>
-              <a:rPr lang="en-US" dirty="0" smtClean="0"/>
-              <a:t>Not in the top 90 languages on </a:t>
-            </a:r>
-            <a:r>
-              <a:rPr lang="en-US" dirty="0" err="1" smtClean="0"/>
-              <a:t>Github</a:t>
-            </a:r>
-            <a:endParaRPr lang="en-US" dirty="0" smtClean="0"/>
-          </a:p>
-          <a:p>
-            <a:endParaRPr lang="en-US" dirty="0"/>
-          </a:p>
-          <a:p>
-            <a:r>
-              <a:rPr lang="en-US" dirty="0" err="1" smtClean="0"/>
-              <a:t>Transcompiles</a:t>
-            </a:r>
-            <a:r>
-              <a:rPr lang="en-US" dirty="0" smtClean="0"/>
-              <a:t> to JavaScript  (ES3 and ES6)</a:t>
-            </a:r>
-          </a:p>
-          <a:p>
-            <a:endParaRPr lang="en-US" dirty="0" smtClean="0"/>
-          </a:p>
-          <a:p>
-            <a:endParaRPr lang="en-US" dirty="0" smtClean="0"/>
-          </a:p>
-          <a:p>
-            <a:pPr marL="0" indent="0">
-              <a:buNone/>
-            </a:pPr>
-            <a:endParaRPr lang="en-US" dirty="0"/>
-          </a:p>
-        </p:txBody>
-      </p:sp>
-    </p:spTree>
-    <p:extLst>
-      <p:ext uri="{BB962C8B-B14F-4D97-AF65-F5344CB8AC3E}">
-        <p14:creationId xmlns:p14="http://schemas.microsoft.com/office/powerpoint/2010/main" val="3172609909"/>
-      </p:ext>
-    </p:extLst>
-  </p:cSld>
-  <p:clrMapOvr>
-    <a:masterClrMapping/>
-  </p:clrMapOvr>
-</p:sld>
-</file>
-
-<file path=ppt/slides/slide16.xml><?xml version="1.0" encoding="utf-8"?>
-<p:sld xmlns:a="http://schemas.openxmlformats.org/drawingml/2006/main" xmlns:r="http://schemas.openxmlformats.org/officeDocument/2006/relationships" xmlns:p="http://schemas.openxmlformats.org/presentationml/2006/main">
-  <p:cSld>
-    <p:spTree>
-      <p:nvGrpSpPr>
-        <p:cNvPr id="1" name=""/>
-        <p:cNvGrpSpPr/>
-        <p:nvPr/>
-      </p:nvGrpSpPr>
-      <p:grpSpPr>
-        <a:xfrm>
-          <a:off x="0" y="0"/>
-          <a:ext cx="0" cy="0"/>
-          <a:chOff x="0" y="0"/>
-          <a:chExt cx="0" cy="0"/>
-        </a:xfrm>
-      </p:grpSpPr>
-      <p:pic>
-        <p:nvPicPr>
-          <p:cNvPr id="4" name="Content Placeholder 3"/>
-          <p:cNvPicPr>
-            <a:picLocks noGrp="1" noChangeAspect="1"/>
-          </p:cNvPicPr>
-          <p:nvPr>
-            <p:ph idx="1"/>
-          </p:nvPr>
-        </p:nvPicPr>
-        <p:blipFill>
-          <a:blip r:embed="rId2"/>
-          <a:stretch>
-            <a:fillRect/>
-          </a:stretch>
-        </p:blipFill>
-        <p:spPr>
-          <a:xfrm>
-            <a:off x="2358486" y="443820"/>
-            <a:ext cx="7178936" cy="5689600"/>
-          </a:xfrm>
-          <a:prstGeom prst="rect">
-            <a:avLst/>
-          </a:prstGeom>
-        </p:spPr>
-      </p:pic>
-    </p:spTree>
-    <p:extLst>
-      <p:ext uri="{BB962C8B-B14F-4D97-AF65-F5344CB8AC3E}">
-        <p14:creationId xmlns:p14="http://schemas.microsoft.com/office/powerpoint/2010/main" val="1643599696"/>
-      </p:ext>
-    </p:extLst>
-  </p:cSld>
-  <p:clrMapOvr>
-    <a:masterClrMapping/>
-  </p:clrMapOvr>
-</p:sld>
-</file>
-
-<file path=ppt/slides/slide17.xml><?xml version="1.0" encoding="utf-8"?>
-<p:sld xmlns:a="http://schemas.openxmlformats.org/drawingml/2006/main" xmlns:r="http://schemas.openxmlformats.org/officeDocument/2006/relationships" xmlns:p="http://schemas.openxmlformats.org/presentationml/2006/main">
-  <p:cSld>
-    <p:spTree>
-      <p:nvGrpSpPr>
-        <p:cNvPr id="1" name=""/>
-        <p:cNvGrpSpPr/>
-        <p:nvPr/>
-      </p:nvGrpSpPr>
-      <p:grpSpPr>
-        <a:xfrm>
-          <a:off x="0" y="0"/>
-          <a:ext cx="0" cy="0"/>
-          <a:chOff x="0" y="0"/>
-          <a:chExt cx="0" cy="0"/>
-        </a:xfrm>
-      </p:grpSpPr>
-      <p:pic>
-        <p:nvPicPr>
-          <p:cNvPr id="4" name="Content Placeholder 3"/>
-          <p:cNvPicPr>
-            <a:picLocks noGrp="1" noChangeAspect="1"/>
-          </p:cNvPicPr>
-          <p:nvPr>
-            <p:ph idx="1"/>
-          </p:nvPr>
-        </p:nvPicPr>
-        <p:blipFill>
-          <a:blip r:embed="rId2"/>
-          <a:stretch>
-            <a:fillRect/>
-          </a:stretch>
-        </p:blipFill>
-        <p:spPr>
-          <a:xfrm>
-            <a:off x="1699599" y="1442776"/>
-            <a:ext cx="8792802" cy="3753374"/>
-          </a:xfrm>
-          <a:prstGeom prst="rect">
-            <a:avLst/>
-          </a:prstGeom>
-        </p:spPr>
-      </p:pic>
-    </p:spTree>
-    <p:extLst>
-      <p:ext uri="{BB962C8B-B14F-4D97-AF65-F5344CB8AC3E}">
-        <p14:creationId xmlns:p14="http://schemas.microsoft.com/office/powerpoint/2010/main" val="973175204"/>
-      </p:ext>
-    </p:extLst>
-  </p:cSld>
-  <p:clrMapOvr>
-    <a:masterClrMapping/>
-  </p:clrMapOvr>
-</p:sld>
-</file>
-
-<file path=ppt/slides/slide18.xml><?xml version="1.0" encoding="utf-8"?>
-<p:sld xmlns:a="http://schemas.openxmlformats.org/drawingml/2006/main" xmlns:r="http://schemas.openxmlformats.org/officeDocument/2006/relationships" xmlns:p="http://schemas.openxmlformats.org/presentationml/2006/main">
-  <p:cSld>
-    <p:spTree>
-      <p:nvGrpSpPr>
-        <p:cNvPr id="1" name=""/>
-        <p:cNvGrpSpPr/>
-        <p:nvPr/>
-      </p:nvGrpSpPr>
-      <p:grpSpPr>
-        <a:xfrm>
-          <a:off x="0" y="0"/>
-          <a:ext cx="0" cy="0"/>
-          <a:chOff x="0" y="0"/>
-          <a:chExt cx="0" cy="0"/>
-        </a:xfrm>
-      </p:grpSpPr>
-      <p:sp>
-        <p:nvSpPr>
-          <p:cNvPr id="2" name="Title 1"/>
-          <p:cNvSpPr>
-            <a:spLocks noGrp="1"/>
-          </p:cNvSpPr>
-          <p:nvPr>
-            <p:ph type="title"/>
-          </p:nvPr>
-        </p:nvSpPr>
-        <p:spPr>
-          <a:xfrm>
-            <a:off x="838200" y="365126"/>
-            <a:ext cx="10515600" cy="714738"/>
-          </a:xfrm>
-        </p:spPr>
-        <p:txBody>
-          <a:bodyPr/>
-          <a:lstStyle/>
-          <a:p>
-            <a:r>
-              <a:rPr lang="en-US" dirty="0" smtClean="0"/>
-              <a:t>Douglas </a:t>
-            </a:r>
-            <a:r>
-              <a:rPr lang="en-US" dirty="0" err="1" smtClean="0"/>
-              <a:t>Crockford</a:t>
-            </a:r>
-            <a:endParaRPr lang="en-US" dirty="0"/>
-          </a:p>
-        </p:txBody>
-      </p:sp>
-      <p:sp>
-        <p:nvSpPr>
-          <p:cNvPr id="3" name="Content Placeholder 2"/>
-          <p:cNvSpPr>
-            <a:spLocks noGrp="1"/>
-          </p:cNvSpPr>
-          <p:nvPr>
-            <p:ph idx="1"/>
-          </p:nvPr>
-        </p:nvSpPr>
-        <p:spPr>
-          <a:xfrm>
-            <a:off x="496389" y="1227909"/>
-            <a:ext cx="5538651" cy="4949054"/>
-          </a:xfrm>
-        </p:spPr>
-        <p:txBody>
-          <a:bodyPr>
-            <a:normAutofit fontScale="77500" lnSpcReduction="20000"/>
-          </a:bodyPr>
-          <a:lstStyle/>
-          <a:p>
-            <a:pPr marL="0" indent="0">
-              <a:buNone/>
-            </a:pPr>
-            <a:r>
-              <a:rPr lang="en-CA" sz="3400" dirty="0" err="1" smtClean="0"/>
-              <a:t>CoffeeScript</a:t>
-            </a:r>
-            <a:endParaRPr lang="en-CA" sz="3400" dirty="0"/>
-          </a:p>
-          <a:p>
-            <a:pPr marL="0" indent="0">
-              <a:buNone/>
-            </a:pPr>
-            <a:r>
-              <a:rPr lang="en-CA" dirty="0" smtClean="0"/>
-              <a:t>One of my favorites along those lines is a new little language called </a:t>
-            </a:r>
-            <a:r>
-              <a:rPr lang="en-CA" dirty="0" err="1" smtClean="0"/>
-              <a:t>CoffeeScript</a:t>
-            </a:r>
-            <a:r>
-              <a:rPr lang="en-CA" dirty="0" smtClean="0"/>
-              <a:t>, which takes the good parts -- not even all of the good parts, but a nice little language -- and comes up with groovy new syntax for it, which is minimal. </a:t>
-            </a:r>
-          </a:p>
-          <a:p>
-            <a:pPr marL="0" indent="0">
-              <a:buNone/>
-            </a:pPr>
-            <a:r>
-              <a:rPr lang="en-CA" dirty="0" smtClean="0"/>
-              <a:t>It's almost like dandelions: little fluffs of programs that do everything that conventional JavaScript programs do. You can't do anything in that language that you can't do in JavaScript, so it's all cosmetic. I don't know if all or much of that will find its way into JavaScript, because I'm not sure there's enough of a payoff there. But just as an experiment, as a design exercise, I think it's a brilliant piece of work. I'm excited to see stuff like that happening.</a:t>
-            </a:r>
             <a:endParaRPr lang="en-US" dirty="0" smtClean="0"/>
           </a:p>
         </p:txBody>
@@ -5908,8 +5772,8 @@
         </p:nvSpPr>
         <p:spPr>
           <a:xfrm>
-            <a:off x="6035040" y="1227909"/>
-            <a:ext cx="5860869" cy="4949054"/>
+            <a:off x="838200" y="2808555"/>
+            <a:ext cx="10515600" cy="527072"/>
           </a:xfrm>
           <a:prstGeom prst="rect">
             <a:avLst/>
@@ -6088,87 +5952,757 @@
               <a:buNone/>
             </a:pPr>
             <a:r>
-              <a:rPr lang="en-CA" sz="2600" dirty="0" err="1" smtClean="0"/>
-              <a:t>TypeScript</a:t>
-            </a:r>
-            <a:endParaRPr lang="en-CA" sz="2600" dirty="0" smtClean="0"/>
-          </a:p>
-          <a:p>
-            <a:pPr marL="0" indent="0">
-              <a:buNone/>
-            </a:pPr>
-            <a:r>
-              <a:rPr lang="en-CA" sz="2200" dirty="0" smtClean="0"/>
-              <a:t>Microsoft's </a:t>
-            </a:r>
-            <a:r>
-              <a:rPr lang="en-CA" sz="2200" dirty="0" err="1" smtClean="0"/>
-              <a:t>TypeScript</a:t>
-            </a:r>
-            <a:r>
-              <a:rPr lang="en-CA" sz="2200" dirty="0" smtClean="0"/>
-              <a:t> may be the best of the many JavaScript front ends. It seems to generate the most attractive code. And I think it should take pressure off of the </a:t>
-            </a:r>
-            <a:r>
-              <a:rPr lang="en-CA" sz="2200" dirty="0" err="1" smtClean="0"/>
-              <a:t>ECMAScript</a:t>
-            </a:r>
-            <a:r>
-              <a:rPr lang="en-CA" sz="2200" dirty="0" smtClean="0"/>
-              <a:t> Standard for new features like type declarations and classes. Anders has shown that these can be provided nicely by a preprocessor, so there is no need to change the underlying language.</a:t>
-            </a:r>
-            <a:br>
-              <a:rPr lang="en-CA" sz="2200" dirty="0" smtClean="0"/>
-            </a:br>
-            <a:r>
-              <a:rPr lang="en-CA" sz="2200" dirty="0" smtClean="0"/>
-              <a:t/>
-            </a:r>
-            <a:br>
-              <a:rPr lang="en-CA" sz="2200" dirty="0" smtClean="0"/>
-            </a:br>
-            <a:r>
-              <a:rPr lang="en-CA" sz="2200" dirty="0" smtClean="0"/>
-              <a:t>I think that JavaScript's loose typing is one of its best features and that type checking is way overrated. </a:t>
-            </a:r>
-            <a:r>
-              <a:rPr lang="en-CA" sz="2200" dirty="0" err="1" smtClean="0"/>
-              <a:t>TypeScript</a:t>
-            </a:r>
-            <a:r>
-              <a:rPr lang="en-CA" sz="2200" dirty="0" smtClean="0"/>
-              <a:t> adds sweetness, but at a price. It is not a price I am willing to pay.﻿</a:t>
-            </a:r>
-          </a:p>
-          <a:p>
-            <a:endParaRPr lang="en-US" dirty="0" smtClean="0"/>
-          </a:p>
-          <a:p>
-            <a:pPr marL="0" indent="0">
-              <a:buFont typeface="Arial" panose="020B0604020202020204" pitchFamily="34" charset="0"/>
-              <a:buNone/>
-            </a:pPr>
-            <a:endParaRPr lang="en-US" dirty="0"/>
-          </a:p>
-        </p:txBody>
-      </p:sp>
+              <a:rPr lang="en-US" dirty="0" smtClean="0"/>
+              <a:t>	</a:t>
+            </a:r>
+            <a:r>
+              <a:rPr lang="en-US" sz="1600" dirty="0" smtClean="0"/>
+              <a:t>Grunt							Gulp</a:t>
+            </a:r>
+          </a:p>
+        </p:txBody>
+      </p:sp>
+      <p:pic>
+        <p:nvPicPr>
+          <p:cNvPr id="5" name="Picture 4"/>
+          <p:cNvPicPr>
+            <a:picLocks noChangeAspect="1"/>
+          </p:cNvPicPr>
+          <p:nvPr/>
+        </p:nvPicPr>
+        <p:blipFill>
+          <a:blip r:embed="rId3"/>
+          <a:stretch>
+            <a:fillRect/>
+          </a:stretch>
+        </p:blipFill>
+        <p:spPr>
+          <a:xfrm>
+            <a:off x="6702640" y="3437558"/>
+            <a:ext cx="4153480" cy="1743318"/>
+          </a:xfrm>
+          <a:prstGeom prst="rect">
+            <a:avLst/>
+          </a:prstGeom>
+        </p:spPr>
+      </p:pic>
+      <p:pic>
+        <p:nvPicPr>
+          <p:cNvPr id="6" name="Picture 5"/>
+          <p:cNvPicPr>
+            <a:picLocks noChangeAspect="1"/>
+          </p:cNvPicPr>
+          <p:nvPr/>
+        </p:nvPicPr>
+        <p:blipFill>
+          <a:blip r:embed="rId4"/>
+          <a:stretch>
+            <a:fillRect/>
+          </a:stretch>
+        </p:blipFill>
+        <p:spPr>
+          <a:xfrm>
+            <a:off x="838200" y="3349952"/>
+            <a:ext cx="3086531" cy="3153215"/>
+          </a:xfrm>
+          <a:prstGeom prst="rect">
+            <a:avLst/>
+          </a:prstGeom>
+        </p:spPr>
+      </p:pic>
     </p:spTree>
     <p:extLst>
       <p:ext uri="{BB962C8B-B14F-4D97-AF65-F5344CB8AC3E}">
-        <p14:creationId xmlns:p14="http://schemas.microsoft.com/office/powerpoint/2010/main" val="3512428719"/>
+        <p14:creationId xmlns:p14="http://schemas.microsoft.com/office/powerpoint/2010/main" val="3447079281"/>
       </p:ext>
     </p:extLst>
   </p:cSld>
   <p:clrMapOvr>
     <a:masterClrMapping/>
   </p:clrMapOvr>
-  <p:timing>
-    <p:tnLst>
-      <p:par>
-        <p:cTn id="1" dur="indefinite" restart="never" nodeType="tmRoot"/>
-      </p:par>
-    </p:tnLst>
-  </p:timing>
+</p:sld>
+</file>
+
+<file path=ppt/slides/slide13.xml><?xml version="1.0" encoding="utf-8"?>
+<p:sld xmlns:a="http://schemas.openxmlformats.org/drawingml/2006/main" xmlns:r="http://schemas.openxmlformats.org/officeDocument/2006/relationships" xmlns:p="http://schemas.openxmlformats.org/presentationml/2006/main">
+  <p:cSld>
+    <p:spTree>
+      <p:nvGrpSpPr>
+        <p:cNvPr id="1" name=""/>
+        <p:cNvGrpSpPr/>
+        <p:nvPr/>
+      </p:nvGrpSpPr>
+      <p:grpSpPr>
+        <a:xfrm>
+          <a:off x="0" y="0"/>
+          <a:ext cx="0" cy="0"/>
+          <a:chOff x="0" y="0"/>
+          <a:chExt cx="0" cy="0"/>
+        </a:xfrm>
+      </p:grpSpPr>
+      <p:sp>
+        <p:nvSpPr>
+          <p:cNvPr id="2" name="Title 1"/>
+          <p:cNvSpPr>
+            <a:spLocks noGrp="1"/>
+          </p:cNvSpPr>
+          <p:nvPr>
+            <p:ph type="title"/>
+          </p:nvPr>
+        </p:nvSpPr>
+        <p:spPr>
+          <a:xfrm>
+            <a:off x="838200" y="365126"/>
+            <a:ext cx="10515600" cy="714738"/>
+          </a:xfrm>
+        </p:spPr>
+        <p:txBody>
+          <a:bodyPr/>
+          <a:lstStyle/>
+          <a:p>
+            <a:r>
+              <a:rPr lang="en-US" dirty="0" smtClean="0"/>
+              <a:t>Gear, Brunch</a:t>
+            </a:r>
+            <a:endParaRPr lang="en-US" dirty="0"/>
+          </a:p>
+        </p:txBody>
+      </p:sp>
+      <p:sp>
+        <p:nvSpPr>
+          <p:cNvPr id="3" name="Content Placeholder 2"/>
+          <p:cNvSpPr>
+            <a:spLocks noGrp="1"/>
+          </p:cNvSpPr>
+          <p:nvPr>
+            <p:ph idx="1"/>
+          </p:nvPr>
+        </p:nvSpPr>
+        <p:spPr>
+          <a:xfrm>
+            <a:off x="838200" y="3065254"/>
+            <a:ext cx="10515600" cy="532525"/>
+          </a:xfrm>
+        </p:spPr>
+        <p:txBody>
+          <a:bodyPr/>
+          <a:lstStyle/>
+          <a:p>
+            <a:r>
+              <a:rPr lang="en-US" dirty="0" smtClean="0"/>
+              <a:t>Both work as Gulp thanks to multithreading</a:t>
+            </a:r>
+            <a:endParaRPr lang="en-US" dirty="0" smtClean="0"/>
+          </a:p>
+          <a:p>
+            <a:endParaRPr lang="en-US" dirty="0" smtClean="0"/>
+          </a:p>
+        </p:txBody>
+      </p:sp>
+    </p:spTree>
+    <p:extLst>
+      <p:ext uri="{BB962C8B-B14F-4D97-AF65-F5344CB8AC3E}">
+        <p14:creationId xmlns:p14="http://schemas.microsoft.com/office/powerpoint/2010/main" val="2342637210"/>
+      </p:ext>
+    </p:extLst>
+  </p:cSld>
+  <p:clrMapOvr>
+    <a:masterClrMapping/>
+  </p:clrMapOvr>
+</p:sld>
+</file>
+
+<file path=ppt/slides/slide14.xml><?xml version="1.0" encoding="utf-8"?>
+<p:sld xmlns:a="http://schemas.openxmlformats.org/drawingml/2006/main" xmlns:r="http://schemas.openxmlformats.org/officeDocument/2006/relationships" xmlns:p="http://schemas.openxmlformats.org/presentationml/2006/main">
+  <p:cSld>
+    <p:spTree>
+      <p:nvGrpSpPr>
+        <p:cNvPr id="1" name=""/>
+        <p:cNvGrpSpPr/>
+        <p:nvPr/>
+      </p:nvGrpSpPr>
+      <p:grpSpPr>
+        <a:xfrm>
+          <a:off x="0" y="0"/>
+          <a:ext cx="0" cy="0"/>
+          <a:chOff x="0" y="0"/>
+          <a:chExt cx="0" cy="0"/>
+        </a:xfrm>
+      </p:grpSpPr>
+      <p:sp>
+        <p:nvSpPr>
+          <p:cNvPr id="2" name="Title 1"/>
+          <p:cNvSpPr>
+            <a:spLocks noGrp="1"/>
+          </p:cNvSpPr>
+          <p:nvPr>
+            <p:ph type="title"/>
+          </p:nvPr>
+        </p:nvSpPr>
+        <p:spPr>
+          <a:xfrm>
+            <a:off x="838200" y="365126"/>
+            <a:ext cx="10515600" cy="714738"/>
+          </a:xfrm>
+        </p:spPr>
+        <p:txBody>
+          <a:bodyPr/>
+          <a:lstStyle/>
+          <a:p>
+            <a:r>
+              <a:rPr lang="en-US" dirty="0" smtClean="0"/>
+              <a:t>Benchmarks</a:t>
+            </a:r>
+            <a:endParaRPr lang="en-US" dirty="0"/>
+          </a:p>
+        </p:txBody>
+      </p:sp>
+      <p:sp>
+        <p:nvSpPr>
+          <p:cNvPr id="3" name="Content Placeholder 2"/>
+          <p:cNvSpPr>
+            <a:spLocks noGrp="1"/>
+          </p:cNvSpPr>
+          <p:nvPr>
+            <p:ph idx="1"/>
+          </p:nvPr>
+        </p:nvSpPr>
+        <p:spPr>
+          <a:xfrm>
+            <a:off x="838200" y="1227909"/>
+            <a:ext cx="10515600" cy="4949054"/>
+          </a:xfrm>
+        </p:spPr>
+        <p:txBody>
+          <a:bodyPr/>
+          <a:lstStyle/>
+          <a:p>
+            <a:pPr marL="0" indent="0">
+              <a:buNone/>
+            </a:pPr>
+            <a:endParaRPr lang="en-US" dirty="0" smtClean="0"/>
+          </a:p>
+          <a:p>
+            <a:pPr marL="0" indent="0">
+              <a:buNone/>
+            </a:pPr>
+            <a:r>
+              <a:rPr lang="en-US" dirty="0" smtClean="0"/>
+              <a:t>Standard project of 10 </a:t>
+            </a:r>
+            <a:r>
+              <a:rPr lang="en-US" dirty="0" err="1" smtClean="0"/>
+              <a:t>js</a:t>
+            </a:r>
+            <a:r>
+              <a:rPr lang="en-US" dirty="0" smtClean="0"/>
+              <a:t>/</a:t>
+            </a:r>
+            <a:r>
+              <a:rPr lang="en-US" dirty="0" err="1" smtClean="0"/>
+              <a:t>css</a:t>
+            </a:r>
+            <a:endParaRPr lang="en-US" dirty="0" smtClean="0"/>
+          </a:p>
+          <a:p>
+            <a:endParaRPr lang="en-US" dirty="0" smtClean="0"/>
+          </a:p>
+          <a:p>
+            <a:pPr marL="514350" indent="-514350">
+              <a:buFont typeface="+mj-lt"/>
+              <a:buAutoNum type="arabicPeriod"/>
+            </a:pPr>
+            <a:r>
+              <a:rPr lang="en-US" dirty="0" smtClean="0"/>
+              <a:t>Gear (300ms)</a:t>
+            </a:r>
+          </a:p>
+          <a:p>
+            <a:pPr marL="514350" indent="-514350">
+              <a:buFont typeface="+mj-lt"/>
+              <a:buAutoNum type="arabicPeriod"/>
+            </a:pPr>
+            <a:r>
+              <a:rPr lang="en-US" dirty="0" smtClean="0"/>
+              <a:t>Gulp (~+30ms)</a:t>
+            </a:r>
+          </a:p>
+          <a:p>
+            <a:pPr marL="514350" indent="-514350">
+              <a:buFont typeface="+mj-lt"/>
+              <a:buAutoNum type="arabicPeriod"/>
+            </a:pPr>
+            <a:r>
+              <a:rPr lang="en-US" dirty="0"/>
+              <a:t>Brunch </a:t>
+            </a:r>
+            <a:r>
+              <a:rPr lang="en-US" dirty="0" smtClean="0"/>
+              <a:t>(~+80ms)</a:t>
+            </a:r>
+          </a:p>
+          <a:p>
+            <a:pPr marL="514350" indent="-514350">
+              <a:buFont typeface="+mj-lt"/>
+              <a:buAutoNum type="arabicPeriod"/>
+            </a:pPr>
+            <a:r>
+              <a:rPr lang="en-US" dirty="0"/>
+              <a:t>Grunt (~+30ms)</a:t>
+            </a:r>
+            <a:endParaRPr lang="en-US" dirty="0" smtClean="0"/>
+          </a:p>
+        </p:txBody>
+      </p:sp>
+    </p:spTree>
+    <p:extLst>
+      <p:ext uri="{BB962C8B-B14F-4D97-AF65-F5344CB8AC3E}">
+        <p14:creationId xmlns:p14="http://schemas.microsoft.com/office/powerpoint/2010/main" val="1064362467"/>
+      </p:ext>
+    </p:extLst>
+  </p:cSld>
+  <p:clrMapOvr>
+    <a:masterClrMapping/>
+  </p:clrMapOvr>
+</p:sld>
+</file>
+
+<file path=ppt/slides/slide15.xml><?xml version="1.0" encoding="utf-8"?>
+<p:sld xmlns:a="http://schemas.openxmlformats.org/drawingml/2006/main" xmlns:r="http://schemas.openxmlformats.org/officeDocument/2006/relationships" xmlns:p="http://schemas.openxmlformats.org/presentationml/2006/main">
+  <p:cSld>
+    <p:spTree>
+      <p:nvGrpSpPr>
+        <p:cNvPr id="1" name=""/>
+        <p:cNvGrpSpPr/>
+        <p:nvPr/>
+      </p:nvGrpSpPr>
+      <p:grpSpPr>
+        <a:xfrm>
+          <a:off x="0" y="0"/>
+          <a:ext cx="0" cy="0"/>
+          <a:chOff x="0" y="0"/>
+          <a:chExt cx="0" cy="0"/>
+        </a:xfrm>
+      </p:grpSpPr>
+      <p:sp>
+        <p:nvSpPr>
+          <p:cNvPr id="2" name="Title 1"/>
+          <p:cNvSpPr>
+            <a:spLocks noGrp="1"/>
+          </p:cNvSpPr>
+          <p:nvPr>
+            <p:ph type="title"/>
+          </p:nvPr>
+        </p:nvSpPr>
+        <p:spPr>
+          <a:xfrm>
+            <a:off x="0" y="2894681"/>
+            <a:ext cx="12191999" cy="714738"/>
+          </a:xfrm>
+        </p:spPr>
+        <p:txBody>
+          <a:bodyPr/>
+          <a:lstStyle/>
+          <a:p>
+            <a:pPr algn="ctr"/>
+            <a:r>
+              <a:rPr lang="en-US" dirty="0"/>
+              <a:t>Documentation</a:t>
+            </a:r>
+          </a:p>
+        </p:txBody>
+      </p:sp>
+    </p:spTree>
+    <p:extLst>
+      <p:ext uri="{BB962C8B-B14F-4D97-AF65-F5344CB8AC3E}">
+        <p14:creationId xmlns:p14="http://schemas.microsoft.com/office/powerpoint/2010/main" val="3757615107"/>
+      </p:ext>
+    </p:extLst>
+  </p:cSld>
+  <p:clrMapOvr>
+    <a:masterClrMapping/>
+  </p:clrMapOvr>
+</p:sld>
+</file>
+
+<file path=ppt/slides/slide16.xml><?xml version="1.0" encoding="utf-8"?>
+<p:sld xmlns:a="http://schemas.openxmlformats.org/drawingml/2006/main" xmlns:r="http://schemas.openxmlformats.org/officeDocument/2006/relationships" xmlns:p="http://schemas.openxmlformats.org/presentationml/2006/main">
+  <p:cSld>
+    <p:spTree>
+      <p:nvGrpSpPr>
+        <p:cNvPr id="1" name=""/>
+        <p:cNvGrpSpPr/>
+        <p:nvPr/>
+      </p:nvGrpSpPr>
+      <p:grpSpPr>
+        <a:xfrm>
+          <a:off x="0" y="0"/>
+          <a:ext cx="0" cy="0"/>
+          <a:chOff x="0" y="0"/>
+          <a:chExt cx="0" cy="0"/>
+        </a:xfrm>
+      </p:grpSpPr>
+      <p:sp>
+        <p:nvSpPr>
+          <p:cNvPr id="2" name="Title 1"/>
+          <p:cNvSpPr>
+            <a:spLocks noGrp="1"/>
+          </p:cNvSpPr>
+          <p:nvPr>
+            <p:ph type="title"/>
+          </p:nvPr>
+        </p:nvSpPr>
+        <p:spPr>
+          <a:xfrm>
+            <a:off x="0" y="2894681"/>
+            <a:ext cx="12191999" cy="714738"/>
+          </a:xfrm>
+        </p:spPr>
+        <p:txBody>
+          <a:bodyPr/>
+          <a:lstStyle/>
+          <a:p>
+            <a:pPr algn="ctr"/>
+            <a:r>
+              <a:rPr lang="en-US" dirty="0"/>
+              <a:t>Extensions and extensibility</a:t>
+            </a:r>
+          </a:p>
+        </p:txBody>
+      </p:sp>
+    </p:spTree>
+    <p:extLst>
+      <p:ext uri="{BB962C8B-B14F-4D97-AF65-F5344CB8AC3E}">
+        <p14:creationId xmlns:p14="http://schemas.microsoft.com/office/powerpoint/2010/main" val="2507215514"/>
+      </p:ext>
+    </p:extLst>
+  </p:cSld>
+  <p:clrMapOvr>
+    <a:masterClrMapping/>
+  </p:clrMapOvr>
+</p:sld>
+</file>
+
+<file path=ppt/slides/slide17.xml><?xml version="1.0" encoding="utf-8"?>
+<p:sld xmlns:a="http://schemas.openxmlformats.org/drawingml/2006/main" xmlns:r="http://schemas.openxmlformats.org/officeDocument/2006/relationships" xmlns:p="http://schemas.openxmlformats.org/presentationml/2006/main">
+  <p:cSld>
+    <p:spTree>
+      <p:nvGrpSpPr>
+        <p:cNvPr id="1" name=""/>
+        <p:cNvGrpSpPr/>
+        <p:nvPr/>
+      </p:nvGrpSpPr>
+      <p:grpSpPr>
+        <a:xfrm>
+          <a:off x="0" y="0"/>
+          <a:ext cx="0" cy="0"/>
+          <a:chOff x="0" y="0"/>
+          <a:chExt cx="0" cy="0"/>
+        </a:xfrm>
+      </p:grpSpPr>
+      <p:sp>
+        <p:nvSpPr>
+          <p:cNvPr id="2" name="Title 1"/>
+          <p:cNvSpPr>
+            <a:spLocks noGrp="1"/>
+          </p:cNvSpPr>
+          <p:nvPr>
+            <p:ph type="title"/>
+          </p:nvPr>
+        </p:nvSpPr>
+        <p:spPr>
+          <a:xfrm>
+            <a:off x="838200" y="365126"/>
+            <a:ext cx="10515600" cy="714738"/>
+          </a:xfrm>
+        </p:spPr>
+        <p:txBody>
+          <a:bodyPr/>
+          <a:lstStyle/>
+          <a:p>
+            <a:r>
+              <a:rPr lang="en-US" dirty="0" smtClean="0"/>
+              <a:t>Allah speaking …</a:t>
+            </a:r>
+            <a:endParaRPr lang="en-US" dirty="0"/>
+          </a:p>
+        </p:txBody>
+      </p:sp>
+      <p:sp>
+        <p:nvSpPr>
+          <p:cNvPr id="3" name="Content Placeholder 2"/>
+          <p:cNvSpPr>
+            <a:spLocks noGrp="1"/>
+          </p:cNvSpPr>
+          <p:nvPr>
+            <p:ph idx="1"/>
+          </p:nvPr>
+        </p:nvSpPr>
+        <p:spPr>
+          <a:xfrm>
+            <a:off x="838200" y="1227909"/>
+            <a:ext cx="10515600" cy="4949054"/>
+          </a:xfrm>
+        </p:spPr>
+        <p:txBody>
+          <a:bodyPr/>
+          <a:lstStyle/>
+          <a:p>
+            <a:endParaRPr lang="en-US" dirty="0" smtClean="0"/>
+          </a:p>
+          <a:p>
+            <a:pPr marL="0" indent="0">
+              <a:buNone/>
+            </a:pPr>
+            <a:r>
+              <a:rPr lang="en-US" dirty="0" smtClean="0"/>
+              <a:t>JavaScript had to look like Java only less so, be Java’s dumb kid brother or boy-hostage sidekick.</a:t>
+            </a:r>
+          </a:p>
+          <a:p>
+            <a:pPr marL="0" indent="0">
+              <a:buNone/>
+            </a:pPr>
+            <a:endParaRPr lang="en-US" dirty="0"/>
+          </a:p>
+          <a:p>
+            <a:pPr marL="0" indent="0">
+              <a:buNone/>
+            </a:pPr>
+            <a:r>
+              <a:rPr lang="en-US" dirty="0" smtClean="0"/>
+              <a:t>Plus, I had to be done in ten days or something worse than </a:t>
+            </a:r>
+            <a:r>
+              <a:rPr lang="en-US" dirty="0" err="1" smtClean="0"/>
+              <a:t>Javascript</a:t>
+            </a:r>
+            <a:r>
+              <a:rPr lang="en-US" dirty="0" smtClean="0"/>
+              <a:t> would have happened.</a:t>
+            </a:r>
+          </a:p>
+          <a:p>
+            <a:pPr marL="0" indent="0">
+              <a:buNone/>
+            </a:pPr>
+            <a:endParaRPr lang="en-US" dirty="0"/>
+          </a:p>
+          <a:p>
+            <a:pPr marL="0" indent="0">
+              <a:buNone/>
+            </a:pPr>
+            <a:r>
+              <a:rPr lang="en-CA" dirty="0" smtClean="0"/>
+              <a:t>I'll do better in the next life.</a:t>
+            </a:r>
+            <a:endParaRPr lang="en-US" dirty="0" smtClean="0"/>
+          </a:p>
+          <a:p>
+            <a:pPr marL="0" indent="0">
+              <a:buNone/>
+            </a:pPr>
+            <a:endParaRPr lang="en-US" dirty="0"/>
+          </a:p>
+          <a:p>
+            <a:pPr marL="0" indent="0" algn="r">
+              <a:buNone/>
+            </a:pPr>
+            <a:r>
+              <a:rPr lang="en-US" dirty="0" smtClean="0"/>
+              <a:t>Brendan </a:t>
+            </a:r>
+            <a:r>
+              <a:rPr lang="en-US" dirty="0" err="1" smtClean="0"/>
+              <a:t>Eich</a:t>
+            </a:r>
+            <a:r>
+              <a:rPr lang="en-US" dirty="0" smtClean="0"/>
+              <a:t> (creator of JavaScript)</a:t>
+            </a:r>
+            <a:endParaRPr lang="en-US" dirty="0"/>
+          </a:p>
+        </p:txBody>
+      </p:sp>
+    </p:spTree>
+    <p:extLst>
+      <p:ext uri="{BB962C8B-B14F-4D97-AF65-F5344CB8AC3E}">
+        <p14:creationId xmlns:p14="http://schemas.microsoft.com/office/powerpoint/2010/main" val="4049175971"/>
+      </p:ext>
+    </p:extLst>
+  </p:cSld>
+  <p:clrMapOvr>
+    <a:masterClrMapping/>
+  </p:clrMapOvr>
+</p:sld>
+</file>
+
+<file path=ppt/slides/slide18.xml><?xml version="1.0" encoding="utf-8"?>
+<p:sld xmlns:a="http://schemas.openxmlformats.org/drawingml/2006/main" xmlns:r="http://schemas.openxmlformats.org/officeDocument/2006/relationships" xmlns:p="http://schemas.openxmlformats.org/presentationml/2006/main">
+  <p:cSld>
+    <p:spTree>
+      <p:nvGrpSpPr>
+        <p:cNvPr id="1" name=""/>
+        <p:cNvGrpSpPr/>
+        <p:nvPr/>
+      </p:nvGrpSpPr>
+      <p:grpSpPr>
+        <a:xfrm>
+          <a:off x="0" y="0"/>
+          <a:ext cx="0" cy="0"/>
+          <a:chOff x="0" y="0"/>
+          <a:chExt cx="0" cy="0"/>
+        </a:xfrm>
+      </p:grpSpPr>
+      <p:sp>
+        <p:nvSpPr>
+          <p:cNvPr id="2" name="Title 1"/>
+          <p:cNvSpPr>
+            <a:spLocks noGrp="1"/>
+          </p:cNvSpPr>
+          <p:nvPr>
+            <p:ph type="title"/>
+          </p:nvPr>
+        </p:nvSpPr>
+        <p:spPr>
+          <a:xfrm>
+            <a:off x="838200" y="365126"/>
+            <a:ext cx="10515600" cy="714738"/>
+          </a:xfrm>
+        </p:spPr>
+        <p:txBody>
+          <a:bodyPr/>
+          <a:lstStyle/>
+          <a:p>
+            <a:r>
+              <a:rPr lang="en-US" dirty="0" smtClean="0"/>
+              <a:t>Coffee in the real life</a:t>
+            </a:r>
+            <a:endParaRPr lang="en-US" dirty="0"/>
+          </a:p>
+        </p:txBody>
+      </p:sp>
+      <p:sp>
+        <p:nvSpPr>
+          <p:cNvPr id="3" name="Content Placeholder 2"/>
+          <p:cNvSpPr>
+            <a:spLocks noGrp="1"/>
+          </p:cNvSpPr>
+          <p:nvPr>
+            <p:ph idx="1"/>
+          </p:nvPr>
+        </p:nvSpPr>
+        <p:spPr>
+          <a:xfrm>
+            <a:off x="838200" y="1227909"/>
+            <a:ext cx="10515600" cy="4949054"/>
+          </a:xfrm>
+        </p:spPr>
+        <p:txBody>
+          <a:bodyPr/>
+          <a:lstStyle/>
+          <a:p>
+            <a:endParaRPr lang="en-US" dirty="0" smtClean="0"/>
+          </a:p>
+          <a:p>
+            <a:r>
+              <a:rPr lang="en-US" dirty="0" smtClean="0"/>
+              <a:t>Open-source, hosted on </a:t>
+            </a:r>
+            <a:r>
+              <a:rPr lang="en-US" dirty="0" err="1" smtClean="0"/>
+              <a:t>Github</a:t>
+            </a:r>
+            <a:endParaRPr lang="en-US" dirty="0" smtClean="0"/>
+          </a:p>
+          <a:p>
+            <a:endParaRPr lang="en-US" dirty="0" smtClean="0"/>
+          </a:p>
+          <a:p>
+            <a:r>
+              <a:rPr lang="en-US" dirty="0" smtClean="0"/>
+              <a:t>11</a:t>
+            </a:r>
+            <a:r>
+              <a:rPr lang="en-US" baseline="30000" dirty="0" smtClean="0"/>
+              <a:t>th</a:t>
+            </a:r>
+            <a:r>
+              <a:rPr lang="en-US" dirty="0" smtClean="0"/>
+              <a:t> most popular language on </a:t>
+            </a:r>
+            <a:r>
+              <a:rPr lang="en-US" dirty="0" err="1" smtClean="0"/>
+              <a:t>Github</a:t>
+            </a:r>
+            <a:endParaRPr lang="en-US" dirty="0" smtClean="0"/>
+          </a:p>
+          <a:p>
+            <a:endParaRPr lang="en-US" dirty="0" smtClean="0"/>
+          </a:p>
+          <a:p>
+            <a:r>
+              <a:rPr lang="en-US" dirty="0" smtClean="0"/>
+              <a:t>How did Coffee  get its name?</a:t>
+            </a:r>
+          </a:p>
+          <a:p>
+            <a:pPr lvl="1"/>
+            <a:r>
+              <a:rPr lang="en-US" dirty="0" smtClean="0"/>
+              <a:t>Coffee was designed to become “</a:t>
+            </a:r>
+            <a:r>
+              <a:rPr lang="en-US" dirty="0" err="1" smtClean="0"/>
+              <a:t>Unfancy</a:t>
+            </a:r>
+            <a:r>
+              <a:rPr lang="en-US" dirty="0"/>
+              <a:t> </a:t>
+            </a:r>
+            <a:r>
+              <a:rPr lang="en-US" dirty="0" smtClean="0"/>
+              <a:t>JavaScript”. Java is a fancy word for coffee, so </a:t>
+            </a:r>
+            <a:r>
+              <a:rPr lang="en-US" dirty="0" err="1" smtClean="0"/>
+              <a:t>unfancy</a:t>
+            </a:r>
+            <a:r>
+              <a:rPr lang="en-US" dirty="0" smtClean="0"/>
+              <a:t> JavaScript is </a:t>
+            </a:r>
+            <a:r>
+              <a:rPr lang="en-US" dirty="0" err="1" smtClean="0"/>
+              <a:t>CoffeeScript</a:t>
+            </a:r>
+            <a:r>
+              <a:rPr lang="en-US" dirty="0"/>
+              <a:t>.</a:t>
+            </a:r>
+            <a:endParaRPr lang="en-US" dirty="0" smtClean="0"/>
+          </a:p>
+          <a:p>
+            <a:endParaRPr lang="en-US" dirty="0" smtClean="0"/>
+          </a:p>
+          <a:p>
+            <a:pPr marL="0" indent="0">
+              <a:buNone/>
+            </a:pPr>
+            <a:endParaRPr lang="en-US" dirty="0"/>
+          </a:p>
+        </p:txBody>
+      </p:sp>
+    </p:spTree>
+    <p:extLst>
+      <p:ext uri="{BB962C8B-B14F-4D97-AF65-F5344CB8AC3E}">
+        <p14:creationId xmlns:p14="http://schemas.microsoft.com/office/powerpoint/2010/main" val="405746719"/>
+      </p:ext>
+    </p:extLst>
+  </p:cSld>
+  <p:clrMapOvr>
+    <a:masterClrMapping/>
+  </p:clrMapOvr>
 </p:sld>
 </file>
 
@@ -6211,11 +6745,394 @@
           <a:p>
             <a:r>
               <a:rPr lang="en-US" dirty="0" smtClean="0"/>
-              <a:t>Brendan </a:t>
+              <a:t>Typescript as rival?</a:t>
+            </a:r>
+            <a:endParaRPr lang="en-US" dirty="0"/>
+          </a:p>
+        </p:txBody>
+      </p:sp>
+      <p:sp>
+        <p:nvSpPr>
+          <p:cNvPr id="3" name="Content Placeholder 2"/>
+          <p:cNvSpPr>
+            <a:spLocks noGrp="1"/>
+          </p:cNvSpPr>
+          <p:nvPr>
+            <p:ph idx="1"/>
+          </p:nvPr>
+        </p:nvSpPr>
+        <p:spPr>
+          <a:xfrm>
+            <a:off x="838200" y="1227909"/>
+            <a:ext cx="10515600" cy="4949054"/>
+          </a:xfrm>
+        </p:spPr>
+        <p:txBody>
+          <a:bodyPr/>
+          <a:lstStyle/>
+          <a:p>
+            <a:endParaRPr lang="en-US" dirty="0" smtClean="0"/>
+          </a:p>
+          <a:p>
+            <a:r>
+              <a:rPr lang="en-US" dirty="0" smtClean="0"/>
+              <a:t>Created in October 2012, but still in preview</a:t>
+            </a:r>
+          </a:p>
+          <a:p>
+            <a:endParaRPr lang="en-US" dirty="0" smtClean="0"/>
+          </a:p>
+          <a:p>
+            <a:r>
+              <a:rPr lang="en-US" dirty="0" smtClean="0"/>
+              <a:t>Open-source, hosted on </a:t>
             </a:r>
             <a:r>
               <a:rPr lang="en-US" dirty="0" err="1" smtClean="0"/>
-              <a:t>Eich</a:t>
+              <a:t>CodePlex</a:t>
+            </a:r>
+            <a:endParaRPr lang="en-US" dirty="0" smtClean="0"/>
+          </a:p>
+          <a:p>
+            <a:endParaRPr lang="en-US" dirty="0"/>
+          </a:p>
+          <a:p>
+            <a:r>
+              <a:rPr lang="en-US" dirty="0" smtClean="0"/>
+              <a:t>Not in the top 90 languages on </a:t>
+            </a:r>
+            <a:r>
+              <a:rPr lang="en-US" dirty="0" err="1" smtClean="0"/>
+              <a:t>Github</a:t>
+            </a:r>
+            <a:endParaRPr lang="en-US" dirty="0" smtClean="0"/>
+          </a:p>
+          <a:p>
+            <a:endParaRPr lang="en-US" dirty="0"/>
+          </a:p>
+          <a:p>
+            <a:r>
+              <a:rPr lang="en-US" dirty="0" err="1" smtClean="0"/>
+              <a:t>Transcompiles</a:t>
+            </a:r>
+            <a:r>
+              <a:rPr lang="en-US" dirty="0" smtClean="0"/>
+              <a:t> to JavaScript  (ES3 and ES6)</a:t>
+            </a:r>
+          </a:p>
+          <a:p>
+            <a:endParaRPr lang="en-US" dirty="0" smtClean="0"/>
+          </a:p>
+          <a:p>
+            <a:endParaRPr lang="en-US" dirty="0" smtClean="0"/>
+          </a:p>
+          <a:p>
+            <a:pPr marL="0" indent="0">
+              <a:buNone/>
+            </a:pPr>
+            <a:endParaRPr lang="en-US" dirty="0"/>
+          </a:p>
+        </p:txBody>
+      </p:sp>
+    </p:spTree>
+    <p:extLst>
+      <p:ext uri="{BB962C8B-B14F-4D97-AF65-F5344CB8AC3E}">
+        <p14:creationId xmlns:p14="http://schemas.microsoft.com/office/powerpoint/2010/main" val="3172609909"/>
+      </p:ext>
+    </p:extLst>
+  </p:cSld>
+  <p:clrMapOvr>
+    <a:masterClrMapping/>
+  </p:clrMapOvr>
+</p:sld>
+</file>
+
+<file path=ppt/slides/slide2.xml><?xml version="1.0" encoding="utf-8"?>
+<p:sld xmlns:a="http://schemas.openxmlformats.org/drawingml/2006/main" xmlns:r="http://schemas.openxmlformats.org/officeDocument/2006/relationships" xmlns:p="http://schemas.openxmlformats.org/presentationml/2006/main">
+  <p:cSld>
+    <p:spTree>
+      <p:nvGrpSpPr>
+        <p:cNvPr id="1" name=""/>
+        <p:cNvGrpSpPr/>
+        <p:nvPr/>
+      </p:nvGrpSpPr>
+      <p:grpSpPr>
+        <a:xfrm>
+          <a:off x="0" y="0"/>
+          <a:ext cx="0" cy="0"/>
+          <a:chOff x="0" y="0"/>
+          <a:chExt cx="0" cy="0"/>
+        </a:xfrm>
+      </p:grpSpPr>
+      <p:sp>
+        <p:nvSpPr>
+          <p:cNvPr id="2" name="Title 1"/>
+          <p:cNvSpPr>
+            <a:spLocks noGrp="1"/>
+          </p:cNvSpPr>
+          <p:nvPr>
+            <p:ph type="title"/>
+          </p:nvPr>
+        </p:nvSpPr>
+        <p:spPr>
+          <a:xfrm>
+            <a:off x="838200" y="365126"/>
+            <a:ext cx="10515600" cy="714738"/>
+          </a:xfrm>
+        </p:spPr>
+        <p:txBody>
+          <a:bodyPr/>
+          <a:lstStyle/>
+          <a:p>
+            <a:r>
+              <a:rPr lang="en-US" dirty="0" smtClean="0"/>
+              <a:t>Node.js and NPM</a:t>
+            </a:r>
+            <a:endParaRPr lang="en-US" dirty="0"/>
+          </a:p>
+        </p:txBody>
+      </p:sp>
+      <p:sp>
+        <p:nvSpPr>
+          <p:cNvPr id="3" name="Content Placeholder 2"/>
+          <p:cNvSpPr>
+            <a:spLocks noGrp="1"/>
+          </p:cNvSpPr>
+          <p:nvPr>
+            <p:ph idx="1"/>
+          </p:nvPr>
+        </p:nvSpPr>
+        <p:spPr>
+          <a:xfrm>
+            <a:off x="838200" y="1227909"/>
+            <a:ext cx="10515600" cy="4949054"/>
+          </a:xfrm>
+        </p:spPr>
+        <p:txBody>
+          <a:bodyPr>
+            <a:normAutofit/>
+          </a:bodyPr>
+          <a:lstStyle/>
+          <a:p>
+            <a:endParaRPr lang="en-US" dirty="0" smtClean="0"/>
+          </a:p>
+          <a:p>
+            <a:r>
+              <a:rPr lang="en-US" dirty="0" smtClean="0"/>
+              <a:t>Node.js is a scalable, server-side oriented platform for networking application and more (console and desktop)</a:t>
+            </a:r>
+          </a:p>
+          <a:p>
+            <a:pPr lvl="1"/>
+            <a:endParaRPr lang="en-US" dirty="0" smtClean="0"/>
+          </a:p>
+          <a:p>
+            <a:pPr lvl="1"/>
+            <a:r>
+              <a:rPr lang="en-US" dirty="0" smtClean="0"/>
+              <a:t>Written in C, C++, JavaScript</a:t>
+            </a:r>
+          </a:p>
+          <a:p>
+            <a:pPr lvl="1"/>
+            <a:r>
+              <a:rPr lang="en-US" dirty="0" smtClean="0"/>
+              <a:t>Supports V8, JavaScript engine</a:t>
+            </a:r>
+          </a:p>
+          <a:p>
+            <a:pPr lvl="1"/>
+            <a:r>
+              <a:rPr lang="en-US" dirty="0" smtClean="0"/>
+              <a:t>Contains built-in asynchronous I/O lib for file, socket and HTTP</a:t>
+            </a:r>
+          </a:p>
+          <a:p>
+            <a:endParaRPr lang="en-US" dirty="0" smtClean="0"/>
+          </a:p>
+          <a:p>
+            <a:r>
+              <a:rPr lang="en-US" dirty="0" smtClean="0"/>
+              <a:t>NPM is an official package manager for Node.js and it’s shipped with node since v0.6.3</a:t>
+            </a:r>
+          </a:p>
+          <a:p>
+            <a:endParaRPr lang="en-US" dirty="0" smtClean="0"/>
+          </a:p>
+          <a:p>
+            <a:endParaRPr lang="en-US" dirty="0"/>
+          </a:p>
+        </p:txBody>
+      </p:sp>
+    </p:spTree>
+    <p:extLst>
+      <p:ext uri="{BB962C8B-B14F-4D97-AF65-F5344CB8AC3E}">
+        <p14:creationId xmlns:p14="http://schemas.microsoft.com/office/powerpoint/2010/main" val="1522918781"/>
+      </p:ext>
+    </p:extLst>
+  </p:cSld>
+  <p:clrMapOvr>
+    <a:masterClrMapping/>
+  </p:clrMapOvr>
+</p:sld>
+</file>
+
+<file path=ppt/slides/slide20.xml><?xml version="1.0" encoding="utf-8"?>
+<p:sld xmlns:a="http://schemas.openxmlformats.org/drawingml/2006/main" xmlns:r="http://schemas.openxmlformats.org/officeDocument/2006/relationships" xmlns:p="http://schemas.openxmlformats.org/presentationml/2006/main">
+  <p:cSld>
+    <p:spTree>
+      <p:nvGrpSpPr>
+        <p:cNvPr id="1" name=""/>
+        <p:cNvGrpSpPr/>
+        <p:nvPr/>
+      </p:nvGrpSpPr>
+      <p:grpSpPr>
+        <a:xfrm>
+          <a:off x="0" y="0"/>
+          <a:ext cx="0" cy="0"/>
+          <a:chOff x="0" y="0"/>
+          <a:chExt cx="0" cy="0"/>
+        </a:xfrm>
+      </p:grpSpPr>
+      <p:pic>
+        <p:nvPicPr>
+          <p:cNvPr id="4" name="Content Placeholder 3"/>
+          <p:cNvPicPr>
+            <a:picLocks noGrp="1" noChangeAspect="1"/>
+          </p:cNvPicPr>
+          <p:nvPr>
+            <p:ph idx="1"/>
+          </p:nvPr>
+        </p:nvPicPr>
+        <p:blipFill>
+          <a:blip r:embed="rId2"/>
+          <a:stretch>
+            <a:fillRect/>
+          </a:stretch>
+        </p:blipFill>
+        <p:spPr>
+          <a:xfrm>
+            <a:off x="2358486" y="443820"/>
+            <a:ext cx="7178936" cy="5689600"/>
+          </a:xfrm>
+          <a:prstGeom prst="rect">
+            <a:avLst/>
+          </a:prstGeom>
+        </p:spPr>
+      </p:pic>
+    </p:spTree>
+    <p:extLst>
+      <p:ext uri="{BB962C8B-B14F-4D97-AF65-F5344CB8AC3E}">
+        <p14:creationId xmlns:p14="http://schemas.microsoft.com/office/powerpoint/2010/main" val="1643599696"/>
+      </p:ext>
+    </p:extLst>
+  </p:cSld>
+  <p:clrMapOvr>
+    <a:masterClrMapping/>
+  </p:clrMapOvr>
+</p:sld>
+</file>
+
+<file path=ppt/slides/slide21.xml><?xml version="1.0" encoding="utf-8"?>
+<p:sld xmlns:a="http://schemas.openxmlformats.org/drawingml/2006/main" xmlns:r="http://schemas.openxmlformats.org/officeDocument/2006/relationships" xmlns:p="http://schemas.openxmlformats.org/presentationml/2006/main">
+  <p:cSld>
+    <p:spTree>
+      <p:nvGrpSpPr>
+        <p:cNvPr id="1" name=""/>
+        <p:cNvGrpSpPr/>
+        <p:nvPr/>
+      </p:nvGrpSpPr>
+      <p:grpSpPr>
+        <a:xfrm>
+          <a:off x="0" y="0"/>
+          <a:ext cx="0" cy="0"/>
+          <a:chOff x="0" y="0"/>
+          <a:chExt cx="0" cy="0"/>
+        </a:xfrm>
+      </p:grpSpPr>
+      <p:pic>
+        <p:nvPicPr>
+          <p:cNvPr id="4" name="Content Placeholder 3"/>
+          <p:cNvPicPr>
+            <a:picLocks noGrp="1" noChangeAspect="1"/>
+          </p:cNvPicPr>
+          <p:nvPr>
+            <p:ph idx="1"/>
+          </p:nvPr>
+        </p:nvPicPr>
+        <p:blipFill>
+          <a:blip r:embed="rId2"/>
+          <a:stretch>
+            <a:fillRect/>
+          </a:stretch>
+        </p:blipFill>
+        <p:spPr>
+          <a:xfrm>
+            <a:off x="1699599" y="1442776"/>
+            <a:ext cx="8792802" cy="3753374"/>
+          </a:xfrm>
+          <a:prstGeom prst="rect">
+            <a:avLst/>
+          </a:prstGeom>
+        </p:spPr>
+      </p:pic>
+    </p:spTree>
+    <p:extLst>
+      <p:ext uri="{BB962C8B-B14F-4D97-AF65-F5344CB8AC3E}">
+        <p14:creationId xmlns:p14="http://schemas.microsoft.com/office/powerpoint/2010/main" val="973175204"/>
+      </p:ext>
+    </p:extLst>
+  </p:cSld>
+  <p:clrMapOvr>
+    <a:masterClrMapping/>
+  </p:clrMapOvr>
+</p:sld>
+</file>
+
+<file path=ppt/slides/slide22.xml><?xml version="1.0" encoding="utf-8"?>
+<p:sld xmlns:a="http://schemas.openxmlformats.org/drawingml/2006/main" xmlns:r="http://schemas.openxmlformats.org/officeDocument/2006/relationships" xmlns:p="http://schemas.openxmlformats.org/presentationml/2006/main">
+  <p:cSld>
+    <p:spTree>
+      <p:nvGrpSpPr>
+        <p:cNvPr id="1" name=""/>
+        <p:cNvGrpSpPr/>
+        <p:nvPr/>
+      </p:nvGrpSpPr>
+      <p:grpSpPr>
+        <a:xfrm>
+          <a:off x="0" y="0"/>
+          <a:ext cx="0" cy="0"/>
+          <a:chOff x="0" y="0"/>
+          <a:chExt cx="0" cy="0"/>
+        </a:xfrm>
+      </p:grpSpPr>
+      <p:sp>
+        <p:nvSpPr>
+          <p:cNvPr id="2" name="Title 1"/>
+          <p:cNvSpPr>
+            <a:spLocks noGrp="1"/>
+          </p:cNvSpPr>
+          <p:nvPr>
+            <p:ph type="title"/>
+          </p:nvPr>
+        </p:nvSpPr>
+        <p:spPr>
+          <a:xfrm>
+            <a:off x="838200" y="365126"/>
+            <a:ext cx="10515600" cy="714738"/>
+          </a:xfrm>
+        </p:spPr>
+        <p:txBody>
+          <a:bodyPr/>
+          <a:lstStyle/>
+          <a:p>
+            <a:r>
+              <a:rPr lang="en-US" dirty="0" smtClean="0"/>
+              <a:t>Douglas </a:t>
+            </a:r>
+            <a:r>
+              <a:rPr lang="en-US" dirty="0" err="1" smtClean="0"/>
+              <a:t>Crockford</a:t>
             </a:r>
             <a:endParaRPr lang="en-US" dirty="0"/>
           </a:p>
@@ -6239,7 +7156,7 @@
         </p:spPr>
         <p:txBody>
           <a:bodyPr>
-            <a:normAutofit/>
+            <a:normAutofit fontScale="77500" lnSpcReduction="20000"/>
           </a:bodyPr>
           <a:lstStyle/>
           <a:p>
@@ -6247,51 +7164,37 @@
               <a:buNone/>
             </a:pPr>
             <a:r>
-              <a:rPr lang="en-CA" sz="2600" dirty="0" err="1" smtClean="0"/>
+              <a:rPr lang="en-CA" sz="3400" dirty="0" err="1" smtClean="0"/>
               <a:t>CoffeeScript</a:t>
             </a:r>
-            <a:endParaRPr lang="en-CA" sz="2600" dirty="0"/>
+            <a:endParaRPr lang="en-CA" sz="3400" dirty="0"/>
           </a:p>
           <a:p>
             <a:pPr marL="0" indent="0">
               <a:buNone/>
             </a:pPr>
             <a:r>
-              <a:rPr lang="en-CA" sz="2200" dirty="0" smtClean="0"/>
-              <a:t>It helps to have thinks like </a:t>
-            </a:r>
-            <a:r>
-              <a:rPr lang="en-CA" sz="2200" dirty="0" err="1" smtClean="0"/>
+              <a:rPr lang="en-CA" dirty="0" smtClean="0"/>
+              <a:t>One of my favorites along those lines is a new little language called </a:t>
+            </a:r>
+            <a:r>
+              <a:rPr lang="en-CA" dirty="0" err="1" smtClean="0"/>
               <a:t>CoffeeScript</a:t>
             </a:r>
             <a:r>
-              <a:rPr lang="en-CA" sz="2200" dirty="0" smtClean="0"/>
-              <a:t> out there it isn’t overriding, it doesn’t tell us what we must to do, but it’s suggestive, and if we want to pave that cow path we can, and I’m in favor.</a:t>
+              <a:rPr lang="en-CA" dirty="0" smtClean="0"/>
+              <a:t>, which takes the good parts -- not even all of the good parts, but a nice little language -- and comes up with groovy new syntax for it, which is minimal. </a:t>
             </a:r>
           </a:p>
           <a:p>
             <a:pPr marL="0" indent="0">
               <a:buNone/>
             </a:pPr>
-            <a:endParaRPr lang="en-CA" sz="2200" dirty="0"/>
-          </a:p>
-          <a:p>
-            <a:pPr marL="0" indent="0">
-              <a:buNone/>
-            </a:pPr>
-            <a:r>
-              <a:rPr lang="en-CA" sz="2200" dirty="0" smtClean="0"/>
-              <a:t>I advocated strongly for standardising prototypal inheritance à la </a:t>
-            </a:r>
-            <a:r>
-              <a:rPr lang="en-CA" sz="2200" dirty="0" err="1" smtClean="0"/>
-              <a:t>CoffeeScript’s</a:t>
-            </a:r>
-            <a:r>
-              <a:rPr lang="en-CA" sz="2200" dirty="0" smtClean="0"/>
-              <a:t> class, super and @ syntactic sugar.</a:t>
-            </a:r>
-            <a:endParaRPr lang="en-US" sz="2200" dirty="0" smtClean="0"/>
+            <a:r>
+              <a:rPr lang="en-CA" dirty="0" smtClean="0"/>
+              <a:t>It's almost like dandelions: little fluffs of programs that do everything that conventional JavaScript programs do. You can't do anything in that language that you can't do in JavaScript, so it's all cosmetic. I don't know if all or much of that will find its way into JavaScript, because I'm not sure there's enough of a payoff there. But just as an experiment, as a design exercise, I think it's a brilliant piece of work. I'm excited to see stuff like that happening.</a:t>
+            </a:r>
+            <a:endParaRPr lang="en-US" dirty="0" smtClean="0"/>
           </a:p>
         </p:txBody>
       </p:sp>
@@ -6495,6 +7398,403 @@
               <a:buNone/>
             </a:pPr>
             <a:r>
+              <a:rPr lang="en-CA" sz="2200" dirty="0" smtClean="0"/>
+              <a:t>Microsoft's </a:t>
+            </a:r>
+            <a:r>
+              <a:rPr lang="en-CA" sz="2200" dirty="0" err="1" smtClean="0"/>
+              <a:t>TypeScript</a:t>
+            </a:r>
+            <a:r>
+              <a:rPr lang="en-CA" sz="2200" dirty="0" smtClean="0"/>
+              <a:t> may be the best of the many JavaScript front ends. It seems to generate the most attractive code. And I think it should take pressure off of the </a:t>
+            </a:r>
+            <a:r>
+              <a:rPr lang="en-CA" sz="2200" dirty="0" err="1" smtClean="0"/>
+              <a:t>ECMAScript</a:t>
+            </a:r>
+            <a:r>
+              <a:rPr lang="en-CA" sz="2200" dirty="0" smtClean="0"/>
+              <a:t> Standard for new features like type declarations and classes. Anders has shown that these can be provided nicely by a preprocessor, so there is no need to change the underlying language.</a:t>
+            </a:r>
+            <a:br>
+              <a:rPr lang="en-CA" sz="2200" dirty="0" smtClean="0"/>
+            </a:br>
+            <a:r>
+              <a:rPr lang="en-CA" sz="2200" dirty="0" smtClean="0"/>
+              <a:t/>
+            </a:r>
+            <a:br>
+              <a:rPr lang="en-CA" sz="2200" dirty="0" smtClean="0"/>
+            </a:br>
+            <a:r>
+              <a:rPr lang="en-CA" sz="2200" dirty="0" smtClean="0"/>
+              <a:t>I think that JavaScript's loose typing is one of its best features and that type checking is way overrated. </a:t>
+            </a:r>
+            <a:r>
+              <a:rPr lang="en-CA" sz="2200" dirty="0" err="1" smtClean="0"/>
+              <a:t>TypeScript</a:t>
+            </a:r>
+            <a:r>
+              <a:rPr lang="en-CA" sz="2200" dirty="0" smtClean="0"/>
+              <a:t> adds sweetness, but at a price. It is not a price I am willing to pay.﻿</a:t>
+            </a:r>
+          </a:p>
+          <a:p>
+            <a:endParaRPr lang="en-US" dirty="0" smtClean="0"/>
+          </a:p>
+          <a:p>
+            <a:pPr marL="0" indent="0">
+              <a:buFont typeface="Arial" panose="020B0604020202020204" pitchFamily="34" charset="0"/>
+              <a:buNone/>
+            </a:pPr>
+            <a:endParaRPr lang="en-US" dirty="0"/>
+          </a:p>
+        </p:txBody>
+      </p:sp>
+    </p:spTree>
+    <p:extLst>
+      <p:ext uri="{BB962C8B-B14F-4D97-AF65-F5344CB8AC3E}">
+        <p14:creationId xmlns:p14="http://schemas.microsoft.com/office/powerpoint/2010/main" val="3512428719"/>
+      </p:ext>
+    </p:extLst>
+  </p:cSld>
+  <p:clrMapOvr>
+    <a:masterClrMapping/>
+  </p:clrMapOvr>
+  <p:timing>
+    <p:tnLst>
+      <p:par>
+        <p:cTn id="1" dur="indefinite" restart="never" nodeType="tmRoot"/>
+      </p:par>
+    </p:tnLst>
+  </p:timing>
+</p:sld>
+</file>
+
+<file path=ppt/slides/slide23.xml><?xml version="1.0" encoding="utf-8"?>
+<p:sld xmlns:a="http://schemas.openxmlformats.org/drawingml/2006/main" xmlns:r="http://schemas.openxmlformats.org/officeDocument/2006/relationships" xmlns:p="http://schemas.openxmlformats.org/presentationml/2006/main">
+  <p:cSld>
+    <p:spTree>
+      <p:nvGrpSpPr>
+        <p:cNvPr id="1" name=""/>
+        <p:cNvGrpSpPr/>
+        <p:nvPr/>
+      </p:nvGrpSpPr>
+      <p:grpSpPr>
+        <a:xfrm>
+          <a:off x="0" y="0"/>
+          <a:ext cx="0" cy="0"/>
+          <a:chOff x="0" y="0"/>
+          <a:chExt cx="0" cy="0"/>
+        </a:xfrm>
+      </p:grpSpPr>
+      <p:sp>
+        <p:nvSpPr>
+          <p:cNvPr id="2" name="Title 1"/>
+          <p:cNvSpPr>
+            <a:spLocks noGrp="1"/>
+          </p:cNvSpPr>
+          <p:nvPr>
+            <p:ph type="title"/>
+          </p:nvPr>
+        </p:nvSpPr>
+        <p:spPr>
+          <a:xfrm>
+            <a:off x="838200" y="365126"/>
+            <a:ext cx="10515600" cy="714738"/>
+          </a:xfrm>
+        </p:spPr>
+        <p:txBody>
+          <a:bodyPr/>
+          <a:lstStyle/>
+          <a:p>
+            <a:r>
+              <a:rPr lang="en-US" dirty="0" smtClean="0"/>
+              <a:t>Brendan </a:t>
+            </a:r>
+            <a:r>
+              <a:rPr lang="en-US" dirty="0" err="1" smtClean="0"/>
+              <a:t>Eich</a:t>
+            </a:r>
+            <a:endParaRPr lang="en-US" dirty="0"/>
+          </a:p>
+        </p:txBody>
+      </p:sp>
+      <p:sp>
+        <p:nvSpPr>
+          <p:cNvPr id="3" name="Content Placeholder 2"/>
+          <p:cNvSpPr>
+            <a:spLocks noGrp="1"/>
+          </p:cNvSpPr>
+          <p:nvPr>
+            <p:ph idx="1"/>
+          </p:nvPr>
+        </p:nvSpPr>
+        <p:spPr>
+          <a:xfrm>
+            <a:off x="496389" y="1227909"/>
+            <a:ext cx="5538651" cy="4949054"/>
+          </a:xfrm>
+        </p:spPr>
+        <p:txBody>
+          <a:bodyPr>
+            <a:normAutofit/>
+          </a:bodyPr>
+          <a:lstStyle/>
+          <a:p>
+            <a:pPr marL="0" indent="0">
+              <a:buNone/>
+            </a:pPr>
+            <a:r>
+              <a:rPr lang="en-CA" sz="2600" dirty="0" err="1" smtClean="0"/>
+              <a:t>CoffeeScript</a:t>
+            </a:r>
+            <a:endParaRPr lang="en-CA" sz="2600" dirty="0"/>
+          </a:p>
+          <a:p>
+            <a:pPr marL="0" indent="0">
+              <a:buNone/>
+            </a:pPr>
+            <a:r>
+              <a:rPr lang="en-CA" sz="2200" dirty="0" smtClean="0"/>
+              <a:t>It helps to have thinks like </a:t>
+            </a:r>
+            <a:r>
+              <a:rPr lang="en-CA" sz="2200" dirty="0" err="1" smtClean="0"/>
+              <a:t>CoffeeScript</a:t>
+            </a:r>
+            <a:r>
+              <a:rPr lang="en-CA" sz="2200" dirty="0" smtClean="0"/>
+              <a:t> out there it isn’t overriding, it doesn’t tell us what we must to do, but it’s suggestive, and if we want to pave that cow path we can, and I’m in favor.</a:t>
+            </a:r>
+          </a:p>
+          <a:p>
+            <a:pPr marL="0" indent="0">
+              <a:buNone/>
+            </a:pPr>
+            <a:endParaRPr lang="en-CA" sz="2200" dirty="0"/>
+          </a:p>
+          <a:p>
+            <a:pPr marL="0" indent="0">
+              <a:buNone/>
+            </a:pPr>
+            <a:r>
+              <a:rPr lang="en-CA" sz="2200" dirty="0" smtClean="0"/>
+              <a:t>I advocated strongly for standardising prototypal inheritance à la </a:t>
+            </a:r>
+            <a:r>
+              <a:rPr lang="en-CA" sz="2200" dirty="0" err="1" smtClean="0"/>
+              <a:t>CoffeeScript’s</a:t>
+            </a:r>
+            <a:r>
+              <a:rPr lang="en-CA" sz="2200" dirty="0" smtClean="0"/>
+              <a:t> class, super and @ syntactic sugar.</a:t>
+            </a:r>
+            <a:endParaRPr lang="en-US" sz="2200" dirty="0" smtClean="0"/>
+          </a:p>
+        </p:txBody>
+      </p:sp>
+      <p:sp>
+        <p:nvSpPr>
+          <p:cNvPr id="4" name="Content Placeholder 2"/>
+          <p:cNvSpPr txBox="1">
+            <a:spLocks/>
+          </p:cNvSpPr>
+          <p:nvPr/>
+        </p:nvSpPr>
+        <p:spPr>
+          <a:xfrm>
+            <a:off x="6035040" y="1227909"/>
+            <a:ext cx="5860869" cy="4949054"/>
+          </a:xfrm>
+          <a:prstGeom prst="rect">
+            <a:avLst/>
+          </a:prstGeom>
+        </p:spPr>
+        <p:txBody>
+          <a:bodyPr vert="horz" lIns="91440" tIns="45720" rIns="91440" bIns="45720" rtlCol="0">
+            <a:normAutofit/>
+          </a:bodyPr>
+          <a:lstStyle>
+            <a:lvl1pPr marL="228600" indent="-228600" algn="l" defTabSz="914400" rtl="0" eaLnBrk="1" latinLnBrk="0" hangingPunct="1">
+              <a:lnSpc>
+                <a:spcPct val="90000"/>
+              </a:lnSpc>
+              <a:spcBef>
+                <a:spcPts val="1000"/>
+              </a:spcBef>
+              <a:buFont typeface="Arial" panose="020B0604020202020204" pitchFamily="34" charset="0"/>
+              <a:buChar char="•"/>
+              <a:defRPr sz="2800" kern="1200">
+                <a:solidFill>
+                  <a:schemeClr val="tx1"/>
+                </a:solidFill>
+                <a:latin typeface="+mn-lt"/>
+                <a:ea typeface="+mn-ea"/>
+                <a:cs typeface="+mn-cs"/>
+              </a:defRPr>
+            </a:lvl1pPr>
+            <a:lvl2pPr marL="685800" indent="-228600" algn="l" defTabSz="914400" rtl="0" eaLnBrk="1" latinLnBrk="0" hangingPunct="1">
+              <a:lnSpc>
+                <a:spcPct val="90000"/>
+              </a:lnSpc>
+              <a:spcBef>
+                <a:spcPts val="500"/>
+              </a:spcBef>
+              <a:buFont typeface="Arial" panose="020B0604020202020204" pitchFamily="34" charset="0"/>
+              <a:buChar char="•"/>
+              <a:defRPr sz="2400" kern="1200">
+                <a:solidFill>
+                  <a:schemeClr val="tx1"/>
+                </a:solidFill>
+                <a:latin typeface="+mn-lt"/>
+                <a:ea typeface="+mn-ea"/>
+                <a:cs typeface="+mn-cs"/>
+              </a:defRPr>
+            </a:lvl2pPr>
+            <a:lvl3pPr marL="1143000" indent="-228600" algn="l" defTabSz="914400" rtl="0" eaLnBrk="1" latinLnBrk="0" hangingPunct="1">
+              <a:lnSpc>
+                <a:spcPct val="90000"/>
+              </a:lnSpc>
+              <a:spcBef>
+                <a:spcPts val="500"/>
+              </a:spcBef>
+              <a:buFont typeface="Arial" panose="020B0604020202020204" pitchFamily="34" charset="0"/>
+              <a:buChar char="•"/>
+              <a:defRPr sz="2000" kern="1200">
+                <a:solidFill>
+                  <a:schemeClr val="tx1"/>
+                </a:solidFill>
+                <a:latin typeface="+mn-lt"/>
+                <a:ea typeface="+mn-ea"/>
+                <a:cs typeface="+mn-cs"/>
+              </a:defRPr>
+            </a:lvl3pPr>
+            <a:lvl4pPr marL="1600200" indent="-228600" algn="l" defTabSz="914400" rtl="0" eaLnBrk="1" latinLnBrk="0" hangingPunct="1">
+              <a:lnSpc>
+                <a:spcPct val="90000"/>
+              </a:lnSpc>
+              <a:spcBef>
+                <a:spcPts val="500"/>
+              </a:spcBef>
+              <a:buFont typeface="Arial" panose="020B0604020202020204" pitchFamily="34" charset="0"/>
+              <a:buChar char="•"/>
+              <a:defRPr sz="1800" kern="1200">
+                <a:solidFill>
+                  <a:schemeClr val="tx1"/>
+                </a:solidFill>
+                <a:latin typeface="+mn-lt"/>
+                <a:ea typeface="+mn-ea"/>
+                <a:cs typeface="+mn-cs"/>
+              </a:defRPr>
+            </a:lvl4pPr>
+            <a:lvl5pPr marL="2057400" indent="-228600" algn="l" defTabSz="914400" rtl="0" eaLnBrk="1" latinLnBrk="0" hangingPunct="1">
+              <a:lnSpc>
+                <a:spcPct val="90000"/>
+              </a:lnSpc>
+              <a:spcBef>
+                <a:spcPts val="500"/>
+              </a:spcBef>
+              <a:buFont typeface="Arial" panose="020B0604020202020204" pitchFamily="34" charset="0"/>
+              <a:buChar char="•"/>
+              <a:defRPr sz="1800" kern="1200">
+                <a:solidFill>
+                  <a:schemeClr val="tx1"/>
+                </a:solidFill>
+                <a:latin typeface="+mn-lt"/>
+                <a:ea typeface="+mn-ea"/>
+                <a:cs typeface="+mn-cs"/>
+              </a:defRPr>
+            </a:lvl5pPr>
+            <a:lvl6pPr marL="2514600" indent="-228600" algn="l" defTabSz="914400" rtl="0" eaLnBrk="1" latinLnBrk="0" hangingPunct="1">
+              <a:lnSpc>
+                <a:spcPct val="90000"/>
+              </a:lnSpc>
+              <a:spcBef>
+                <a:spcPts val="500"/>
+              </a:spcBef>
+              <a:buFont typeface="Arial" panose="020B0604020202020204" pitchFamily="34" charset="0"/>
+              <a:buChar char="•"/>
+              <a:defRPr sz="1800" kern="1200">
+                <a:solidFill>
+                  <a:schemeClr val="tx1"/>
+                </a:solidFill>
+                <a:latin typeface="+mn-lt"/>
+                <a:ea typeface="+mn-ea"/>
+                <a:cs typeface="+mn-cs"/>
+              </a:defRPr>
+            </a:lvl6pPr>
+            <a:lvl7pPr marL="2971800" indent="-228600" algn="l" defTabSz="914400" rtl="0" eaLnBrk="1" latinLnBrk="0" hangingPunct="1">
+              <a:lnSpc>
+                <a:spcPct val="90000"/>
+              </a:lnSpc>
+              <a:spcBef>
+                <a:spcPts val="500"/>
+              </a:spcBef>
+              <a:buFont typeface="Arial" panose="020B0604020202020204" pitchFamily="34" charset="0"/>
+              <a:buChar char="•"/>
+              <a:defRPr sz="1800" kern="1200">
+                <a:solidFill>
+                  <a:schemeClr val="tx1"/>
+                </a:solidFill>
+                <a:latin typeface="+mn-lt"/>
+                <a:ea typeface="+mn-ea"/>
+                <a:cs typeface="+mn-cs"/>
+              </a:defRPr>
+            </a:lvl7pPr>
+            <a:lvl8pPr marL="3429000" indent="-228600" algn="l" defTabSz="914400" rtl="0" eaLnBrk="1" latinLnBrk="0" hangingPunct="1">
+              <a:lnSpc>
+                <a:spcPct val="90000"/>
+              </a:lnSpc>
+              <a:spcBef>
+                <a:spcPts val="500"/>
+              </a:spcBef>
+              <a:buFont typeface="Arial" panose="020B0604020202020204" pitchFamily="34" charset="0"/>
+              <a:buChar char="•"/>
+              <a:defRPr sz="1800" kern="1200">
+                <a:solidFill>
+                  <a:schemeClr val="tx1"/>
+                </a:solidFill>
+                <a:latin typeface="+mn-lt"/>
+                <a:ea typeface="+mn-ea"/>
+                <a:cs typeface="+mn-cs"/>
+              </a:defRPr>
+            </a:lvl8pPr>
+            <a:lvl9pPr marL="3886200" indent="-228600" algn="l" defTabSz="914400" rtl="0" eaLnBrk="1" latinLnBrk="0" hangingPunct="1">
+              <a:lnSpc>
+                <a:spcPct val="90000"/>
+              </a:lnSpc>
+              <a:spcBef>
+                <a:spcPts val="500"/>
+              </a:spcBef>
+              <a:buFont typeface="Arial" panose="020B0604020202020204" pitchFamily="34" charset="0"/>
+              <a:buChar char="•"/>
+              <a:defRPr sz="1800" kern="1200">
+                <a:solidFill>
+                  <a:schemeClr val="tx1"/>
+                </a:solidFill>
+                <a:latin typeface="+mn-lt"/>
+                <a:ea typeface="+mn-ea"/>
+                <a:cs typeface="+mn-cs"/>
+              </a:defRPr>
+            </a:lvl9pPr>
+          </a:lstStyle>
+          <a:p>
+            <a:pPr marL="0" indent="0">
+              <a:buNone/>
+            </a:pPr>
+            <a:r>
+              <a:rPr lang="en-CA" sz="2600" dirty="0" err="1" smtClean="0"/>
+              <a:t>TypeScript</a:t>
+            </a:r>
+            <a:endParaRPr lang="en-CA" sz="2600" dirty="0" smtClean="0"/>
+          </a:p>
+          <a:p>
+            <a:pPr marL="0" indent="0">
+              <a:buNone/>
+            </a:pPr>
+            <a:r>
               <a:rPr lang="en-CA" sz="2200" dirty="0" err="1" smtClean="0"/>
               <a:t>TypeScript</a:t>
             </a:r>
@@ -6538,137 +7838,7 @@
 </p:sld>
 </file>
 
-<file path=ppt/slides/slide2.xml><?xml version="1.0" encoding="utf-8"?>
-<p:sld xmlns:a="http://schemas.openxmlformats.org/drawingml/2006/main" xmlns:r="http://schemas.openxmlformats.org/officeDocument/2006/relationships" xmlns:p="http://schemas.openxmlformats.org/presentationml/2006/main">
-  <p:cSld>
-    <p:spTree>
-      <p:nvGrpSpPr>
-        <p:cNvPr id="1" name=""/>
-        <p:cNvGrpSpPr/>
-        <p:nvPr/>
-      </p:nvGrpSpPr>
-      <p:grpSpPr>
-        <a:xfrm>
-          <a:off x="0" y="0"/>
-          <a:ext cx="0" cy="0"/>
-          <a:chOff x="0" y="0"/>
-          <a:chExt cx="0" cy="0"/>
-        </a:xfrm>
-      </p:grpSpPr>
-      <p:sp>
-        <p:nvSpPr>
-          <p:cNvPr id="2" name="Title 1"/>
-          <p:cNvSpPr>
-            <a:spLocks noGrp="1"/>
-          </p:cNvSpPr>
-          <p:nvPr>
-            <p:ph type="title"/>
-          </p:nvPr>
-        </p:nvSpPr>
-        <p:spPr>
-          <a:xfrm>
-            <a:off x="838200" y="365126"/>
-            <a:ext cx="10515600" cy="714738"/>
-          </a:xfrm>
-        </p:spPr>
-        <p:txBody>
-          <a:bodyPr/>
-          <a:lstStyle/>
-          <a:p>
-            <a:r>
-              <a:rPr lang="en-US" dirty="0" smtClean="0"/>
-              <a:t>Node.js and NPM</a:t>
-            </a:r>
-            <a:endParaRPr lang="en-US" dirty="0"/>
-          </a:p>
-        </p:txBody>
-      </p:sp>
-      <p:sp>
-        <p:nvSpPr>
-          <p:cNvPr id="3" name="Content Placeholder 2"/>
-          <p:cNvSpPr>
-            <a:spLocks noGrp="1"/>
-          </p:cNvSpPr>
-          <p:nvPr>
-            <p:ph idx="1"/>
-          </p:nvPr>
-        </p:nvSpPr>
-        <p:spPr>
-          <a:xfrm>
-            <a:off x="838200" y="1227909"/>
-            <a:ext cx="10515600" cy="4949054"/>
-          </a:xfrm>
-        </p:spPr>
-        <p:txBody>
-          <a:bodyPr>
-            <a:normAutofit/>
-          </a:bodyPr>
-          <a:lstStyle/>
-          <a:p>
-            <a:endParaRPr lang="en-US" dirty="0" smtClean="0"/>
-          </a:p>
-          <a:p>
-            <a:r>
-              <a:rPr lang="en-US" dirty="0" smtClean="0"/>
-              <a:t>Node.js is a scalable, server-side oriented platform for networking application and more (console and desktop)</a:t>
-            </a:r>
-          </a:p>
-          <a:p>
-            <a:pPr lvl="1"/>
-            <a:endParaRPr lang="en-US" dirty="0" smtClean="0"/>
-          </a:p>
-          <a:p>
-            <a:pPr lvl="1"/>
-            <a:r>
-              <a:rPr lang="en-US" dirty="0" smtClean="0"/>
-              <a:t>Written in C, C++, JavaScript</a:t>
-            </a:r>
-          </a:p>
-          <a:p>
-            <a:pPr lvl="1"/>
-            <a:r>
-              <a:rPr lang="en-US" dirty="0" smtClean="0"/>
-              <a:t>Supports V8, JavaScript engine</a:t>
-            </a:r>
-          </a:p>
-          <a:p>
-            <a:pPr lvl="1"/>
-            <a:r>
-              <a:rPr lang="en-US" dirty="0" smtClean="0"/>
-              <a:t>Contains built-in asynchronous I/O lib for file, socket and HTTP</a:t>
-            </a:r>
-          </a:p>
-          <a:p>
-            <a:endParaRPr lang="en-US" dirty="0" smtClean="0"/>
-          </a:p>
-          <a:p>
-            <a:r>
-              <a:rPr lang="en-US" dirty="0" smtClean="0"/>
-              <a:t>NPM is an official package manager for Node.js and it’s shipped with node since v0.6.3</a:t>
-            </a:r>
-          </a:p>
-          <a:p>
-            <a:endParaRPr lang="en-US" dirty="0" smtClean="0"/>
-          </a:p>
-          <a:p>
-            <a:endParaRPr lang="en-US" dirty="0"/>
-          </a:p>
-        </p:txBody>
-      </p:sp>
-    </p:spTree>
-    <p:extLst>
-      <p:ext uri="{BB962C8B-B14F-4D97-AF65-F5344CB8AC3E}">
-        <p14:creationId xmlns:p14="http://schemas.microsoft.com/office/powerpoint/2010/main" val="1522918781"/>
-      </p:ext>
-    </p:extLst>
-  </p:cSld>
-  <p:clrMapOvr>
-    <a:masterClrMapping/>
-  </p:clrMapOvr>
-</p:sld>
-</file>
-
-<file path=ppt/slides/slide20.xml><?xml version="1.0" encoding="utf-8"?>
+<file path=ppt/slides/slide24.xml><?xml version="1.0" encoding="utf-8"?>
 <p:sld xmlns:a="http://schemas.openxmlformats.org/drawingml/2006/main" xmlns:r="http://schemas.openxmlformats.org/officeDocument/2006/relationships" xmlns:p="http://schemas.openxmlformats.org/presentationml/2006/main">
   <p:cSld>
     <p:spTree>
@@ -6990,8 +8160,8 @@
         </p:nvSpPr>
         <p:spPr>
           <a:xfrm>
-            <a:off x="2607179" y="2894681"/>
-            <a:ext cx="7340125" cy="714738"/>
+            <a:off x="0" y="2894681"/>
+            <a:ext cx="12191999" cy="714738"/>
           </a:xfrm>
         </p:spPr>
         <p:txBody>
@@ -7218,48 +8388,30 @@
             </a:r>
           </a:p>
           <a:p>
-            <a:endParaRPr lang="fr-FR" dirty="0"/>
-          </a:p>
-          <a:p>
-            <a:r>
-              <a:rPr lang="fr-FR" dirty="0" smtClean="0"/>
+            <a:endParaRPr lang="en-US" dirty="0" smtClean="0"/>
+          </a:p>
+          <a:p>
+            <a:r>
+              <a:rPr lang="en-US" dirty="0" smtClean="0"/>
               <a:t>Is as </a:t>
             </a:r>
             <a:r>
-              <a:rPr lang="fr-FR" dirty="0" err="1" smtClean="0"/>
-              <a:t>easy</a:t>
-            </a:r>
-            <a:r>
-              <a:rPr lang="fr-FR" dirty="0" smtClean="0"/>
-              <a:t> for </a:t>
-            </a:r>
-            <a:r>
-              <a:rPr lang="fr-FR" dirty="0" err="1" smtClean="0"/>
-              <a:t>writing</a:t>
-            </a:r>
-            <a:r>
-              <a:rPr lang="fr-FR" dirty="0" smtClean="0"/>
-              <a:t> as for </a:t>
-            </a:r>
-            <a:r>
-              <a:rPr lang="fr-FR" dirty="0" err="1" smtClean="0"/>
-              <a:t>reading</a:t>
-            </a:r>
+              <a:rPr lang="en-US" dirty="0" smtClean="0"/>
+              <a:t>easy for writing </a:t>
+            </a:r>
+            <a:r>
+              <a:rPr lang="en-US" dirty="0" smtClean="0"/>
+              <a:t>as for reading</a:t>
+            </a:r>
+          </a:p>
+          <a:p>
             <a:endParaRPr lang="en-US" dirty="0" smtClean="0"/>
           </a:p>
           <a:p>
-            <a:endParaRPr lang="fr-FR" dirty="0" smtClean="0"/>
-          </a:p>
-          <a:p>
-            <a:r>
-              <a:rPr lang="fr-FR" dirty="0" smtClean="0"/>
-              <a:t>Good </a:t>
-            </a:r>
-            <a:r>
-              <a:rPr lang="fr-FR" dirty="0" err="1" smtClean="0"/>
-              <a:t>extensibility</a:t>
-            </a:r>
-            <a:endParaRPr lang="en-US" dirty="0" smtClean="0"/>
+            <a:r>
+              <a:rPr lang="en-US" dirty="0" smtClean="0"/>
+              <a:t>Good extensibility</a:t>
+            </a:r>
           </a:p>
           <a:p>
             <a:endParaRPr lang="en-US" dirty="0"/>
@@ -7460,7 +8612,6 @@
               <a:rPr lang="en-US" dirty="0" smtClean="0"/>
               <a:t>Easy to assimilate introduction video</a:t>
             </a:r>
-            <a:endParaRPr lang="en-US" dirty="0" smtClean="0"/>
           </a:p>
           <a:p>
             <a:endParaRPr lang="en-US" dirty="0" smtClean="0"/>
@@ -7470,7 +8621,6 @@
               <a:rPr lang="en-US" dirty="0" smtClean="0"/>
               <a:t>Reference to documentation and best practice</a:t>
             </a:r>
-            <a:endParaRPr lang="en-US" dirty="0" smtClean="0"/>
           </a:p>
           <a:p>
             <a:endParaRPr lang="en-US" dirty="0" smtClean="0"/>
@@ -7489,7 +8639,6 @@
               <a:rPr lang="en-US" dirty="0" smtClean="0"/>
               <a:t>Entire system seems to be completely different to 3 previous</a:t>
             </a:r>
-            <a:endParaRPr lang="en-US" dirty="0" smtClean="0"/>
           </a:p>
           <a:p>
             <a:endParaRPr lang="en-US" dirty="0" smtClean="0"/>

</xml_diff>

<commit_message>
[build.js] Finalize comparing of build systems
</commit_message>
<xml_diff>
--- a/build.js/build.js.pptx
+++ b/build.js/build.js.pptx
@@ -5,7 +5,7 @@
     <p:sldMasterId id="2147483648" r:id="rId1"/>
   </p:sldMasterIdLst>
   <p:notesMasterIdLst>
-    <p:notesMasterId r:id="rId26"/>
+    <p:notesMasterId r:id="rId23"/>
   </p:notesMasterIdLst>
   <p:sldIdLst>
     <p:sldId id="256" r:id="rId2"/>
@@ -23,15 +23,12 @@
     <p:sldId id="278" r:id="rId14"/>
     <p:sldId id="279" r:id="rId15"/>
     <p:sldId id="274" r:id="rId16"/>
-    <p:sldId id="275" r:id="rId17"/>
-    <p:sldId id="260" r:id="rId18"/>
-    <p:sldId id="261" r:id="rId19"/>
-    <p:sldId id="262" r:id="rId20"/>
-    <p:sldId id="263" r:id="rId21"/>
-    <p:sldId id="264" r:id="rId22"/>
-    <p:sldId id="265" r:id="rId23"/>
-    <p:sldId id="266" r:id="rId24"/>
-    <p:sldId id="267" r:id="rId25"/>
+    <p:sldId id="280" r:id="rId17"/>
+    <p:sldId id="281" r:id="rId18"/>
+    <p:sldId id="282" r:id="rId19"/>
+    <p:sldId id="283" r:id="rId20"/>
+    <p:sldId id="275" r:id="rId21"/>
+    <p:sldId id="267" r:id="rId22"/>
   </p:sldIdLst>
   <p:sldSz cx="12192000" cy="6858000"/>
   <p:notesSz cx="6858000" cy="9144000"/>
@@ -1301,7 +1298,7 @@
     </p:spTree>
     <p:extLst>
       <p:ext uri="{BB962C8B-B14F-4D97-AF65-F5344CB8AC3E}">
-        <p14:creationId xmlns:p14="http://schemas.microsoft.com/office/powerpoint/2010/main" val="2567141826"/>
+        <p14:creationId xmlns:p14="http://schemas.microsoft.com/office/powerpoint/2010/main" val="1095886477"/>
       </p:ext>
     </p:extLst>
   </p:cSld>
@@ -1359,14 +1356,6 @@
               <a:buFontTx/>
               <a:buChar char="-"/>
             </a:pPr>
-            <a:r>
-              <a:rPr lang="en-US" dirty="0" smtClean="0"/>
-              <a:t>Brendan saved us form </a:t>
-            </a:r>
-            <a:r>
-              <a:rPr lang="en-US" dirty="0" err="1" smtClean="0"/>
-              <a:t>vbscript</a:t>
-            </a:r>
             <a:endParaRPr lang="en-US" dirty="0"/>
           </a:p>
         </p:txBody>
@@ -1397,7 +1386,7 @@
     </p:spTree>
     <p:extLst>
       <p:ext uri="{BB962C8B-B14F-4D97-AF65-F5344CB8AC3E}">
-        <p14:creationId xmlns:p14="http://schemas.microsoft.com/office/powerpoint/2010/main" val="1526428441"/>
+        <p14:creationId xmlns:p14="http://schemas.microsoft.com/office/powerpoint/2010/main" val="3220566164"/>
       </p:ext>
     </p:extLst>
   </p:cSld>
@@ -1485,7 +1474,7 @@
     </p:spTree>
     <p:extLst>
       <p:ext uri="{BB962C8B-B14F-4D97-AF65-F5344CB8AC3E}">
-        <p14:creationId xmlns:p14="http://schemas.microsoft.com/office/powerpoint/2010/main" val="2831815247"/>
+        <p14:creationId xmlns:p14="http://schemas.microsoft.com/office/powerpoint/2010/main" val="1936090759"/>
       </p:ext>
     </p:extLst>
   </p:cSld>
@@ -1573,7 +1562,7 @@
     </p:spTree>
     <p:extLst>
       <p:ext uri="{BB962C8B-B14F-4D97-AF65-F5344CB8AC3E}">
-        <p14:creationId xmlns:p14="http://schemas.microsoft.com/office/powerpoint/2010/main" val="2167955836"/>
+        <p14:creationId xmlns:p14="http://schemas.microsoft.com/office/powerpoint/2010/main" val="3579418191"/>
       </p:ext>
     </p:extLst>
   </p:cSld>
@@ -1627,6 +1616,14 @@
           <a:bodyPr/>
           <a:lstStyle/>
           <a:p>
+            <a:pPr lvl="1"/>
+            <a:endParaRPr lang="en-US" dirty="0" smtClean="0"/>
+          </a:p>
+          <a:p>
+            <a:pPr lvl="1"/>
+            <a:endParaRPr lang="en-US" dirty="0" smtClean="0"/>
+          </a:p>
+          <a:p>
             <a:pPr marL="171450" indent="-171450">
               <a:buFontTx/>
               <a:buChar char="-"/>
@@ -1652,7 +1649,7 @@
           <a:p>
             <a:fld id="{1248D640-4A2F-4A8C-8E2D-3C6025A34183}" type="slidenum">
               <a:rPr lang="en-US" smtClean="0"/>
-              <a:t>22</a:t>
+              <a:t>20</a:t>
             </a:fld>
             <a:endParaRPr lang="en-US"/>
           </a:p>
@@ -1661,7 +1658,7 @@
     </p:spTree>
     <p:extLst>
       <p:ext uri="{BB962C8B-B14F-4D97-AF65-F5344CB8AC3E}">
-        <p14:creationId xmlns:p14="http://schemas.microsoft.com/office/powerpoint/2010/main" val="57330581"/>
+        <p14:creationId xmlns:p14="http://schemas.microsoft.com/office/powerpoint/2010/main" val="2567141826"/>
       </p:ext>
     </p:extLst>
   </p:cSld>
@@ -1746,94 +1743,6 @@
     <p:extLst>
       <p:ext uri="{BB962C8B-B14F-4D97-AF65-F5344CB8AC3E}">
         <p14:creationId xmlns:p14="http://schemas.microsoft.com/office/powerpoint/2010/main" val="1155058327"/>
-      </p:ext>
-    </p:extLst>
-  </p:cSld>
-  <p:clrMapOvr>
-    <a:masterClrMapping/>
-  </p:clrMapOvr>
-</p:notes>
-</file>
-
-<file path=ppt/notesSlides/notesSlide20.xml><?xml version="1.0" encoding="utf-8"?>
-<p:notes xmlns:a="http://schemas.openxmlformats.org/drawingml/2006/main" xmlns:r="http://schemas.openxmlformats.org/officeDocument/2006/relationships" xmlns:p="http://schemas.openxmlformats.org/presentationml/2006/main">
-  <p:cSld>
-    <p:spTree>
-      <p:nvGrpSpPr>
-        <p:cNvPr id="1" name=""/>
-        <p:cNvGrpSpPr/>
-        <p:nvPr/>
-      </p:nvGrpSpPr>
-      <p:grpSpPr>
-        <a:xfrm>
-          <a:off x="0" y="0"/>
-          <a:ext cx="0" cy="0"/>
-          <a:chOff x="0" y="0"/>
-          <a:chExt cx="0" cy="0"/>
-        </a:xfrm>
-      </p:grpSpPr>
-      <p:sp>
-        <p:nvSpPr>
-          <p:cNvPr id="2" name="Slide Image Placeholder 1"/>
-          <p:cNvSpPr>
-            <a:spLocks noGrp="1" noRot="1" noChangeAspect="1"/>
-          </p:cNvSpPr>
-          <p:nvPr>
-            <p:ph type="sldImg"/>
-          </p:nvPr>
-        </p:nvSpPr>
-        <p:spPr/>
-      </p:sp>
-      <p:sp>
-        <p:nvSpPr>
-          <p:cNvPr id="3" name="Notes Placeholder 2"/>
-          <p:cNvSpPr>
-            <a:spLocks noGrp="1"/>
-          </p:cNvSpPr>
-          <p:nvPr>
-            <p:ph type="body" idx="1"/>
-          </p:nvPr>
-        </p:nvSpPr>
-        <p:spPr/>
-        <p:txBody>
-          <a:bodyPr/>
-          <a:lstStyle/>
-          <a:p>
-            <a:pPr marL="171450" indent="-171450">
-              <a:buFontTx/>
-              <a:buChar char="-"/>
-            </a:pPr>
-            <a:endParaRPr lang="en-US" dirty="0"/>
-          </a:p>
-        </p:txBody>
-      </p:sp>
-      <p:sp>
-        <p:nvSpPr>
-          <p:cNvPr id="4" name="Slide Number Placeholder 3"/>
-          <p:cNvSpPr>
-            <a:spLocks noGrp="1"/>
-          </p:cNvSpPr>
-          <p:nvPr>
-            <p:ph type="sldNum" sz="quarter" idx="10"/>
-          </p:nvPr>
-        </p:nvSpPr>
-        <p:spPr/>
-        <p:txBody>
-          <a:bodyPr/>
-          <a:lstStyle/>
-          <a:p>
-            <a:fld id="{1248D640-4A2F-4A8C-8E2D-3C6025A34183}" type="slidenum">
-              <a:rPr lang="en-US" smtClean="0"/>
-              <a:t>23</a:t>
-            </a:fld>
-            <a:endParaRPr lang="en-US"/>
-          </a:p>
-        </p:txBody>
-      </p:sp>
-    </p:spTree>
-    <p:extLst>
-      <p:ext uri="{BB962C8B-B14F-4D97-AF65-F5344CB8AC3E}">
-        <p14:creationId xmlns:p14="http://schemas.microsoft.com/office/powerpoint/2010/main" val="481549292"/>
       </p:ext>
     </p:extLst>
   </p:cSld>
@@ -6354,26 +6263,97 @@
         </p:nvSpPr>
         <p:spPr>
           <a:xfrm>
-            <a:off x="0" y="2894681"/>
-            <a:ext cx="12191999" cy="714738"/>
+            <a:off x="838200" y="365126"/>
+            <a:ext cx="10515600" cy="714738"/>
           </a:xfrm>
         </p:spPr>
         <p:txBody>
           <a:bodyPr/>
           <a:lstStyle/>
           <a:p>
-            <a:pPr algn="ctr"/>
-            <a:r>
-              <a:rPr lang="en-US" dirty="0"/>
-              <a:t>Extensions and extensibility</a:t>
-            </a:r>
+            <a:r>
+              <a:rPr lang="en-US" dirty="0" smtClean="0"/>
+              <a:t>Grunt</a:t>
+            </a:r>
+            <a:endParaRPr lang="en-US" dirty="0"/>
+          </a:p>
+        </p:txBody>
+      </p:sp>
+      <p:sp>
+        <p:nvSpPr>
+          <p:cNvPr id="3" name="Content Placeholder 2"/>
+          <p:cNvSpPr>
+            <a:spLocks noGrp="1"/>
+          </p:cNvSpPr>
+          <p:nvPr>
+            <p:ph idx="1"/>
+          </p:nvPr>
+        </p:nvSpPr>
+        <p:spPr>
+          <a:xfrm>
+            <a:off x="838200" y="1227909"/>
+            <a:ext cx="10515600" cy="4949054"/>
+          </a:xfrm>
+        </p:spPr>
+        <p:txBody>
+          <a:bodyPr/>
+          <a:lstStyle/>
+          <a:p>
+            <a:endParaRPr lang="en-US" dirty="0" smtClean="0"/>
+          </a:p>
+          <a:p>
+            <a:r>
+              <a:rPr lang="en-US" dirty="0" smtClean="0"/>
+              <a:t>Documentation seems to be complete</a:t>
+            </a:r>
+            <a:endParaRPr lang="en-US" dirty="0" smtClean="0"/>
+          </a:p>
+          <a:p>
+            <a:endParaRPr lang="en-US" dirty="0" smtClean="0"/>
+          </a:p>
+          <a:p>
+            <a:r>
+              <a:rPr lang="en-US" dirty="0" smtClean="0"/>
+              <a:t>All you need can be found on the project site</a:t>
+            </a:r>
+            <a:endParaRPr lang="en-US" dirty="0" smtClean="0"/>
+          </a:p>
+          <a:p>
+            <a:endParaRPr lang="en-US" dirty="0" smtClean="0"/>
+          </a:p>
+          <a:p>
+            <a:r>
+              <a:rPr lang="en-US" dirty="0" smtClean="0"/>
+              <a:t>Excellent documentation state (simply and explicitly)</a:t>
+            </a:r>
+            <a:endParaRPr lang="en-US" dirty="0" smtClean="0"/>
+          </a:p>
+          <a:p>
+            <a:endParaRPr lang="en-US" dirty="0" smtClean="0"/>
+          </a:p>
+          <a:p>
+            <a:r>
+              <a:rPr lang="en-US" dirty="0" smtClean="0"/>
+              <a:t>No screencasts</a:t>
+            </a:r>
+            <a:endParaRPr lang="en-US" dirty="0" smtClean="0"/>
+          </a:p>
+          <a:p>
+            <a:pPr lvl="1"/>
+            <a:endParaRPr lang="en-US" dirty="0" smtClean="0"/>
+          </a:p>
+          <a:p>
+            <a:endParaRPr lang="en-US" dirty="0" smtClean="0"/>
+          </a:p>
+          <a:p>
+            <a:endParaRPr lang="en-US" dirty="0" smtClean="0"/>
           </a:p>
         </p:txBody>
       </p:sp>
     </p:spTree>
     <p:extLst>
       <p:ext uri="{BB962C8B-B14F-4D97-AF65-F5344CB8AC3E}">
-        <p14:creationId xmlns:p14="http://schemas.microsoft.com/office/powerpoint/2010/main" val="2507215514"/>
+        <p14:creationId xmlns:p14="http://schemas.microsoft.com/office/powerpoint/2010/main" val="746732109"/>
       </p:ext>
     </p:extLst>
   </p:cSld>
@@ -6422,7 +6402,7 @@
           <a:p>
             <a:r>
               <a:rPr lang="en-US" dirty="0" smtClean="0"/>
-              <a:t>Allah speaking …</a:t>
+              <a:t>Gulp</a:t>
             </a:r>
             <a:endParaRPr lang="en-US" dirty="0"/>
           </a:p>
@@ -6445,81 +6425,67 @@
           </a:xfrm>
         </p:spPr>
         <p:txBody>
-          <a:bodyPr/>
-          <a:lstStyle/>
-          <a:p>
-            <a:endParaRPr lang="en-US" dirty="0" smtClean="0"/>
-          </a:p>
-          <a:p>
-            <a:pPr marL="0" indent="0">
-              <a:buNone/>
-            </a:pPr>
+          <a:bodyPr>
+            <a:normAutofit lnSpcReduction="10000"/>
+          </a:bodyPr>
+          <a:lstStyle/>
+          <a:p>
+            <a:endParaRPr lang="en-US" dirty="0" smtClean="0"/>
+          </a:p>
+          <a:p>
             <a:r>
               <a:rPr lang="en-US" dirty="0" smtClean="0"/>
-              <a:t>JavaScript had to look like Java only less so, be Java’s dumb kid brother or boy-hostage sidekick.</a:t>
-            </a:r>
-          </a:p>
-          <a:p>
-            <a:pPr marL="0" indent="0">
-              <a:buNone/>
-            </a:pPr>
+              <a:t>Almost the same level that Grunt</a:t>
+            </a:r>
+            <a:endParaRPr lang="en-US" dirty="0" smtClean="0"/>
+          </a:p>
+          <a:p>
+            <a:endParaRPr lang="en-US" dirty="0" smtClean="0"/>
+          </a:p>
+          <a:p>
+            <a:r>
+              <a:rPr lang="en-US" dirty="0" smtClean="0"/>
+              <a:t>Documentation can be found on </a:t>
+            </a:r>
+            <a:r>
+              <a:rPr lang="en-US" dirty="0" err="1" smtClean="0"/>
+              <a:t>github</a:t>
+            </a:r>
+            <a:endParaRPr lang="en-US" dirty="0" smtClean="0"/>
+          </a:p>
+          <a:p>
+            <a:endParaRPr lang="en-US" dirty="0" smtClean="0"/>
+          </a:p>
+          <a:p>
+            <a:r>
+              <a:rPr lang="en-US" dirty="0" smtClean="0"/>
+              <a:t>Lack of ready samples to get starting</a:t>
+            </a:r>
+          </a:p>
+          <a:p>
+            <a:endParaRPr lang="en-US" dirty="0" smtClean="0"/>
+          </a:p>
+          <a:p>
+            <a:r>
+              <a:rPr lang="en-US" dirty="0"/>
+              <a:t>No straight </a:t>
+            </a:r>
+            <a:r>
+              <a:rPr lang="en-US" dirty="0" smtClean="0"/>
+              <a:t>guidelines to get starting</a:t>
+            </a:r>
+          </a:p>
+          <a:p>
             <a:endParaRPr lang="en-US" dirty="0"/>
           </a:p>
           <a:p>
-            <a:pPr marL="0" indent="0">
-              <a:buNone/>
-            </a:pPr>
             <a:r>
               <a:rPr lang="en-US" dirty="0" smtClean="0"/>
-              <a:t>Plus, I had to be done in ten days or something worse than </a:t>
-            </a:r>
-            <a:r>
-              <a:rPr lang="en-US" dirty="0" err="1" smtClean="0"/>
-              <a:t>Javascript</a:t>
-            </a:r>
-            <a:r>
-              <a:rPr lang="en-US" dirty="0" smtClean="0"/>
-              <a:t> would have happened.</a:t>
-            </a:r>
-          </a:p>
-          <a:p>
-            <a:pPr marL="0" indent="0">
-              <a:buNone/>
-            </a:pPr>
-            <a:endParaRPr lang="en-US" dirty="0"/>
-          </a:p>
-          <a:p>
-            <a:pPr marL="0" indent="0">
-              <a:buNone/>
-            </a:pPr>
-            <a:r>
-              <a:rPr lang="en-CA" dirty="0" smtClean="0"/>
-              <a:t>I'll do better in the next life.</a:t>
-            </a:r>
-            <a:endParaRPr lang="en-US" dirty="0" smtClean="0"/>
-          </a:p>
-          <a:p>
-            <a:pPr marL="0" indent="0">
-              <a:buNone/>
-            </a:pPr>
-            <a:endParaRPr lang="en-US" dirty="0"/>
-          </a:p>
-          <a:p>
-            <a:pPr marL="0" indent="0" algn="r">
-              <a:buNone/>
-            </a:pPr>
-            <a:r>
-              <a:rPr lang="en-US" dirty="0" smtClean="0"/>
-              <a:t>Brendan </a:t>
-            </a:r>
-            <a:r>
-              <a:rPr lang="en-US" dirty="0" err="1" smtClean="0"/>
-              <a:t>Eich</a:t>
-            </a:r>
-            <a:r>
-              <a:rPr lang="en-US" dirty="0" smtClean="0"/>
-              <a:t> (creator of JavaScript)</a:t>
-            </a:r>
+              <a:t>Can be tricky for build-system beginners</a:t>
+            </a:r>
+            <a:endParaRPr lang="en-US" dirty="0" smtClean="0"/>
+          </a:p>
+          <a:p>
             <a:endParaRPr lang="en-US" dirty="0"/>
           </a:p>
         </p:txBody>
@@ -6527,7 +6493,7 @@
     </p:spTree>
     <p:extLst>
       <p:ext uri="{BB962C8B-B14F-4D97-AF65-F5344CB8AC3E}">
-        <p14:creationId xmlns:p14="http://schemas.microsoft.com/office/powerpoint/2010/main" val="4049175971"/>
+        <p14:creationId xmlns:p14="http://schemas.microsoft.com/office/powerpoint/2010/main" val="3820729847"/>
       </p:ext>
     </p:extLst>
   </p:cSld>
@@ -6576,7 +6542,7 @@
           <a:p>
             <a:r>
               <a:rPr lang="en-US" dirty="0" smtClean="0"/>
-              <a:t>Coffee in the real life</a:t>
+              <a:t>Gear</a:t>
             </a:r>
             <a:endParaRPr lang="en-US" dirty="0"/>
           </a:p>
@@ -6602,101 +6568,60 @@
           <a:bodyPr/>
           <a:lstStyle/>
           <a:p>
-            <a:endParaRPr lang="en-US" dirty="0" smtClean="0"/>
+            <a:endParaRPr lang="fr-FR" dirty="0" smtClean="0"/>
           </a:p>
           <a:p>
             <a:r>
               <a:rPr lang="en-US" dirty="0" smtClean="0"/>
-              <a:t>Open-source, hosted on </a:t>
+              <a:t>Not for humans</a:t>
+            </a:r>
+            <a:r>
+              <a:rPr lang="en-US" dirty="0" smtClean="0"/>
+              <a:t> </a:t>
+            </a:r>
+            <a:endParaRPr lang="en-US" dirty="0" smtClean="0"/>
+          </a:p>
+          <a:p>
+            <a:endParaRPr lang="en-US" dirty="0" smtClean="0"/>
+          </a:p>
+          <a:p>
+            <a:r>
+              <a:rPr lang="en-US" dirty="0" smtClean="0"/>
+              <a:t>Just an API collection, you need, you do</a:t>
+            </a:r>
+            <a:endParaRPr lang="en-US" dirty="0" smtClean="0"/>
+          </a:p>
+          <a:p>
+            <a:endParaRPr lang="en-US" dirty="0" smtClean="0"/>
+          </a:p>
+          <a:p>
+            <a:r>
+              <a:rPr lang="en-US" dirty="0" smtClean="0"/>
+              <a:t>Hard to find any information </a:t>
+            </a:r>
+            <a:r>
+              <a:rPr lang="en-US" dirty="0" smtClean="0"/>
+              <a:t>on internet (</a:t>
             </a:r>
             <a:r>
               <a:rPr lang="en-US" dirty="0" err="1" smtClean="0"/>
-              <a:t>Github</a:t>
-            </a:r>
-            <a:endParaRPr lang="en-US" dirty="0" smtClean="0"/>
-          </a:p>
-          <a:p>
-            <a:endParaRPr lang="en-US" dirty="0" smtClean="0"/>
-          </a:p>
-          <a:p>
+              <a:t>sharepoint</a:t>
+            </a:r>
             <a:r>
               <a:rPr lang="en-US" dirty="0" smtClean="0"/>
-              <a:t>11</a:t>
-            </a:r>
-            <a:r>
-              <a:rPr lang="en-US" baseline="30000" dirty="0" smtClean="0"/>
-              <a:t>th</a:t>
-            </a:r>
-            <a:r>
-              <a:rPr lang="en-US" dirty="0" smtClean="0"/>
-              <a:t> most popular language on </a:t>
-            </a:r>
-            <a:r>
-              <a:rPr lang="en-US" dirty="0" err="1" smtClean="0"/>
-              <a:t>Github</a:t>
-            </a:r>
-            <a:endParaRPr lang="en-US" dirty="0" smtClean="0"/>
-          </a:p>
-          <a:p>
-            <a:endParaRPr lang="en-US" dirty="0" smtClean="0"/>
-          </a:p>
-          <a:p>
-            <a:r>
-              <a:rPr lang="en-US" dirty="0" smtClean="0"/>
-              <a:t>How did Coffee  get its name?</a:t>
-            </a:r>
-          </a:p>
-          <a:p>
-            <a:pPr lvl="1"/>
-            <a:r>
-              <a:rPr lang="en-US" dirty="0" smtClean="0"/>
-              <a:t>Coffee was designed to become “</a:t>
-            </a:r>
-            <a:r>
-              <a:rPr lang="en-US" dirty="0" err="1" smtClean="0"/>
-              <a:t>Unfancy</a:t>
-            </a:r>
-            <a:r>
-              <a:rPr lang="en-US" dirty="0"/>
-              <a:t> </a:t>
-            </a:r>
-            <a:r>
-              <a:rPr lang="en-US" dirty="0" smtClean="0"/>
-              <a:t>JavaScript”. Java is a fancy word for coffee, so </a:t>
-            </a:r>
-            <a:r>
-              <a:rPr lang="en-US" dirty="0" err="1" smtClean="0"/>
-              <a:t>unfancy</a:t>
-            </a:r>
-            <a:r>
-              <a:rPr lang="en-US" dirty="0" smtClean="0"/>
-              <a:t> JavaScript is </a:t>
-            </a:r>
-            <a:r>
-              <a:rPr lang="en-US" dirty="0" err="1" smtClean="0"/>
-              <a:t>CoffeeScript</a:t>
-            </a:r>
-            <a:r>
-              <a:rPr lang="en-US" dirty="0"/>
-              <a:t>.</a:t>
-            </a:r>
-            <a:endParaRPr lang="en-US" dirty="0" smtClean="0"/>
-          </a:p>
-          <a:p>
-            <a:endParaRPr lang="en-US" dirty="0" smtClean="0"/>
-          </a:p>
-          <a:p>
-            <a:pPr marL="0" indent="0">
-              <a:buNone/>
-            </a:pPr>
-            <a:endParaRPr lang="en-US" dirty="0"/>
+              <a:t> spirit)</a:t>
+            </a:r>
+            <a:endParaRPr lang="en-US" dirty="0" smtClean="0"/>
+          </a:p>
+          <a:p>
+            <a:endParaRPr lang="en-US" dirty="0" smtClean="0"/>
           </a:p>
         </p:txBody>
       </p:sp>
     </p:spTree>
     <p:extLst>
       <p:ext uri="{BB962C8B-B14F-4D97-AF65-F5344CB8AC3E}">
-        <p14:creationId xmlns:p14="http://schemas.microsoft.com/office/powerpoint/2010/main" val="405746719"/>
+        <p14:creationId xmlns:p14="http://schemas.microsoft.com/office/powerpoint/2010/main" val="3939397954"/>
       </p:ext>
     </p:extLst>
   </p:cSld>
@@ -6745,7 +6670,7 @@
           <a:p>
             <a:r>
               <a:rPr lang="en-US" dirty="0" smtClean="0"/>
-              <a:t>Typescript as rival?</a:t>
+              <a:t>Brunch</a:t>
             </a:r>
             <a:endParaRPr lang="en-US" dirty="0"/>
           </a:p>
@@ -6771,25 +6696,48 @@
           <a:bodyPr/>
           <a:lstStyle/>
           <a:p>
-            <a:endParaRPr lang="en-US" dirty="0" smtClean="0"/>
+            <a:endParaRPr lang="fr-FR" dirty="0" smtClean="0"/>
           </a:p>
           <a:p>
             <a:r>
               <a:rPr lang="en-US" dirty="0" smtClean="0"/>
-              <a:t>Created in October 2012, but still in preview</a:t>
-            </a:r>
-          </a:p>
-          <a:p>
-            <a:endParaRPr lang="en-US" dirty="0" smtClean="0"/>
-          </a:p>
-          <a:p>
+              <a:t>5 files in </a:t>
+            </a:r>
+            <a:r>
+              <a:rPr lang="en-US" dirty="0" err="1" smtClean="0"/>
+              <a:t>git</a:t>
+            </a:r>
             <a:r>
               <a:rPr lang="en-US" dirty="0" smtClean="0"/>
-              <a:t>Open-source, hosted on </a:t>
-            </a:r>
-            <a:r>
-              <a:rPr lang="en-US" dirty="0" err="1" smtClean="0"/>
-              <a:t>CodePlex</a:t>
+              <a:t> repository with detailed description</a:t>
+            </a:r>
+            <a:endParaRPr lang="en-US" dirty="0" smtClean="0"/>
+          </a:p>
+          <a:p>
+            <a:endParaRPr lang="en-US" dirty="0" smtClean="0"/>
+          </a:p>
+          <a:p>
+            <a:r>
+              <a:rPr lang="en-US" dirty="0" smtClean="0"/>
+              <a:t>1 FAQ</a:t>
+            </a:r>
+            <a:endParaRPr lang="en-US" dirty="0" smtClean="0"/>
+          </a:p>
+          <a:p>
+            <a:endParaRPr lang="en-US" dirty="0" smtClean="0"/>
+          </a:p>
+          <a:p>
+            <a:r>
+              <a:rPr lang="en-US" dirty="0" smtClean="0"/>
+              <a:t>Simple </a:t>
+            </a:r>
+            <a:r>
+              <a:rPr lang="en-US" dirty="0"/>
+              <a:t>and </a:t>
+            </a:r>
+            <a:r>
+              <a:rPr lang="en-US" dirty="0" smtClean="0"/>
+              <a:t>explicit information</a:t>
             </a:r>
             <a:endParaRPr lang="en-US" dirty="0" smtClean="0"/>
           </a:p>
@@ -6798,46 +6746,20 @@
           </a:p>
           <a:p>
             <a:r>
-              <a:rPr lang="en-US" dirty="0" smtClean="0"/>
-              <a:t>Not in the top 90 languages on </a:t>
-            </a:r>
-            <a:r>
-              <a:rPr lang="en-US" dirty="0" err="1" smtClean="0"/>
-              <a:t>Github</a:t>
-            </a:r>
-            <a:endParaRPr lang="en-US" dirty="0" smtClean="0"/>
-          </a:p>
-          <a:p>
-            <a:endParaRPr lang="en-US" dirty="0"/>
-          </a:p>
-          <a:p>
-            <a:r>
-              <a:rPr lang="en-US" dirty="0" err="1" smtClean="0"/>
-              <a:t>Transcompiles</a:t>
-            </a:r>
-            <a:r>
-              <a:rPr lang="en-US" dirty="0" smtClean="0"/>
-              <a:t> to JavaScript  (ES3 and ES6)</a:t>
-            </a:r>
-          </a:p>
-          <a:p>
-            <a:endParaRPr lang="en-US" dirty="0" smtClean="0"/>
-          </a:p>
-          <a:p>
-            <a:endParaRPr lang="en-US" dirty="0" smtClean="0"/>
-          </a:p>
-          <a:p>
-            <a:pPr marL="0" indent="0">
-              <a:buNone/>
-            </a:pPr>
-            <a:endParaRPr lang="en-US" dirty="0"/>
+              <a:rPr lang="en-US" smtClean="0"/>
+              <a:t>Not</a:t>
+            </a:r>
+            <a:endParaRPr lang="en-US" dirty="0" smtClean="0"/>
+          </a:p>
+          <a:p>
+            <a:endParaRPr lang="en-US" dirty="0" smtClean="0"/>
           </a:p>
         </p:txBody>
       </p:sp>
     </p:spTree>
     <p:extLst>
       <p:ext uri="{BB962C8B-B14F-4D97-AF65-F5344CB8AC3E}">
-        <p14:creationId xmlns:p14="http://schemas.microsoft.com/office/powerpoint/2010/main" val="3172609909"/>
+        <p14:creationId xmlns:p14="http://schemas.microsoft.com/office/powerpoint/2010/main" val="1220935949"/>
       </p:ext>
     </p:extLst>
   </p:cSld>
@@ -6994,36 +6916,38 @@
           <a:chExt cx="0" cy="0"/>
         </a:xfrm>
       </p:grpSpPr>
-      <p:pic>
-        <p:nvPicPr>
-          <p:cNvPr id="4" name="Content Placeholder 3"/>
-          <p:cNvPicPr>
-            <a:picLocks noGrp="1" noChangeAspect="1"/>
-          </p:cNvPicPr>
-          <p:nvPr>
-            <p:ph idx="1"/>
-          </p:nvPr>
-        </p:nvPicPr>
-        <p:blipFill>
-          <a:blip r:embed="rId2"/>
-          <a:stretch>
-            <a:fillRect/>
-          </a:stretch>
-        </p:blipFill>
+      <p:sp>
+        <p:nvSpPr>
+          <p:cNvPr id="2" name="Title 1"/>
+          <p:cNvSpPr>
+            <a:spLocks noGrp="1"/>
+          </p:cNvSpPr>
+          <p:nvPr>
+            <p:ph type="title"/>
+          </p:nvPr>
+        </p:nvSpPr>
         <p:spPr>
           <a:xfrm>
-            <a:off x="2358486" y="443820"/>
-            <a:ext cx="7178936" cy="5689600"/>
+            <a:off x="0" y="2894681"/>
+            <a:ext cx="12191999" cy="714738"/>
           </a:xfrm>
-          <a:prstGeom prst="rect">
-            <a:avLst/>
-          </a:prstGeom>
         </p:spPr>
-      </p:pic>
+        <p:txBody>
+          <a:bodyPr/>
+          <a:lstStyle/>
+          <a:p>
+            <a:pPr algn="ctr"/>
+            <a:r>
+              <a:rPr lang="en-US" dirty="0"/>
+              <a:t>Extensions and extensibility</a:t>
+            </a:r>
+          </a:p>
+        </p:txBody>
+      </p:sp>
     </p:spTree>
     <p:extLst>
       <p:ext uri="{BB962C8B-B14F-4D97-AF65-F5344CB8AC3E}">
-        <p14:creationId xmlns:p14="http://schemas.microsoft.com/office/powerpoint/2010/main" val="1643599696"/>
+        <p14:creationId xmlns:p14="http://schemas.microsoft.com/office/powerpoint/2010/main" val="2507215514"/>
       </p:ext>
     </p:extLst>
   </p:cSld>
@@ -7034,811 +6958,6 @@
 </file>
 
 <file path=ppt/slides/slide21.xml><?xml version="1.0" encoding="utf-8"?>
-<p:sld xmlns:a="http://schemas.openxmlformats.org/drawingml/2006/main" xmlns:r="http://schemas.openxmlformats.org/officeDocument/2006/relationships" xmlns:p="http://schemas.openxmlformats.org/presentationml/2006/main">
-  <p:cSld>
-    <p:spTree>
-      <p:nvGrpSpPr>
-        <p:cNvPr id="1" name=""/>
-        <p:cNvGrpSpPr/>
-        <p:nvPr/>
-      </p:nvGrpSpPr>
-      <p:grpSpPr>
-        <a:xfrm>
-          <a:off x="0" y="0"/>
-          <a:ext cx="0" cy="0"/>
-          <a:chOff x="0" y="0"/>
-          <a:chExt cx="0" cy="0"/>
-        </a:xfrm>
-      </p:grpSpPr>
-      <p:pic>
-        <p:nvPicPr>
-          <p:cNvPr id="4" name="Content Placeholder 3"/>
-          <p:cNvPicPr>
-            <a:picLocks noGrp="1" noChangeAspect="1"/>
-          </p:cNvPicPr>
-          <p:nvPr>
-            <p:ph idx="1"/>
-          </p:nvPr>
-        </p:nvPicPr>
-        <p:blipFill>
-          <a:blip r:embed="rId2"/>
-          <a:stretch>
-            <a:fillRect/>
-          </a:stretch>
-        </p:blipFill>
-        <p:spPr>
-          <a:xfrm>
-            <a:off x="1699599" y="1442776"/>
-            <a:ext cx="8792802" cy="3753374"/>
-          </a:xfrm>
-          <a:prstGeom prst="rect">
-            <a:avLst/>
-          </a:prstGeom>
-        </p:spPr>
-      </p:pic>
-    </p:spTree>
-    <p:extLst>
-      <p:ext uri="{BB962C8B-B14F-4D97-AF65-F5344CB8AC3E}">
-        <p14:creationId xmlns:p14="http://schemas.microsoft.com/office/powerpoint/2010/main" val="973175204"/>
-      </p:ext>
-    </p:extLst>
-  </p:cSld>
-  <p:clrMapOvr>
-    <a:masterClrMapping/>
-  </p:clrMapOvr>
-</p:sld>
-</file>
-
-<file path=ppt/slides/slide22.xml><?xml version="1.0" encoding="utf-8"?>
-<p:sld xmlns:a="http://schemas.openxmlformats.org/drawingml/2006/main" xmlns:r="http://schemas.openxmlformats.org/officeDocument/2006/relationships" xmlns:p="http://schemas.openxmlformats.org/presentationml/2006/main">
-  <p:cSld>
-    <p:spTree>
-      <p:nvGrpSpPr>
-        <p:cNvPr id="1" name=""/>
-        <p:cNvGrpSpPr/>
-        <p:nvPr/>
-      </p:nvGrpSpPr>
-      <p:grpSpPr>
-        <a:xfrm>
-          <a:off x="0" y="0"/>
-          <a:ext cx="0" cy="0"/>
-          <a:chOff x="0" y="0"/>
-          <a:chExt cx="0" cy="0"/>
-        </a:xfrm>
-      </p:grpSpPr>
-      <p:sp>
-        <p:nvSpPr>
-          <p:cNvPr id="2" name="Title 1"/>
-          <p:cNvSpPr>
-            <a:spLocks noGrp="1"/>
-          </p:cNvSpPr>
-          <p:nvPr>
-            <p:ph type="title"/>
-          </p:nvPr>
-        </p:nvSpPr>
-        <p:spPr>
-          <a:xfrm>
-            <a:off x="838200" y="365126"/>
-            <a:ext cx="10515600" cy="714738"/>
-          </a:xfrm>
-        </p:spPr>
-        <p:txBody>
-          <a:bodyPr/>
-          <a:lstStyle/>
-          <a:p>
-            <a:r>
-              <a:rPr lang="en-US" dirty="0" smtClean="0"/>
-              <a:t>Douglas </a:t>
-            </a:r>
-            <a:r>
-              <a:rPr lang="en-US" dirty="0" err="1" smtClean="0"/>
-              <a:t>Crockford</a:t>
-            </a:r>
-            <a:endParaRPr lang="en-US" dirty="0"/>
-          </a:p>
-        </p:txBody>
-      </p:sp>
-      <p:sp>
-        <p:nvSpPr>
-          <p:cNvPr id="3" name="Content Placeholder 2"/>
-          <p:cNvSpPr>
-            <a:spLocks noGrp="1"/>
-          </p:cNvSpPr>
-          <p:nvPr>
-            <p:ph idx="1"/>
-          </p:nvPr>
-        </p:nvSpPr>
-        <p:spPr>
-          <a:xfrm>
-            <a:off x="496389" y="1227909"/>
-            <a:ext cx="5538651" cy="4949054"/>
-          </a:xfrm>
-        </p:spPr>
-        <p:txBody>
-          <a:bodyPr>
-            <a:normAutofit fontScale="77500" lnSpcReduction="20000"/>
-          </a:bodyPr>
-          <a:lstStyle/>
-          <a:p>
-            <a:pPr marL="0" indent="0">
-              <a:buNone/>
-            </a:pPr>
-            <a:r>
-              <a:rPr lang="en-CA" sz="3400" dirty="0" err="1" smtClean="0"/>
-              <a:t>CoffeeScript</a:t>
-            </a:r>
-            <a:endParaRPr lang="en-CA" sz="3400" dirty="0"/>
-          </a:p>
-          <a:p>
-            <a:pPr marL="0" indent="0">
-              <a:buNone/>
-            </a:pPr>
-            <a:r>
-              <a:rPr lang="en-CA" dirty="0" smtClean="0"/>
-              <a:t>One of my favorites along those lines is a new little language called </a:t>
-            </a:r>
-            <a:r>
-              <a:rPr lang="en-CA" dirty="0" err="1" smtClean="0"/>
-              <a:t>CoffeeScript</a:t>
-            </a:r>
-            <a:r>
-              <a:rPr lang="en-CA" dirty="0" smtClean="0"/>
-              <a:t>, which takes the good parts -- not even all of the good parts, but a nice little language -- and comes up with groovy new syntax for it, which is minimal. </a:t>
-            </a:r>
-          </a:p>
-          <a:p>
-            <a:pPr marL="0" indent="0">
-              <a:buNone/>
-            </a:pPr>
-            <a:r>
-              <a:rPr lang="en-CA" dirty="0" smtClean="0"/>
-              <a:t>It's almost like dandelions: little fluffs of programs that do everything that conventional JavaScript programs do. You can't do anything in that language that you can't do in JavaScript, so it's all cosmetic. I don't know if all or much of that will find its way into JavaScript, because I'm not sure there's enough of a payoff there. But just as an experiment, as a design exercise, I think it's a brilliant piece of work. I'm excited to see stuff like that happening.</a:t>
-            </a:r>
-            <a:endParaRPr lang="en-US" dirty="0" smtClean="0"/>
-          </a:p>
-        </p:txBody>
-      </p:sp>
-      <p:sp>
-        <p:nvSpPr>
-          <p:cNvPr id="4" name="Content Placeholder 2"/>
-          <p:cNvSpPr txBox="1">
-            <a:spLocks/>
-          </p:cNvSpPr>
-          <p:nvPr/>
-        </p:nvSpPr>
-        <p:spPr>
-          <a:xfrm>
-            <a:off x="6035040" y="1227909"/>
-            <a:ext cx="5860869" cy="4949054"/>
-          </a:xfrm>
-          <a:prstGeom prst="rect">
-            <a:avLst/>
-          </a:prstGeom>
-        </p:spPr>
-        <p:txBody>
-          <a:bodyPr vert="horz" lIns="91440" tIns="45720" rIns="91440" bIns="45720" rtlCol="0">
-            <a:normAutofit/>
-          </a:bodyPr>
-          <a:lstStyle>
-            <a:lvl1pPr marL="228600" indent="-228600" algn="l" defTabSz="914400" rtl="0" eaLnBrk="1" latinLnBrk="0" hangingPunct="1">
-              <a:lnSpc>
-                <a:spcPct val="90000"/>
-              </a:lnSpc>
-              <a:spcBef>
-                <a:spcPts val="1000"/>
-              </a:spcBef>
-              <a:buFont typeface="Arial" panose="020B0604020202020204" pitchFamily="34" charset="0"/>
-              <a:buChar char="•"/>
-              <a:defRPr sz="2800" kern="1200">
-                <a:solidFill>
-                  <a:schemeClr val="tx1"/>
-                </a:solidFill>
-                <a:latin typeface="+mn-lt"/>
-                <a:ea typeface="+mn-ea"/>
-                <a:cs typeface="+mn-cs"/>
-              </a:defRPr>
-            </a:lvl1pPr>
-            <a:lvl2pPr marL="685800" indent="-228600" algn="l" defTabSz="914400" rtl="0" eaLnBrk="1" latinLnBrk="0" hangingPunct="1">
-              <a:lnSpc>
-                <a:spcPct val="90000"/>
-              </a:lnSpc>
-              <a:spcBef>
-                <a:spcPts val="500"/>
-              </a:spcBef>
-              <a:buFont typeface="Arial" panose="020B0604020202020204" pitchFamily="34" charset="0"/>
-              <a:buChar char="•"/>
-              <a:defRPr sz="2400" kern="1200">
-                <a:solidFill>
-                  <a:schemeClr val="tx1"/>
-                </a:solidFill>
-                <a:latin typeface="+mn-lt"/>
-                <a:ea typeface="+mn-ea"/>
-                <a:cs typeface="+mn-cs"/>
-              </a:defRPr>
-            </a:lvl2pPr>
-            <a:lvl3pPr marL="1143000" indent="-228600" algn="l" defTabSz="914400" rtl="0" eaLnBrk="1" latinLnBrk="0" hangingPunct="1">
-              <a:lnSpc>
-                <a:spcPct val="90000"/>
-              </a:lnSpc>
-              <a:spcBef>
-                <a:spcPts val="500"/>
-              </a:spcBef>
-              <a:buFont typeface="Arial" panose="020B0604020202020204" pitchFamily="34" charset="0"/>
-              <a:buChar char="•"/>
-              <a:defRPr sz="2000" kern="1200">
-                <a:solidFill>
-                  <a:schemeClr val="tx1"/>
-                </a:solidFill>
-                <a:latin typeface="+mn-lt"/>
-                <a:ea typeface="+mn-ea"/>
-                <a:cs typeface="+mn-cs"/>
-              </a:defRPr>
-            </a:lvl3pPr>
-            <a:lvl4pPr marL="1600200" indent="-228600" algn="l" defTabSz="914400" rtl="0" eaLnBrk="1" latinLnBrk="0" hangingPunct="1">
-              <a:lnSpc>
-                <a:spcPct val="90000"/>
-              </a:lnSpc>
-              <a:spcBef>
-                <a:spcPts val="500"/>
-              </a:spcBef>
-              <a:buFont typeface="Arial" panose="020B0604020202020204" pitchFamily="34" charset="0"/>
-              <a:buChar char="•"/>
-              <a:defRPr sz="1800" kern="1200">
-                <a:solidFill>
-                  <a:schemeClr val="tx1"/>
-                </a:solidFill>
-                <a:latin typeface="+mn-lt"/>
-                <a:ea typeface="+mn-ea"/>
-                <a:cs typeface="+mn-cs"/>
-              </a:defRPr>
-            </a:lvl4pPr>
-            <a:lvl5pPr marL="2057400" indent="-228600" algn="l" defTabSz="914400" rtl="0" eaLnBrk="1" latinLnBrk="0" hangingPunct="1">
-              <a:lnSpc>
-                <a:spcPct val="90000"/>
-              </a:lnSpc>
-              <a:spcBef>
-                <a:spcPts val="500"/>
-              </a:spcBef>
-              <a:buFont typeface="Arial" panose="020B0604020202020204" pitchFamily="34" charset="0"/>
-              <a:buChar char="•"/>
-              <a:defRPr sz="1800" kern="1200">
-                <a:solidFill>
-                  <a:schemeClr val="tx1"/>
-                </a:solidFill>
-                <a:latin typeface="+mn-lt"/>
-                <a:ea typeface="+mn-ea"/>
-                <a:cs typeface="+mn-cs"/>
-              </a:defRPr>
-            </a:lvl5pPr>
-            <a:lvl6pPr marL="2514600" indent="-228600" algn="l" defTabSz="914400" rtl="0" eaLnBrk="1" latinLnBrk="0" hangingPunct="1">
-              <a:lnSpc>
-                <a:spcPct val="90000"/>
-              </a:lnSpc>
-              <a:spcBef>
-                <a:spcPts val="500"/>
-              </a:spcBef>
-              <a:buFont typeface="Arial" panose="020B0604020202020204" pitchFamily="34" charset="0"/>
-              <a:buChar char="•"/>
-              <a:defRPr sz="1800" kern="1200">
-                <a:solidFill>
-                  <a:schemeClr val="tx1"/>
-                </a:solidFill>
-                <a:latin typeface="+mn-lt"/>
-                <a:ea typeface="+mn-ea"/>
-                <a:cs typeface="+mn-cs"/>
-              </a:defRPr>
-            </a:lvl6pPr>
-            <a:lvl7pPr marL="2971800" indent="-228600" algn="l" defTabSz="914400" rtl="0" eaLnBrk="1" latinLnBrk="0" hangingPunct="1">
-              <a:lnSpc>
-                <a:spcPct val="90000"/>
-              </a:lnSpc>
-              <a:spcBef>
-                <a:spcPts val="500"/>
-              </a:spcBef>
-              <a:buFont typeface="Arial" panose="020B0604020202020204" pitchFamily="34" charset="0"/>
-              <a:buChar char="•"/>
-              <a:defRPr sz="1800" kern="1200">
-                <a:solidFill>
-                  <a:schemeClr val="tx1"/>
-                </a:solidFill>
-                <a:latin typeface="+mn-lt"/>
-                <a:ea typeface="+mn-ea"/>
-                <a:cs typeface="+mn-cs"/>
-              </a:defRPr>
-            </a:lvl7pPr>
-            <a:lvl8pPr marL="3429000" indent="-228600" algn="l" defTabSz="914400" rtl="0" eaLnBrk="1" latinLnBrk="0" hangingPunct="1">
-              <a:lnSpc>
-                <a:spcPct val="90000"/>
-              </a:lnSpc>
-              <a:spcBef>
-                <a:spcPts val="500"/>
-              </a:spcBef>
-              <a:buFont typeface="Arial" panose="020B0604020202020204" pitchFamily="34" charset="0"/>
-              <a:buChar char="•"/>
-              <a:defRPr sz="1800" kern="1200">
-                <a:solidFill>
-                  <a:schemeClr val="tx1"/>
-                </a:solidFill>
-                <a:latin typeface="+mn-lt"/>
-                <a:ea typeface="+mn-ea"/>
-                <a:cs typeface="+mn-cs"/>
-              </a:defRPr>
-            </a:lvl8pPr>
-            <a:lvl9pPr marL="3886200" indent="-228600" algn="l" defTabSz="914400" rtl="0" eaLnBrk="1" latinLnBrk="0" hangingPunct="1">
-              <a:lnSpc>
-                <a:spcPct val="90000"/>
-              </a:lnSpc>
-              <a:spcBef>
-                <a:spcPts val="500"/>
-              </a:spcBef>
-              <a:buFont typeface="Arial" panose="020B0604020202020204" pitchFamily="34" charset="0"/>
-              <a:buChar char="•"/>
-              <a:defRPr sz="1800" kern="1200">
-                <a:solidFill>
-                  <a:schemeClr val="tx1"/>
-                </a:solidFill>
-                <a:latin typeface="+mn-lt"/>
-                <a:ea typeface="+mn-ea"/>
-                <a:cs typeface="+mn-cs"/>
-              </a:defRPr>
-            </a:lvl9pPr>
-          </a:lstStyle>
-          <a:p>
-            <a:pPr marL="0" indent="0">
-              <a:buNone/>
-            </a:pPr>
-            <a:r>
-              <a:rPr lang="en-CA" sz="2600" dirty="0" err="1" smtClean="0"/>
-              <a:t>TypeScript</a:t>
-            </a:r>
-            <a:endParaRPr lang="en-CA" sz="2600" dirty="0" smtClean="0"/>
-          </a:p>
-          <a:p>
-            <a:pPr marL="0" indent="0">
-              <a:buNone/>
-            </a:pPr>
-            <a:r>
-              <a:rPr lang="en-CA" sz="2200" dirty="0" smtClean="0"/>
-              <a:t>Microsoft's </a:t>
-            </a:r>
-            <a:r>
-              <a:rPr lang="en-CA" sz="2200" dirty="0" err="1" smtClean="0"/>
-              <a:t>TypeScript</a:t>
-            </a:r>
-            <a:r>
-              <a:rPr lang="en-CA" sz="2200" dirty="0" smtClean="0"/>
-              <a:t> may be the best of the many JavaScript front ends. It seems to generate the most attractive code. And I think it should take pressure off of the </a:t>
-            </a:r>
-            <a:r>
-              <a:rPr lang="en-CA" sz="2200" dirty="0" err="1" smtClean="0"/>
-              <a:t>ECMAScript</a:t>
-            </a:r>
-            <a:r>
-              <a:rPr lang="en-CA" sz="2200" dirty="0" smtClean="0"/>
-              <a:t> Standard for new features like type declarations and classes. Anders has shown that these can be provided nicely by a preprocessor, so there is no need to change the underlying language.</a:t>
-            </a:r>
-            <a:br>
-              <a:rPr lang="en-CA" sz="2200" dirty="0" smtClean="0"/>
-            </a:br>
-            <a:r>
-              <a:rPr lang="en-CA" sz="2200" dirty="0" smtClean="0"/>
-              <a:t/>
-            </a:r>
-            <a:br>
-              <a:rPr lang="en-CA" sz="2200" dirty="0" smtClean="0"/>
-            </a:br>
-            <a:r>
-              <a:rPr lang="en-CA" sz="2200" dirty="0" smtClean="0"/>
-              <a:t>I think that JavaScript's loose typing is one of its best features and that type checking is way overrated. </a:t>
-            </a:r>
-            <a:r>
-              <a:rPr lang="en-CA" sz="2200" dirty="0" err="1" smtClean="0"/>
-              <a:t>TypeScript</a:t>
-            </a:r>
-            <a:r>
-              <a:rPr lang="en-CA" sz="2200" dirty="0" smtClean="0"/>
-              <a:t> adds sweetness, but at a price. It is not a price I am willing to pay.﻿</a:t>
-            </a:r>
-          </a:p>
-          <a:p>
-            <a:endParaRPr lang="en-US" dirty="0" smtClean="0"/>
-          </a:p>
-          <a:p>
-            <a:pPr marL="0" indent="0">
-              <a:buFont typeface="Arial" panose="020B0604020202020204" pitchFamily="34" charset="0"/>
-              <a:buNone/>
-            </a:pPr>
-            <a:endParaRPr lang="en-US" dirty="0"/>
-          </a:p>
-        </p:txBody>
-      </p:sp>
-    </p:spTree>
-    <p:extLst>
-      <p:ext uri="{BB962C8B-B14F-4D97-AF65-F5344CB8AC3E}">
-        <p14:creationId xmlns:p14="http://schemas.microsoft.com/office/powerpoint/2010/main" val="3512428719"/>
-      </p:ext>
-    </p:extLst>
-  </p:cSld>
-  <p:clrMapOvr>
-    <a:masterClrMapping/>
-  </p:clrMapOvr>
-  <p:timing>
-    <p:tnLst>
-      <p:par>
-        <p:cTn id="1" dur="indefinite" restart="never" nodeType="tmRoot"/>
-      </p:par>
-    </p:tnLst>
-  </p:timing>
-</p:sld>
-</file>
-
-<file path=ppt/slides/slide23.xml><?xml version="1.0" encoding="utf-8"?>
-<p:sld xmlns:a="http://schemas.openxmlformats.org/drawingml/2006/main" xmlns:r="http://schemas.openxmlformats.org/officeDocument/2006/relationships" xmlns:p="http://schemas.openxmlformats.org/presentationml/2006/main">
-  <p:cSld>
-    <p:spTree>
-      <p:nvGrpSpPr>
-        <p:cNvPr id="1" name=""/>
-        <p:cNvGrpSpPr/>
-        <p:nvPr/>
-      </p:nvGrpSpPr>
-      <p:grpSpPr>
-        <a:xfrm>
-          <a:off x="0" y="0"/>
-          <a:ext cx="0" cy="0"/>
-          <a:chOff x="0" y="0"/>
-          <a:chExt cx="0" cy="0"/>
-        </a:xfrm>
-      </p:grpSpPr>
-      <p:sp>
-        <p:nvSpPr>
-          <p:cNvPr id="2" name="Title 1"/>
-          <p:cNvSpPr>
-            <a:spLocks noGrp="1"/>
-          </p:cNvSpPr>
-          <p:nvPr>
-            <p:ph type="title"/>
-          </p:nvPr>
-        </p:nvSpPr>
-        <p:spPr>
-          <a:xfrm>
-            <a:off x="838200" y="365126"/>
-            <a:ext cx="10515600" cy="714738"/>
-          </a:xfrm>
-        </p:spPr>
-        <p:txBody>
-          <a:bodyPr/>
-          <a:lstStyle/>
-          <a:p>
-            <a:r>
-              <a:rPr lang="en-US" dirty="0" smtClean="0"/>
-              <a:t>Brendan </a:t>
-            </a:r>
-            <a:r>
-              <a:rPr lang="en-US" dirty="0" err="1" smtClean="0"/>
-              <a:t>Eich</a:t>
-            </a:r>
-            <a:endParaRPr lang="en-US" dirty="0"/>
-          </a:p>
-        </p:txBody>
-      </p:sp>
-      <p:sp>
-        <p:nvSpPr>
-          <p:cNvPr id="3" name="Content Placeholder 2"/>
-          <p:cNvSpPr>
-            <a:spLocks noGrp="1"/>
-          </p:cNvSpPr>
-          <p:nvPr>
-            <p:ph idx="1"/>
-          </p:nvPr>
-        </p:nvSpPr>
-        <p:spPr>
-          <a:xfrm>
-            <a:off x="496389" y="1227909"/>
-            <a:ext cx="5538651" cy="4949054"/>
-          </a:xfrm>
-        </p:spPr>
-        <p:txBody>
-          <a:bodyPr>
-            <a:normAutofit/>
-          </a:bodyPr>
-          <a:lstStyle/>
-          <a:p>
-            <a:pPr marL="0" indent="0">
-              <a:buNone/>
-            </a:pPr>
-            <a:r>
-              <a:rPr lang="en-CA" sz="2600" dirty="0" err="1" smtClean="0"/>
-              <a:t>CoffeeScript</a:t>
-            </a:r>
-            <a:endParaRPr lang="en-CA" sz="2600" dirty="0"/>
-          </a:p>
-          <a:p>
-            <a:pPr marL="0" indent="0">
-              <a:buNone/>
-            </a:pPr>
-            <a:r>
-              <a:rPr lang="en-CA" sz="2200" dirty="0" smtClean="0"/>
-              <a:t>It helps to have thinks like </a:t>
-            </a:r>
-            <a:r>
-              <a:rPr lang="en-CA" sz="2200" dirty="0" err="1" smtClean="0"/>
-              <a:t>CoffeeScript</a:t>
-            </a:r>
-            <a:r>
-              <a:rPr lang="en-CA" sz="2200" dirty="0" smtClean="0"/>
-              <a:t> out there it isn’t overriding, it doesn’t tell us what we must to do, but it’s suggestive, and if we want to pave that cow path we can, and I’m in favor.</a:t>
-            </a:r>
-          </a:p>
-          <a:p>
-            <a:pPr marL="0" indent="0">
-              <a:buNone/>
-            </a:pPr>
-            <a:endParaRPr lang="en-CA" sz="2200" dirty="0"/>
-          </a:p>
-          <a:p>
-            <a:pPr marL="0" indent="0">
-              <a:buNone/>
-            </a:pPr>
-            <a:r>
-              <a:rPr lang="en-CA" sz="2200" dirty="0" smtClean="0"/>
-              <a:t>I advocated strongly for standardising prototypal inheritance à la </a:t>
-            </a:r>
-            <a:r>
-              <a:rPr lang="en-CA" sz="2200" dirty="0" err="1" smtClean="0"/>
-              <a:t>CoffeeScript’s</a:t>
-            </a:r>
-            <a:r>
-              <a:rPr lang="en-CA" sz="2200" dirty="0" smtClean="0"/>
-              <a:t> class, super and @ syntactic sugar.</a:t>
-            </a:r>
-            <a:endParaRPr lang="en-US" sz="2200" dirty="0" smtClean="0"/>
-          </a:p>
-        </p:txBody>
-      </p:sp>
-      <p:sp>
-        <p:nvSpPr>
-          <p:cNvPr id="4" name="Content Placeholder 2"/>
-          <p:cNvSpPr txBox="1">
-            <a:spLocks/>
-          </p:cNvSpPr>
-          <p:nvPr/>
-        </p:nvSpPr>
-        <p:spPr>
-          <a:xfrm>
-            <a:off x="6035040" y="1227909"/>
-            <a:ext cx="5860869" cy="4949054"/>
-          </a:xfrm>
-          <a:prstGeom prst="rect">
-            <a:avLst/>
-          </a:prstGeom>
-        </p:spPr>
-        <p:txBody>
-          <a:bodyPr vert="horz" lIns="91440" tIns="45720" rIns="91440" bIns="45720" rtlCol="0">
-            <a:normAutofit/>
-          </a:bodyPr>
-          <a:lstStyle>
-            <a:lvl1pPr marL="228600" indent="-228600" algn="l" defTabSz="914400" rtl="0" eaLnBrk="1" latinLnBrk="0" hangingPunct="1">
-              <a:lnSpc>
-                <a:spcPct val="90000"/>
-              </a:lnSpc>
-              <a:spcBef>
-                <a:spcPts val="1000"/>
-              </a:spcBef>
-              <a:buFont typeface="Arial" panose="020B0604020202020204" pitchFamily="34" charset="0"/>
-              <a:buChar char="•"/>
-              <a:defRPr sz="2800" kern="1200">
-                <a:solidFill>
-                  <a:schemeClr val="tx1"/>
-                </a:solidFill>
-                <a:latin typeface="+mn-lt"/>
-                <a:ea typeface="+mn-ea"/>
-                <a:cs typeface="+mn-cs"/>
-              </a:defRPr>
-            </a:lvl1pPr>
-            <a:lvl2pPr marL="685800" indent="-228600" algn="l" defTabSz="914400" rtl="0" eaLnBrk="1" latinLnBrk="0" hangingPunct="1">
-              <a:lnSpc>
-                <a:spcPct val="90000"/>
-              </a:lnSpc>
-              <a:spcBef>
-                <a:spcPts val="500"/>
-              </a:spcBef>
-              <a:buFont typeface="Arial" panose="020B0604020202020204" pitchFamily="34" charset="0"/>
-              <a:buChar char="•"/>
-              <a:defRPr sz="2400" kern="1200">
-                <a:solidFill>
-                  <a:schemeClr val="tx1"/>
-                </a:solidFill>
-                <a:latin typeface="+mn-lt"/>
-                <a:ea typeface="+mn-ea"/>
-                <a:cs typeface="+mn-cs"/>
-              </a:defRPr>
-            </a:lvl2pPr>
-            <a:lvl3pPr marL="1143000" indent="-228600" algn="l" defTabSz="914400" rtl="0" eaLnBrk="1" latinLnBrk="0" hangingPunct="1">
-              <a:lnSpc>
-                <a:spcPct val="90000"/>
-              </a:lnSpc>
-              <a:spcBef>
-                <a:spcPts val="500"/>
-              </a:spcBef>
-              <a:buFont typeface="Arial" panose="020B0604020202020204" pitchFamily="34" charset="0"/>
-              <a:buChar char="•"/>
-              <a:defRPr sz="2000" kern="1200">
-                <a:solidFill>
-                  <a:schemeClr val="tx1"/>
-                </a:solidFill>
-                <a:latin typeface="+mn-lt"/>
-                <a:ea typeface="+mn-ea"/>
-                <a:cs typeface="+mn-cs"/>
-              </a:defRPr>
-            </a:lvl3pPr>
-            <a:lvl4pPr marL="1600200" indent="-228600" algn="l" defTabSz="914400" rtl="0" eaLnBrk="1" latinLnBrk="0" hangingPunct="1">
-              <a:lnSpc>
-                <a:spcPct val="90000"/>
-              </a:lnSpc>
-              <a:spcBef>
-                <a:spcPts val="500"/>
-              </a:spcBef>
-              <a:buFont typeface="Arial" panose="020B0604020202020204" pitchFamily="34" charset="0"/>
-              <a:buChar char="•"/>
-              <a:defRPr sz="1800" kern="1200">
-                <a:solidFill>
-                  <a:schemeClr val="tx1"/>
-                </a:solidFill>
-                <a:latin typeface="+mn-lt"/>
-                <a:ea typeface="+mn-ea"/>
-                <a:cs typeface="+mn-cs"/>
-              </a:defRPr>
-            </a:lvl4pPr>
-            <a:lvl5pPr marL="2057400" indent="-228600" algn="l" defTabSz="914400" rtl="0" eaLnBrk="1" latinLnBrk="0" hangingPunct="1">
-              <a:lnSpc>
-                <a:spcPct val="90000"/>
-              </a:lnSpc>
-              <a:spcBef>
-                <a:spcPts val="500"/>
-              </a:spcBef>
-              <a:buFont typeface="Arial" panose="020B0604020202020204" pitchFamily="34" charset="0"/>
-              <a:buChar char="•"/>
-              <a:defRPr sz="1800" kern="1200">
-                <a:solidFill>
-                  <a:schemeClr val="tx1"/>
-                </a:solidFill>
-                <a:latin typeface="+mn-lt"/>
-                <a:ea typeface="+mn-ea"/>
-                <a:cs typeface="+mn-cs"/>
-              </a:defRPr>
-            </a:lvl5pPr>
-            <a:lvl6pPr marL="2514600" indent="-228600" algn="l" defTabSz="914400" rtl="0" eaLnBrk="1" latinLnBrk="0" hangingPunct="1">
-              <a:lnSpc>
-                <a:spcPct val="90000"/>
-              </a:lnSpc>
-              <a:spcBef>
-                <a:spcPts val="500"/>
-              </a:spcBef>
-              <a:buFont typeface="Arial" panose="020B0604020202020204" pitchFamily="34" charset="0"/>
-              <a:buChar char="•"/>
-              <a:defRPr sz="1800" kern="1200">
-                <a:solidFill>
-                  <a:schemeClr val="tx1"/>
-                </a:solidFill>
-                <a:latin typeface="+mn-lt"/>
-                <a:ea typeface="+mn-ea"/>
-                <a:cs typeface="+mn-cs"/>
-              </a:defRPr>
-            </a:lvl6pPr>
-            <a:lvl7pPr marL="2971800" indent="-228600" algn="l" defTabSz="914400" rtl="0" eaLnBrk="1" latinLnBrk="0" hangingPunct="1">
-              <a:lnSpc>
-                <a:spcPct val="90000"/>
-              </a:lnSpc>
-              <a:spcBef>
-                <a:spcPts val="500"/>
-              </a:spcBef>
-              <a:buFont typeface="Arial" panose="020B0604020202020204" pitchFamily="34" charset="0"/>
-              <a:buChar char="•"/>
-              <a:defRPr sz="1800" kern="1200">
-                <a:solidFill>
-                  <a:schemeClr val="tx1"/>
-                </a:solidFill>
-                <a:latin typeface="+mn-lt"/>
-                <a:ea typeface="+mn-ea"/>
-                <a:cs typeface="+mn-cs"/>
-              </a:defRPr>
-            </a:lvl7pPr>
-            <a:lvl8pPr marL="3429000" indent="-228600" algn="l" defTabSz="914400" rtl="0" eaLnBrk="1" latinLnBrk="0" hangingPunct="1">
-              <a:lnSpc>
-                <a:spcPct val="90000"/>
-              </a:lnSpc>
-              <a:spcBef>
-                <a:spcPts val="500"/>
-              </a:spcBef>
-              <a:buFont typeface="Arial" panose="020B0604020202020204" pitchFamily="34" charset="0"/>
-              <a:buChar char="•"/>
-              <a:defRPr sz="1800" kern="1200">
-                <a:solidFill>
-                  <a:schemeClr val="tx1"/>
-                </a:solidFill>
-                <a:latin typeface="+mn-lt"/>
-                <a:ea typeface="+mn-ea"/>
-                <a:cs typeface="+mn-cs"/>
-              </a:defRPr>
-            </a:lvl8pPr>
-            <a:lvl9pPr marL="3886200" indent="-228600" algn="l" defTabSz="914400" rtl="0" eaLnBrk="1" latinLnBrk="0" hangingPunct="1">
-              <a:lnSpc>
-                <a:spcPct val="90000"/>
-              </a:lnSpc>
-              <a:spcBef>
-                <a:spcPts val="500"/>
-              </a:spcBef>
-              <a:buFont typeface="Arial" panose="020B0604020202020204" pitchFamily="34" charset="0"/>
-              <a:buChar char="•"/>
-              <a:defRPr sz="1800" kern="1200">
-                <a:solidFill>
-                  <a:schemeClr val="tx1"/>
-                </a:solidFill>
-                <a:latin typeface="+mn-lt"/>
-                <a:ea typeface="+mn-ea"/>
-                <a:cs typeface="+mn-cs"/>
-              </a:defRPr>
-            </a:lvl9pPr>
-          </a:lstStyle>
-          <a:p>
-            <a:pPr marL="0" indent="0">
-              <a:buNone/>
-            </a:pPr>
-            <a:r>
-              <a:rPr lang="en-CA" sz="2600" dirty="0" err="1" smtClean="0"/>
-              <a:t>TypeScript</a:t>
-            </a:r>
-            <a:endParaRPr lang="en-CA" sz="2600" dirty="0" smtClean="0"/>
-          </a:p>
-          <a:p>
-            <a:pPr marL="0" indent="0">
-              <a:buNone/>
-            </a:pPr>
-            <a:r>
-              <a:rPr lang="en-CA" sz="2200" dirty="0" err="1" smtClean="0"/>
-              <a:t>TypeScript</a:t>
-            </a:r>
-            <a:r>
-              <a:rPr lang="en-CA" sz="2200" dirty="0" smtClean="0"/>
-              <a:t> is quite a good piece of work for Visual Studio users, and smartly aligned with ES6.</a:t>
-            </a:r>
-          </a:p>
-          <a:p>
-            <a:pPr marL="0" indent="0">
-              <a:buNone/>
-            </a:pPr>
-            <a:endParaRPr lang="en-US" dirty="0" smtClean="0"/>
-          </a:p>
-          <a:p>
-            <a:pPr marL="0" indent="0">
-              <a:buFont typeface="Arial" panose="020B0604020202020204" pitchFamily="34" charset="0"/>
-              <a:buNone/>
-            </a:pPr>
-            <a:endParaRPr lang="en-US" dirty="0"/>
-          </a:p>
-        </p:txBody>
-      </p:sp>
-    </p:spTree>
-    <p:extLst>
-      <p:ext uri="{BB962C8B-B14F-4D97-AF65-F5344CB8AC3E}">
-        <p14:creationId xmlns:p14="http://schemas.microsoft.com/office/powerpoint/2010/main" val="653692478"/>
-      </p:ext>
-    </p:extLst>
-  </p:cSld>
-  <p:clrMapOvr>
-    <a:masterClrMapping/>
-  </p:clrMapOvr>
-  <p:timing>
-    <p:tnLst>
-      <p:par>
-        <p:cTn id="1" dur="indefinite" restart="never" nodeType="tmRoot"/>
-      </p:par>
-    </p:tnLst>
-  </p:timing>
-</p:sld>
-</file>
-
-<file path=ppt/slides/slide24.xml><?xml version="1.0" encoding="utf-8"?>
 <p:sld xmlns:a="http://schemas.openxmlformats.org/drawingml/2006/main" xmlns:r="http://schemas.openxmlformats.org/officeDocument/2006/relationships" xmlns:p="http://schemas.openxmlformats.org/presentationml/2006/main">
   <p:cSld>
     <p:spTree>

</xml_diff>

<commit_message>
[build.js] Add test scripts and wire together mocha, require.js and chai
</commit_message>
<xml_diff>
--- a/build.js/build.js.pptx
+++ b/build.js/build.js.pptx
@@ -5,7 +5,7 @@
     <p:sldMasterId id="2147483648" r:id="rId1"/>
   </p:sldMasterIdLst>
   <p:notesMasterIdLst>
-    <p:notesMasterId r:id="rId23"/>
+    <p:notesMasterId r:id="rId31"/>
   </p:notesMasterIdLst>
   <p:sldIdLst>
     <p:sldId id="256" r:id="rId2"/>
@@ -28,7 +28,15 @@
     <p:sldId id="282" r:id="rId19"/>
     <p:sldId id="283" r:id="rId20"/>
     <p:sldId id="275" r:id="rId21"/>
-    <p:sldId id="267" r:id="rId22"/>
+    <p:sldId id="284" r:id="rId22"/>
+    <p:sldId id="286" r:id="rId23"/>
+    <p:sldId id="285" r:id="rId24"/>
+    <p:sldId id="287" r:id="rId25"/>
+    <p:sldId id="288" r:id="rId26"/>
+    <p:sldId id="289" r:id="rId27"/>
+    <p:sldId id="267" r:id="rId28"/>
+    <p:sldId id="291" r:id="rId29"/>
+    <p:sldId id="290" r:id="rId30"/>
   </p:sldIdLst>
   <p:sldSz cx="12192000" cy="6858000"/>
   <p:notesSz cx="6858000" cy="9144000"/>
@@ -1743,6 +1751,630 @@
     <p:extLst>
       <p:ext uri="{BB962C8B-B14F-4D97-AF65-F5344CB8AC3E}">
         <p14:creationId xmlns:p14="http://schemas.microsoft.com/office/powerpoint/2010/main" val="1155058327"/>
+      </p:ext>
+    </p:extLst>
+  </p:cSld>
+  <p:clrMapOvr>
+    <a:masterClrMapping/>
+  </p:clrMapOvr>
+</p:notes>
+</file>
+
+<file path=ppt/notesSlides/notesSlide20.xml><?xml version="1.0" encoding="utf-8"?>
+<p:notes xmlns:a="http://schemas.openxmlformats.org/drawingml/2006/main" xmlns:r="http://schemas.openxmlformats.org/officeDocument/2006/relationships" xmlns:p="http://schemas.openxmlformats.org/presentationml/2006/main">
+  <p:cSld>
+    <p:spTree>
+      <p:nvGrpSpPr>
+        <p:cNvPr id="1" name=""/>
+        <p:cNvGrpSpPr/>
+        <p:nvPr/>
+      </p:nvGrpSpPr>
+      <p:grpSpPr>
+        <a:xfrm>
+          <a:off x="0" y="0"/>
+          <a:ext cx="0" cy="0"/>
+          <a:chOff x="0" y="0"/>
+          <a:chExt cx="0" cy="0"/>
+        </a:xfrm>
+      </p:grpSpPr>
+      <p:sp>
+        <p:nvSpPr>
+          <p:cNvPr id="2" name="Slide Image Placeholder 1"/>
+          <p:cNvSpPr>
+            <a:spLocks noGrp="1" noRot="1" noChangeAspect="1"/>
+          </p:cNvSpPr>
+          <p:nvPr>
+            <p:ph type="sldImg"/>
+          </p:nvPr>
+        </p:nvSpPr>
+        <p:spPr/>
+      </p:sp>
+      <p:sp>
+        <p:nvSpPr>
+          <p:cNvPr id="3" name="Notes Placeholder 2"/>
+          <p:cNvSpPr>
+            <a:spLocks noGrp="1"/>
+          </p:cNvSpPr>
+          <p:nvPr>
+            <p:ph type="body" idx="1"/>
+          </p:nvPr>
+        </p:nvSpPr>
+        <p:spPr/>
+        <p:txBody>
+          <a:bodyPr/>
+          <a:lstStyle/>
+          <a:p>
+            <a:pPr marL="171450" indent="-171450">
+              <a:buFontTx/>
+              <a:buChar char="-"/>
+            </a:pPr>
+            <a:endParaRPr lang="en-US" dirty="0"/>
+          </a:p>
+        </p:txBody>
+      </p:sp>
+      <p:sp>
+        <p:nvSpPr>
+          <p:cNvPr id="4" name="Slide Number Placeholder 3"/>
+          <p:cNvSpPr>
+            <a:spLocks noGrp="1"/>
+          </p:cNvSpPr>
+          <p:nvPr>
+            <p:ph type="sldNum" sz="quarter" idx="10"/>
+          </p:nvPr>
+        </p:nvSpPr>
+        <p:spPr/>
+        <p:txBody>
+          <a:bodyPr/>
+          <a:lstStyle/>
+          <a:p>
+            <a:fld id="{1248D640-4A2F-4A8C-8E2D-3C6025A34183}" type="slidenum">
+              <a:rPr lang="en-US" smtClean="0"/>
+              <a:t>21</a:t>
+            </a:fld>
+            <a:endParaRPr lang="en-US"/>
+          </a:p>
+        </p:txBody>
+      </p:sp>
+    </p:spTree>
+    <p:extLst>
+      <p:ext uri="{BB962C8B-B14F-4D97-AF65-F5344CB8AC3E}">
+        <p14:creationId xmlns:p14="http://schemas.microsoft.com/office/powerpoint/2010/main" val="622748997"/>
+      </p:ext>
+    </p:extLst>
+  </p:cSld>
+  <p:clrMapOvr>
+    <a:masterClrMapping/>
+  </p:clrMapOvr>
+</p:notes>
+</file>
+
+<file path=ppt/notesSlides/notesSlide21.xml><?xml version="1.0" encoding="utf-8"?>
+<p:notes xmlns:a="http://schemas.openxmlformats.org/drawingml/2006/main" xmlns:r="http://schemas.openxmlformats.org/officeDocument/2006/relationships" xmlns:p="http://schemas.openxmlformats.org/presentationml/2006/main">
+  <p:cSld>
+    <p:spTree>
+      <p:nvGrpSpPr>
+        <p:cNvPr id="1" name=""/>
+        <p:cNvGrpSpPr/>
+        <p:nvPr/>
+      </p:nvGrpSpPr>
+      <p:grpSpPr>
+        <a:xfrm>
+          <a:off x="0" y="0"/>
+          <a:ext cx="0" cy="0"/>
+          <a:chOff x="0" y="0"/>
+          <a:chExt cx="0" cy="0"/>
+        </a:xfrm>
+      </p:grpSpPr>
+      <p:sp>
+        <p:nvSpPr>
+          <p:cNvPr id="2" name="Slide Image Placeholder 1"/>
+          <p:cNvSpPr>
+            <a:spLocks noGrp="1" noRot="1" noChangeAspect="1"/>
+          </p:cNvSpPr>
+          <p:nvPr>
+            <p:ph type="sldImg"/>
+          </p:nvPr>
+        </p:nvSpPr>
+        <p:spPr/>
+      </p:sp>
+      <p:sp>
+        <p:nvSpPr>
+          <p:cNvPr id="3" name="Notes Placeholder 2"/>
+          <p:cNvSpPr>
+            <a:spLocks noGrp="1"/>
+          </p:cNvSpPr>
+          <p:nvPr>
+            <p:ph type="body" idx="1"/>
+          </p:nvPr>
+        </p:nvSpPr>
+        <p:spPr/>
+        <p:txBody>
+          <a:bodyPr/>
+          <a:lstStyle/>
+          <a:p>
+            <a:pPr lvl="1"/>
+            <a:endParaRPr lang="en-US" dirty="0" smtClean="0"/>
+          </a:p>
+          <a:p>
+            <a:pPr lvl="1"/>
+            <a:endParaRPr lang="en-US" dirty="0" smtClean="0"/>
+          </a:p>
+          <a:p>
+            <a:pPr marL="171450" indent="-171450">
+              <a:buFontTx/>
+              <a:buChar char="-"/>
+            </a:pPr>
+            <a:endParaRPr lang="en-US" dirty="0"/>
+          </a:p>
+        </p:txBody>
+      </p:sp>
+      <p:sp>
+        <p:nvSpPr>
+          <p:cNvPr id="4" name="Slide Number Placeholder 3"/>
+          <p:cNvSpPr>
+            <a:spLocks noGrp="1"/>
+          </p:cNvSpPr>
+          <p:nvPr>
+            <p:ph type="sldNum" sz="quarter" idx="10"/>
+          </p:nvPr>
+        </p:nvSpPr>
+        <p:spPr/>
+        <p:txBody>
+          <a:bodyPr/>
+          <a:lstStyle/>
+          <a:p>
+            <a:fld id="{1248D640-4A2F-4A8C-8E2D-3C6025A34183}" type="slidenum">
+              <a:rPr lang="en-US" smtClean="0"/>
+              <a:t>22</a:t>
+            </a:fld>
+            <a:endParaRPr lang="en-US"/>
+          </a:p>
+        </p:txBody>
+      </p:sp>
+    </p:spTree>
+    <p:extLst>
+      <p:ext uri="{BB962C8B-B14F-4D97-AF65-F5344CB8AC3E}">
+        <p14:creationId xmlns:p14="http://schemas.microsoft.com/office/powerpoint/2010/main" val="2394561111"/>
+      </p:ext>
+    </p:extLst>
+  </p:cSld>
+  <p:clrMapOvr>
+    <a:masterClrMapping/>
+  </p:clrMapOvr>
+</p:notes>
+</file>
+
+<file path=ppt/notesSlides/notesSlide22.xml><?xml version="1.0" encoding="utf-8"?>
+<p:notes xmlns:a="http://schemas.openxmlformats.org/drawingml/2006/main" xmlns:r="http://schemas.openxmlformats.org/officeDocument/2006/relationships" xmlns:p="http://schemas.openxmlformats.org/presentationml/2006/main">
+  <p:cSld>
+    <p:spTree>
+      <p:nvGrpSpPr>
+        <p:cNvPr id="1" name=""/>
+        <p:cNvGrpSpPr/>
+        <p:nvPr/>
+      </p:nvGrpSpPr>
+      <p:grpSpPr>
+        <a:xfrm>
+          <a:off x="0" y="0"/>
+          <a:ext cx="0" cy="0"/>
+          <a:chOff x="0" y="0"/>
+          <a:chExt cx="0" cy="0"/>
+        </a:xfrm>
+      </p:grpSpPr>
+      <p:sp>
+        <p:nvSpPr>
+          <p:cNvPr id="2" name="Slide Image Placeholder 1"/>
+          <p:cNvSpPr>
+            <a:spLocks noGrp="1" noRot="1" noChangeAspect="1"/>
+          </p:cNvSpPr>
+          <p:nvPr>
+            <p:ph type="sldImg"/>
+          </p:nvPr>
+        </p:nvSpPr>
+        <p:spPr/>
+      </p:sp>
+      <p:sp>
+        <p:nvSpPr>
+          <p:cNvPr id="3" name="Notes Placeholder 2"/>
+          <p:cNvSpPr>
+            <a:spLocks noGrp="1"/>
+          </p:cNvSpPr>
+          <p:nvPr>
+            <p:ph type="body" idx="1"/>
+          </p:nvPr>
+        </p:nvSpPr>
+        <p:spPr/>
+        <p:txBody>
+          <a:bodyPr/>
+          <a:lstStyle/>
+          <a:p>
+            <a:pPr marL="171450" indent="-171450">
+              <a:buFontTx/>
+              <a:buChar char="-"/>
+            </a:pPr>
+            <a:endParaRPr lang="en-US" dirty="0"/>
+          </a:p>
+        </p:txBody>
+      </p:sp>
+      <p:sp>
+        <p:nvSpPr>
+          <p:cNvPr id="4" name="Slide Number Placeholder 3"/>
+          <p:cNvSpPr>
+            <a:spLocks noGrp="1"/>
+          </p:cNvSpPr>
+          <p:nvPr>
+            <p:ph type="sldNum" sz="quarter" idx="10"/>
+          </p:nvPr>
+        </p:nvSpPr>
+        <p:spPr/>
+        <p:txBody>
+          <a:bodyPr/>
+          <a:lstStyle/>
+          <a:p>
+            <a:fld id="{1248D640-4A2F-4A8C-8E2D-3C6025A34183}" type="slidenum">
+              <a:rPr lang="en-US" smtClean="0"/>
+              <a:t>23</a:t>
+            </a:fld>
+            <a:endParaRPr lang="en-US"/>
+          </a:p>
+        </p:txBody>
+      </p:sp>
+    </p:spTree>
+    <p:extLst>
+      <p:ext uri="{BB962C8B-B14F-4D97-AF65-F5344CB8AC3E}">
+        <p14:creationId xmlns:p14="http://schemas.microsoft.com/office/powerpoint/2010/main" val="3308520949"/>
+      </p:ext>
+    </p:extLst>
+  </p:cSld>
+  <p:clrMapOvr>
+    <a:masterClrMapping/>
+  </p:clrMapOvr>
+</p:notes>
+</file>
+
+<file path=ppt/notesSlides/notesSlide23.xml><?xml version="1.0" encoding="utf-8"?>
+<p:notes xmlns:a="http://schemas.openxmlformats.org/drawingml/2006/main" xmlns:r="http://schemas.openxmlformats.org/officeDocument/2006/relationships" xmlns:p="http://schemas.openxmlformats.org/presentationml/2006/main">
+  <p:cSld>
+    <p:spTree>
+      <p:nvGrpSpPr>
+        <p:cNvPr id="1" name=""/>
+        <p:cNvGrpSpPr/>
+        <p:nvPr/>
+      </p:nvGrpSpPr>
+      <p:grpSpPr>
+        <a:xfrm>
+          <a:off x="0" y="0"/>
+          <a:ext cx="0" cy="0"/>
+          <a:chOff x="0" y="0"/>
+          <a:chExt cx="0" cy="0"/>
+        </a:xfrm>
+      </p:grpSpPr>
+      <p:sp>
+        <p:nvSpPr>
+          <p:cNvPr id="2" name="Slide Image Placeholder 1"/>
+          <p:cNvSpPr>
+            <a:spLocks noGrp="1" noRot="1" noChangeAspect="1"/>
+          </p:cNvSpPr>
+          <p:nvPr>
+            <p:ph type="sldImg"/>
+          </p:nvPr>
+        </p:nvSpPr>
+        <p:spPr/>
+      </p:sp>
+      <p:sp>
+        <p:nvSpPr>
+          <p:cNvPr id="3" name="Notes Placeholder 2"/>
+          <p:cNvSpPr>
+            <a:spLocks noGrp="1"/>
+          </p:cNvSpPr>
+          <p:nvPr>
+            <p:ph type="body" idx="1"/>
+          </p:nvPr>
+        </p:nvSpPr>
+        <p:spPr/>
+        <p:txBody>
+          <a:bodyPr/>
+          <a:lstStyle/>
+          <a:p>
+            <a:pPr marL="171450" indent="-171450">
+              <a:buFontTx/>
+              <a:buChar char="-"/>
+            </a:pPr>
+            <a:endParaRPr lang="en-US" dirty="0"/>
+          </a:p>
+        </p:txBody>
+      </p:sp>
+      <p:sp>
+        <p:nvSpPr>
+          <p:cNvPr id="4" name="Slide Number Placeholder 3"/>
+          <p:cNvSpPr>
+            <a:spLocks noGrp="1"/>
+          </p:cNvSpPr>
+          <p:nvPr>
+            <p:ph type="sldNum" sz="quarter" idx="10"/>
+          </p:nvPr>
+        </p:nvSpPr>
+        <p:spPr/>
+        <p:txBody>
+          <a:bodyPr/>
+          <a:lstStyle/>
+          <a:p>
+            <a:fld id="{1248D640-4A2F-4A8C-8E2D-3C6025A34183}" type="slidenum">
+              <a:rPr lang="en-US" smtClean="0"/>
+              <a:t>24</a:t>
+            </a:fld>
+            <a:endParaRPr lang="en-US"/>
+          </a:p>
+        </p:txBody>
+      </p:sp>
+    </p:spTree>
+    <p:extLst>
+      <p:ext uri="{BB962C8B-B14F-4D97-AF65-F5344CB8AC3E}">
+        <p14:creationId xmlns:p14="http://schemas.microsoft.com/office/powerpoint/2010/main" val="1238485424"/>
+      </p:ext>
+    </p:extLst>
+  </p:cSld>
+  <p:clrMapOvr>
+    <a:masterClrMapping/>
+  </p:clrMapOvr>
+</p:notes>
+</file>
+
+<file path=ppt/notesSlides/notesSlide24.xml><?xml version="1.0" encoding="utf-8"?>
+<p:notes xmlns:a="http://schemas.openxmlformats.org/drawingml/2006/main" xmlns:r="http://schemas.openxmlformats.org/officeDocument/2006/relationships" xmlns:p="http://schemas.openxmlformats.org/presentationml/2006/main">
+  <p:cSld>
+    <p:spTree>
+      <p:nvGrpSpPr>
+        <p:cNvPr id="1" name=""/>
+        <p:cNvGrpSpPr/>
+        <p:nvPr/>
+      </p:nvGrpSpPr>
+      <p:grpSpPr>
+        <a:xfrm>
+          <a:off x="0" y="0"/>
+          <a:ext cx="0" cy="0"/>
+          <a:chOff x="0" y="0"/>
+          <a:chExt cx="0" cy="0"/>
+        </a:xfrm>
+      </p:grpSpPr>
+      <p:sp>
+        <p:nvSpPr>
+          <p:cNvPr id="2" name="Slide Image Placeholder 1"/>
+          <p:cNvSpPr>
+            <a:spLocks noGrp="1" noRot="1" noChangeAspect="1"/>
+          </p:cNvSpPr>
+          <p:nvPr>
+            <p:ph type="sldImg"/>
+          </p:nvPr>
+        </p:nvSpPr>
+        <p:spPr/>
+      </p:sp>
+      <p:sp>
+        <p:nvSpPr>
+          <p:cNvPr id="3" name="Notes Placeholder 2"/>
+          <p:cNvSpPr>
+            <a:spLocks noGrp="1"/>
+          </p:cNvSpPr>
+          <p:nvPr>
+            <p:ph type="body" idx="1"/>
+          </p:nvPr>
+        </p:nvSpPr>
+        <p:spPr/>
+        <p:txBody>
+          <a:bodyPr/>
+          <a:lstStyle/>
+          <a:p>
+            <a:pPr marL="171450" indent="-171450">
+              <a:buFontTx/>
+              <a:buChar char="-"/>
+            </a:pPr>
+            <a:endParaRPr lang="en-US" dirty="0"/>
+          </a:p>
+        </p:txBody>
+      </p:sp>
+      <p:sp>
+        <p:nvSpPr>
+          <p:cNvPr id="4" name="Slide Number Placeholder 3"/>
+          <p:cNvSpPr>
+            <a:spLocks noGrp="1"/>
+          </p:cNvSpPr>
+          <p:nvPr>
+            <p:ph type="sldNum" sz="quarter" idx="10"/>
+          </p:nvPr>
+        </p:nvSpPr>
+        <p:spPr/>
+        <p:txBody>
+          <a:bodyPr/>
+          <a:lstStyle/>
+          <a:p>
+            <a:fld id="{1248D640-4A2F-4A8C-8E2D-3C6025A34183}" type="slidenum">
+              <a:rPr lang="en-US" smtClean="0"/>
+              <a:t>25</a:t>
+            </a:fld>
+            <a:endParaRPr lang="en-US"/>
+          </a:p>
+        </p:txBody>
+      </p:sp>
+    </p:spTree>
+    <p:extLst>
+      <p:ext uri="{BB962C8B-B14F-4D97-AF65-F5344CB8AC3E}">
+        <p14:creationId xmlns:p14="http://schemas.microsoft.com/office/powerpoint/2010/main" val="3603737398"/>
+      </p:ext>
+    </p:extLst>
+  </p:cSld>
+  <p:clrMapOvr>
+    <a:masterClrMapping/>
+  </p:clrMapOvr>
+</p:notes>
+</file>
+
+<file path=ppt/notesSlides/notesSlide25.xml><?xml version="1.0" encoding="utf-8"?>
+<p:notes xmlns:a="http://schemas.openxmlformats.org/drawingml/2006/main" xmlns:r="http://schemas.openxmlformats.org/officeDocument/2006/relationships" xmlns:p="http://schemas.openxmlformats.org/presentationml/2006/main">
+  <p:cSld>
+    <p:spTree>
+      <p:nvGrpSpPr>
+        <p:cNvPr id="1" name=""/>
+        <p:cNvGrpSpPr/>
+        <p:nvPr/>
+      </p:nvGrpSpPr>
+      <p:grpSpPr>
+        <a:xfrm>
+          <a:off x="0" y="0"/>
+          <a:ext cx="0" cy="0"/>
+          <a:chOff x="0" y="0"/>
+          <a:chExt cx="0" cy="0"/>
+        </a:xfrm>
+      </p:grpSpPr>
+      <p:sp>
+        <p:nvSpPr>
+          <p:cNvPr id="2" name="Slide Image Placeholder 1"/>
+          <p:cNvSpPr>
+            <a:spLocks noGrp="1" noRot="1" noChangeAspect="1"/>
+          </p:cNvSpPr>
+          <p:nvPr>
+            <p:ph type="sldImg"/>
+          </p:nvPr>
+        </p:nvSpPr>
+        <p:spPr/>
+      </p:sp>
+      <p:sp>
+        <p:nvSpPr>
+          <p:cNvPr id="3" name="Notes Placeholder 2"/>
+          <p:cNvSpPr>
+            <a:spLocks noGrp="1"/>
+          </p:cNvSpPr>
+          <p:nvPr>
+            <p:ph type="body" idx="1"/>
+          </p:nvPr>
+        </p:nvSpPr>
+        <p:spPr/>
+        <p:txBody>
+          <a:bodyPr/>
+          <a:lstStyle/>
+          <a:p>
+            <a:pPr marL="171450" indent="-171450">
+              <a:buFontTx/>
+              <a:buChar char="-"/>
+            </a:pPr>
+            <a:endParaRPr lang="en-US" dirty="0"/>
+          </a:p>
+        </p:txBody>
+      </p:sp>
+      <p:sp>
+        <p:nvSpPr>
+          <p:cNvPr id="4" name="Slide Number Placeholder 3"/>
+          <p:cNvSpPr>
+            <a:spLocks noGrp="1"/>
+          </p:cNvSpPr>
+          <p:nvPr>
+            <p:ph type="sldNum" sz="quarter" idx="10"/>
+          </p:nvPr>
+        </p:nvSpPr>
+        <p:spPr/>
+        <p:txBody>
+          <a:bodyPr/>
+          <a:lstStyle/>
+          <a:p>
+            <a:fld id="{1248D640-4A2F-4A8C-8E2D-3C6025A34183}" type="slidenum">
+              <a:rPr lang="en-US" smtClean="0"/>
+              <a:t>26</a:t>
+            </a:fld>
+            <a:endParaRPr lang="en-US"/>
+          </a:p>
+        </p:txBody>
+      </p:sp>
+    </p:spTree>
+    <p:extLst>
+      <p:ext uri="{BB962C8B-B14F-4D97-AF65-F5344CB8AC3E}">
+        <p14:creationId xmlns:p14="http://schemas.microsoft.com/office/powerpoint/2010/main" val="3753447230"/>
+      </p:ext>
+    </p:extLst>
+  </p:cSld>
+  <p:clrMapOvr>
+    <a:masterClrMapping/>
+  </p:clrMapOvr>
+</p:notes>
+</file>
+
+<file path=ppt/notesSlides/notesSlide26.xml><?xml version="1.0" encoding="utf-8"?>
+<p:notes xmlns:a="http://schemas.openxmlformats.org/drawingml/2006/main" xmlns:r="http://schemas.openxmlformats.org/officeDocument/2006/relationships" xmlns:p="http://schemas.openxmlformats.org/presentationml/2006/main">
+  <p:cSld>
+    <p:spTree>
+      <p:nvGrpSpPr>
+        <p:cNvPr id="1" name=""/>
+        <p:cNvGrpSpPr/>
+        <p:nvPr/>
+      </p:nvGrpSpPr>
+      <p:grpSpPr>
+        <a:xfrm>
+          <a:off x="0" y="0"/>
+          <a:ext cx="0" cy="0"/>
+          <a:chOff x="0" y="0"/>
+          <a:chExt cx="0" cy="0"/>
+        </a:xfrm>
+      </p:grpSpPr>
+      <p:sp>
+        <p:nvSpPr>
+          <p:cNvPr id="2" name="Slide Image Placeholder 1"/>
+          <p:cNvSpPr>
+            <a:spLocks noGrp="1" noRot="1" noChangeAspect="1"/>
+          </p:cNvSpPr>
+          <p:nvPr>
+            <p:ph type="sldImg"/>
+          </p:nvPr>
+        </p:nvSpPr>
+        <p:spPr/>
+      </p:sp>
+      <p:sp>
+        <p:nvSpPr>
+          <p:cNvPr id="3" name="Notes Placeholder 2"/>
+          <p:cNvSpPr>
+            <a:spLocks noGrp="1"/>
+          </p:cNvSpPr>
+          <p:nvPr>
+            <p:ph type="body" idx="1"/>
+          </p:nvPr>
+        </p:nvSpPr>
+        <p:spPr/>
+        <p:txBody>
+          <a:bodyPr/>
+          <a:lstStyle/>
+          <a:p>
+            <a:pPr marL="171450" indent="-171450">
+              <a:buFontTx/>
+              <a:buChar char="-"/>
+            </a:pPr>
+            <a:endParaRPr lang="en-US" dirty="0"/>
+          </a:p>
+        </p:txBody>
+      </p:sp>
+      <p:sp>
+        <p:nvSpPr>
+          <p:cNvPr id="4" name="Slide Number Placeholder 3"/>
+          <p:cNvSpPr>
+            <a:spLocks noGrp="1"/>
+          </p:cNvSpPr>
+          <p:nvPr>
+            <p:ph type="sldNum" sz="quarter" idx="10"/>
+          </p:nvPr>
+        </p:nvSpPr>
+        <p:spPr/>
+        <p:txBody>
+          <a:bodyPr/>
+          <a:lstStyle/>
+          <a:p>
+            <a:fld id="{1248D640-4A2F-4A8C-8E2D-3C6025A34183}" type="slidenum">
+              <a:rPr lang="en-US" smtClean="0"/>
+              <a:t>28</a:t>
+            </a:fld>
+            <a:endParaRPr lang="en-US"/>
+          </a:p>
+        </p:txBody>
+      </p:sp>
+    </p:spTree>
+    <p:extLst>
+      <p:ext uri="{BB962C8B-B14F-4D97-AF65-F5344CB8AC3E}">
+        <p14:creationId xmlns:p14="http://schemas.microsoft.com/office/powerpoint/2010/main" val="3885946358"/>
       </p:ext>
     </p:extLst>
   </p:cSld>
@@ -6746,8 +7378,8 @@
           </a:p>
           <a:p>
             <a:r>
-              <a:rPr lang="en-US" smtClean="0"/>
-              <a:t>Not</a:t>
+              <a:rPr lang="en-US" dirty="0" smtClean="0"/>
+              <a:t>Not a lot of information on external sites</a:t>
             </a:r>
             <a:endParaRPr lang="en-US" dirty="0" smtClean="0"/>
           </a:p>
@@ -6976,18 +7608,682 @@
       </p:grpSpPr>
       <p:sp>
         <p:nvSpPr>
-          <p:cNvPr id="3" name="Content Placeholder 2"/>
-          <p:cNvSpPr>
-            <a:spLocks noGrp="1"/>
-          </p:cNvSpPr>
-          <p:nvPr>
-            <p:ph idx="1"/>
+          <p:cNvPr id="2" name="Title 1"/>
+          <p:cNvSpPr>
+            <a:spLocks noGrp="1"/>
+          </p:cNvSpPr>
+          <p:nvPr>
+            <p:ph type="title"/>
           </p:nvPr>
         </p:nvSpPr>
         <p:spPr>
           <a:xfrm>
-            <a:off x="1012371" y="2908663"/>
-            <a:ext cx="10515600" cy="679269"/>
+            <a:off x="838200" y="365126"/>
+            <a:ext cx="10515600" cy="714738"/>
+          </a:xfrm>
+        </p:spPr>
+        <p:txBody>
+          <a:bodyPr/>
+          <a:lstStyle/>
+          <a:p>
+            <a:r>
+              <a:rPr lang="en-US" dirty="0" smtClean="0"/>
+              <a:t>Plugins</a:t>
+            </a:r>
+            <a:endParaRPr lang="en-US" dirty="0"/>
+          </a:p>
+        </p:txBody>
+      </p:sp>
+      <p:sp>
+        <p:nvSpPr>
+          <p:cNvPr id="3" name="Content Placeholder 2"/>
+          <p:cNvSpPr>
+            <a:spLocks noGrp="1"/>
+          </p:cNvSpPr>
+          <p:nvPr>
+            <p:ph idx="1"/>
+          </p:nvPr>
+        </p:nvSpPr>
+        <p:spPr>
+          <a:xfrm>
+            <a:off x="838200" y="1227909"/>
+            <a:ext cx="10515600" cy="4949054"/>
+          </a:xfrm>
+        </p:spPr>
+        <p:txBody>
+          <a:bodyPr/>
+          <a:lstStyle/>
+          <a:p>
+            <a:endParaRPr lang="fr-FR" dirty="0" smtClean="0"/>
+          </a:p>
+          <a:p>
+            <a:r>
+              <a:rPr lang="en-US" b="1" dirty="0" smtClean="0"/>
+              <a:t>Grunt</a:t>
+            </a:r>
+            <a:r>
+              <a:rPr lang="en-US" dirty="0" smtClean="0"/>
+              <a:t>: 2000+, but a lot of this plugins were never updated after first release</a:t>
+            </a:r>
+          </a:p>
+          <a:p>
+            <a:endParaRPr lang="en-US" dirty="0" smtClean="0"/>
+          </a:p>
+          <a:p>
+            <a:r>
+              <a:rPr lang="en-US" b="1" dirty="0" smtClean="0"/>
+              <a:t>Gulp</a:t>
+            </a:r>
+            <a:r>
+              <a:rPr lang="en-US" dirty="0" smtClean="0"/>
+              <a:t>: 200+, but this amount </a:t>
+            </a:r>
+            <a:r>
+              <a:rPr lang="en-US" dirty="0" smtClean="0"/>
+              <a:t>increase</a:t>
+            </a:r>
+            <a:r>
+              <a:rPr lang="en-US" dirty="0" smtClean="0"/>
+              <a:t> like a shot</a:t>
+            </a:r>
+          </a:p>
+          <a:p>
+            <a:endParaRPr lang="en-US" dirty="0" smtClean="0"/>
+          </a:p>
+          <a:p>
+            <a:r>
+              <a:rPr lang="en-US" b="1" dirty="0" smtClean="0"/>
+              <a:t>Gear</a:t>
+            </a:r>
+            <a:r>
+              <a:rPr lang="en-US" dirty="0" smtClean="0"/>
+              <a:t>: WAT?! What you talking about, dude?</a:t>
+            </a:r>
+            <a:endParaRPr lang="en-US" dirty="0" smtClean="0"/>
+          </a:p>
+          <a:p>
+            <a:endParaRPr lang="en-US" dirty="0" smtClean="0"/>
+          </a:p>
+          <a:p>
+            <a:r>
+              <a:rPr lang="en-US" b="1" dirty="0" smtClean="0"/>
+              <a:t>Brunch</a:t>
+            </a:r>
+            <a:r>
+              <a:rPr lang="en-US" dirty="0" smtClean="0"/>
+              <a:t>: 50+, amount increase but a bit slowly</a:t>
+            </a:r>
+            <a:endParaRPr lang="en-US" dirty="0" smtClean="0"/>
+          </a:p>
+        </p:txBody>
+      </p:sp>
+    </p:spTree>
+    <p:extLst>
+      <p:ext uri="{BB962C8B-B14F-4D97-AF65-F5344CB8AC3E}">
+        <p14:creationId xmlns:p14="http://schemas.microsoft.com/office/powerpoint/2010/main" val="2992804383"/>
+      </p:ext>
+    </p:extLst>
+  </p:cSld>
+  <p:clrMapOvr>
+    <a:masterClrMapping/>
+  </p:clrMapOvr>
+</p:sld>
+</file>
+
+<file path=ppt/slides/slide22.xml><?xml version="1.0" encoding="utf-8"?>
+<p:sld xmlns:a="http://schemas.openxmlformats.org/drawingml/2006/main" xmlns:r="http://schemas.openxmlformats.org/officeDocument/2006/relationships" xmlns:p="http://schemas.openxmlformats.org/presentationml/2006/main">
+  <p:cSld>
+    <p:spTree>
+      <p:nvGrpSpPr>
+        <p:cNvPr id="1" name=""/>
+        <p:cNvGrpSpPr/>
+        <p:nvPr/>
+      </p:nvGrpSpPr>
+      <p:grpSpPr>
+        <a:xfrm>
+          <a:off x="0" y="0"/>
+          <a:ext cx="0" cy="0"/>
+          <a:chOff x="0" y="0"/>
+          <a:chExt cx="0" cy="0"/>
+        </a:xfrm>
+      </p:grpSpPr>
+      <p:sp>
+        <p:nvSpPr>
+          <p:cNvPr id="2" name="Title 1"/>
+          <p:cNvSpPr>
+            <a:spLocks noGrp="1"/>
+          </p:cNvSpPr>
+          <p:nvPr>
+            <p:ph type="title"/>
+          </p:nvPr>
+        </p:nvSpPr>
+        <p:spPr>
+          <a:xfrm>
+            <a:off x="0" y="2894681"/>
+            <a:ext cx="12191999" cy="714738"/>
+          </a:xfrm>
+        </p:spPr>
+        <p:txBody>
+          <a:bodyPr/>
+          <a:lstStyle/>
+          <a:p>
+            <a:pPr algn="ctr"/>
+            <a:r>
+              <a:rPr lang="fr-FR" dirty="0" smtClean="0"/>
+              <a:t>Conclusions</a:t>
+            </a:r>
+            <a:endParaRPr lang="en-US" dirty="0"/>
+          </a:p>
+        </p:txBody>
+      </p:sp>
+    </p:spTree>
+    <p:extLst>
+      <p:ext uri="{BB962C8B-B14F-4D97-AF65-F5344CB8AC3E}">
+        <p14:creationId xmlns:p14="http://schemas.microsoft.com/office/powerpoint/2010/main" val="1148164457"/>
+      </p:ext>
+    </p:extLst>
+  </p:cSld>
+  <p:clrMapOvr>
+    <a:masterClrMapping/>
+  </p:clrMapOvr>
+</p:sld>
+</file>
+
+<file path=ppt/slides/slide23.xml><?xml version="1.0" encoding="utf-8"?>
+<p:sld xmlns:a="http://schemas.openxmlformats.org/drawingml/2006/main" xmlns:r="http://schemas.openxmlformats.org/officeDocument/2006/relationships" xmlns:p="http://schemas.openxmlformats.org/presentationml/2006/main">
+  <p:cSld>
+    <p:spTree>
+      <p:nvGrpSpPr>
+        <p:cNvPr id="1" name=""/>
+        <p:cNvGrpSpPr/>
+        <p:nvPr/>
+      </p:nvGrpSpPr>
+      <p:grpSpPr>
+        <a:xfrm>
+          <a:off x="0" y="0"/>
+          <a:ext cx="0" cy="0"/>
+          <a:chOff x="0" y="0"/>
+          <a:chExt cx="0" cy="0"/>
+        </a:xfrm>
+      </p:grpSpPr>
+      <p:sp>
+        <p:nvSpPr>
+          <p:cNvPr id="2" name="Title 1"/>
+          <p:cNvSpPr>
+            <a:spLocks noGrp="1"/>
+          </p:cNvSpPr>
+          <p:nvPr>
+            <p:ph type="title"/>
+          </p:nvPr>
+        </p:nvSpPr>
+        <p:spPr>
+          <a:xfrm>
+            <a:off x="838200" y="365126"/>
+            <a:ext cx="10515600" cy="714738"/>
+          </a:xfrm>
+        </p:spPr>
+        <p:txBody>
+          <a:bodyPr/>
+          <a:lstStyle/>
+          <a:p>
+            <a:r>
+              <a:rPr lang="en-US" dirty="0" smtClean="0"/>
+              <a:t>Grunt</a:t>
+            </a:r>
+            <a:endParaRPr lang="en-US" dirty="0"/>
+          </a:p>
+        </p:txBody>
+      </p:sp>
+      <p:sp>
+        <p:nvSpPr>
+          <p:cNvPr id="3" name="Content Placeholder 2"/>
+          <p:cNvSpPr>
+            <a:spLocks noGrp="1"/>
+          </p:cNvSpPr>
+          <p:nvPr>
+            <p:ph idx="1"/>
+          </p:nvPr>
+        </p:nvSpPr>
+        <p:spPr>
+          <a:xfrm>
+            <a:off x="838200" y="1227909"/>
+            <a:ext cx="10515600" cy="4949054"/>
+          </a:xfrm>
+        </p:spPr>
+        <p:txBody>
+          <a:bodyPr/>
+          <a:lstStyle/>
+          <a:p>
+            <a:endParaRPr lang="fr-FR" dirty="0" smtClean="0"/>
+          </a:p>
+          <a:p>
+            <a:r>
+              <a:rPr lang="en-US" dirty="0" smtClean="0"/>
+              <a:t>No clean idea about project future</a:t>
+            </a:r>
+          </a:p>
+          <a:p>
+            <a:endParaRPr lang="en-US" dirty="0" smtClean="0"/>
+          </a:p>
+          <a:p>
+            <a:r>
+              <a:rPr lang="en-US" dirty="0" smtClean="0"/>
+              <a:t>Maintainers seem to </a:t>
+            </a:r>
+            <a:r>
+              <a:rPr lang="en-US" dirty="0" smtClean="0"/>
+              <a:t>stop gaps of different nature, instead of fix performance problems</a:t>
+            </a:r>
+            <a:endParaRPr lang="en-US" dirty="0" smtClean="0"/>
+          </a:p>
+          <a:p>
+            <a:endParaRPr lang="en-US" dirty="0" smtClean="0"/>
+          </a:p>
+          <a:p>
+            <a:r>
+              <a:rPr lang="en-US" dirty="0" smtClean="0"/>
+              <a:t>More and more users turn to another build systems</a:t>
+            </a:r>
+          </a:p>
+          <a:p>
+            <a:endParaRPr lang="fr-FR" dirty="0"/>
+          </a:p>
+          <a:p>
+            <a:r>
+              <a:rPr lang="en-US" dirty="0" smtClean="0"/>
+              <a:t>Project starts to wither</a:t>
+            </a:r>
+          </a:p>
+        </p:txBody>
+      </p:sp>
+    </p:spTree>
+    <p:extLst>
+      <p:ext uri="{BB962C8B-B14F-4D97-AF65-F5344CB8AC3E}">
+        <p14:creationId xmlns:p14="http://schemas.microsoft.com/office/powerpoint/2010/main" val="4180529921"/>
+      </p:ext>
+    </p:extLst>
+  </p:cSld>
+  <p:clrMapOvr>
+    <a:masterClrMapping/>
+  </p:clrMapOvr>
+</p:sld>
+</file>
+
+<file path=ppt/slides/slide24.xml><?xml version="1.0" encoding="utf-8"?>
+<p:sld xmlns:a="http://schemas.openxmlformats.org/drawingml/2006/main" xmlns:r="http://schemas.openxmlformats.org/officeDocument/2006/relationships" xmlns:p="http://schemas.openxmlformats.org/presentationml/2006/main">
+  <p:cSld>
+    <p:spTree>
+      <p:nvGrpSpPr>
+        <p:cNvPr id="1" name=""/>
+        <p:cNvGrpSpPr/>
+        <p:nvPr/>
+      </p:nvGrpSpPr>
+      <p:grpSpPr>
+        <a:xfrm>
+          <a:off x="0" y="0"/>
+          <a:ext cx="0" cy="0"/>
+          <a:chOff x="0" y="0"/>
+          <a:chExt cx="0" cy="0"/>
+        </a:xfrm>
+      </p:grpSpPr>
+      <p:sp>
+        <p:nvSpPr>
+          <p:cNvPr id="2" name="Title 1"/>
+          <p:cNvSpPr>
+            <a:spLocks noGrp="1"/>
+          </p:cNvSpPr>
+          <p:nvPr>
+            <p:ph type="title"/>
+          </p:nvPr>
+        </p:nvSpPr>
+        <p:spPr>
+          <a:xfrm>
+            <a:off x="838200" y="365126"/>
+            <a:ext cx="10515600" cy="714738"/>
+          </a:xfrm>
+        </p:spPr>
+        <p:txBody>
+          <a:bodyPr/>
+          <a:lstStyle/>
+          <a:p>
+            <a:r>
+              <a:rPr lang="en-US" dirty="0" smtClean="0"/>
+              <a:t>Gulp</a:t>
+            </a:r>
+            <a:endParaRPr lang="en-US" dirty="0"/>
+          </a:p>
+        </p:txBody>
+      </p:sp>
+      <p:sp>
+        <p:nvSpPr>
+          <p:cNvPr id="3" name="Content Placeholder 2"/>
+          <p:cNvSpPr>
+            <a:spLocks noGrp="1"/>
+          </p:cNvSpPr>
+          <p:nvPr>
+            <p:ph idx="1"/>
+          </p:nvPr>
+        </p:nvSpPr>
+        <p:spPr>
+          <a:xfrm>
+            <a:off x="838200" y="1740657"/>
+            <a:ext cx="10515600" cy="4949054"/>
+          </a:xfrm>
+        </p:spPr>
+        <p:txBody>
+          <a:bodyPr/>
+          <a:lstStyle/>
+          <a:p>
+            <a:endParaRPr lang="fr-FR" dirty="0" smtClean="0"/>
+          </a:p>
+          <a:p>
+            <a:r>
+              <a:rPr lang="en-US" dirty="0" smtClean="0"/>
+              <a:t>Like fresh air </a:t>
+            </a:r>
+            <a:r>
+              <a:rPr lang="fr-FR" dirty="0" err="1" smtClean="0"/>
+              <a:t>sip</a:t>
+            </a:r>
+            <a:r>
+              <a:rPr lang="fr-FR" dirty="0" smtClean="0"/>
+              <a:t> </a:t>
+            </a:r>
+            <a:r>
+              <a:rPr lang="fr-FR" dirty="0" err="1" smtClean="0"/>
+              <a:t>after</a:t>
+            </a:r>
+            <a:r>
+              <a:rPr lang="fr-FR" dirty="0" smtClean="0"/>
+              <a:t> </a:t>
+            </a:r>
+            <a:r>
+              <a:rPr lang="fr-FR" dirty="0" err="1" smtClean="0"/>
+              <a:t>Grunt</a:t>
+            </a:r>
+            <a:endParaRPr lang="en-US" dirty="0" smtClean="0"/>
+          </a:p>
+          <a:p>
+            <a:endParaRPr lang="en-US" dirty="0" smtClean="0"/>
+          </a:p>
+          <a:p>
+            <a:r>
+              <a:rPr lang="en-US" dirty="0" smtClean="0"/>
+              <a:t>Project </a:t>
+            </a:r>
+            <a:r>
+              <a:rPr lang="en-US" dirty="0" smtClean="0"/>
+              <a:t>goes forward at a steady gait</a:t>
+            </a:r>
+            <a:endParaRPr lang="en-US" dirty="0" smtClean="0"/>
+          </a:p>
+          <a:p>
+            <a:endParaRPr lang="en-US" dirty="0" smtClean="0"/>
+          </a:p>
+          <a:p>
+            <a:r>
+              <a:rPr lang="en-US" dirty="0" smtClean="0"/>
+              <a:t>Project is growing fast</a:t>
+            </a:r>
+          </a:p>
+          <a:p>
+            <a:endParaRPr lang="fr-FR" dirty="0"/>
+          </a:p>
+        </p:txBody>
+      </p:sp>
+    </p:spTree>
+    <p:extLst>
+      <p:ext uri="{BB962C8B-B14F-4D97-AF65-F5344CB8AC3E}">
+        <p14:creationId xmlns:p14="http://schemas.microsoft.com/office/powerpoint/2010/main" val="3808748262"/>
+      </p:ext>
+    </p:extLst>
+  </p:cSld>
+  <p:clrMapOvr>
+    <a:masterClrMapping/>
+  </p:clrMapOvr>
+</p:sld>
+</file>
+
+<file path=ppt/slides/slide25.xml><?xml version="1.0" encoding="utf-8"?>
+<p:sld xmlns:a="http://schemas.openxmlformats.org/drawingml/2006/main" xmlns:r="http://schemas.openxmlformats.org/officeDocument/2006/relationships" xmlns:p="http://schemas.openxmlformats.org/presentationml/2006/main">
+  <p:cSld>
+    <p:spTree>
+      <p:nvGrpSpPr>
+        <p:cNvPr id="1" name=""/>
+        <p:cNvGrpSpPr/>
+        <p:nvPr/>
+      </p:nvGrpSpPr>
+      <p:grpSpPr>
+        <a:xfrm>
+          <a:off x="0" y="0"/>
+          <a:ext cx="0" cy="0"/>
+          <a:chOff x="0" y="0"/>
+          <a:chExt cx="0" cy="0"/>
+        </a:xfrm>
+      </p:grpSpPr>
+      <p:sp>
+        <p:nvSpPr>
+          <p:cNvPr id="2" name="Title 1"/>
+          <p:cNvSpPr>
+            <a:spLocks noGrp="1"/>
+          </p:cNvSpPr>
+          <p:nvPr>
+            <p:ph type="title"/>
+          </p:nvPr>
+        </p:nvSpPr>
+        <p:spPr>
+          <a:xfrm>
+            <a:off x="838200" y="365126"/>
+            <a:ext cx="10515600" cy="714738"/>
+          </a:xfrm>
+        </p:spPr>
+        <p:txBody>
+          <a:bodyPr/>
+          <a:lstStyle/>
+          <a:p>
+            <a:r>
+              <a:rPr lang="fr-FR" dirty="0" err="1" smtClean="0"/>
+              <a:t>Gear</a:t>
+            </a:r>
+            <a:endParaRPr lang="en-US" dirty="0"/>
+          </a:p>
+        </p:txBody>
+      </p:sp>
+      <p:sp>
+        <p:nvSpPr>
+          <p:cNvPr id="3" name="Content Placeholder 2"/>
+          <p:cNvSpPr>
+            <a:spLocks noGrp="1"/>
+          </p:cNvSpPr>
+          <p:nvPr>
+            <p:ph idx="1"/>
+          </p:nvPr>
+        </p:nvSpPr>
+        <p:spPr>
+          <a:xfrm>
+            <a:off x="838200" y="1885935"/>
+            <a:ext cx="10515600" cy="2985168"/>
+          </a:xfrm>
+        </p:spPr>
+        <p:txBody>
+          <a:bodyPr/>
+          <a:lstStyle/>
+          <a:p>
+            <a:endParaRPr lang="en-US" dirty="0" smtClean="0"/>
+          </a:p>
+          <a:p>
+            <a:r>
+              <a:rPr lang="en-US" dirty="0" smtClean="0"/>
+              <a:t>Seems to be an internal project pulled to the public just because it’s a company spirit</a:t>
+            </a:r>
+          </a:p>
+          <a:p>
+            <a:endParaRPr lang="en-US" dirty="0" smtClean="0"/>
+          </a:p>
+          <a:p>
+            <a:r>
+              <a:rPr lang="en-US" dirty="0" smtClean="0"/>
+              <a:t>No activity during last 8 months</a:t>
+            </a:r>
+          </a:p>
+          <a:p>
+            <a:endParaRPr lang="en-US" dirty="0" smtClean="0"/>
+          </a:p>
+        </p:txBody>
+      </p:sp>
+    </p:spTree>
+    <p:extLst>
+      <p:ext uri="{BB962C8B-B14F-4D97-AF65-F5344CB8AC3E}">
+        <p14:creationId xmlns:p14="http://schemas.microsoft.com/office/powerpoint/2010/main" val="757443131"/>
+      </p:ext>
+    </p:extLst>
+  </p:cSld>
+  <p:clrMapOvr>
+    <a:masterClrMapping/>
+  </p:clrMapOvr>
+</p:sld>
+</file>
+
+<file path=ppt/slides/slide26.xml><?xml version="1.0" encoding="utf-8"?>
+<p:sld xmlns:a="http://schemas.openxmlformats.org/drawingml/2006/main" xmlns:r="http://schemas.openxmlformats.org/officeDocument/2006/relationships" xmlns:p="http://schemas.openxmlformats.org/presentationml/2006/main">
+  <p:cSld>
+    <p:spTree>
+      <p:nvGrpSpPr>
+        <p:cNvPr id="1" name=""/>
+        <p:cNvGrpSpPr/>
+        <p:nvPr/>
+      </p:nvGrpSpPr>
+      <p:grpSpPr>
+        <a:xfrm>
+          <a:off x="0" y="0"/>
+          <a:ext cx="0" cy="0"/>
+          <a:chOff x="0" y="0"/>
+          <a:chExt cx="0" cy="0"/>
+        </a:xfrm>
+      </p:grpSpPr>
+      <p:sp>
+        <p:nvSpPr>
+          <p:cNvPr id="2" name="Title 1"/>
+          <p:cNvSpPr>
+            <a:spLocks noGrp="1"/>
+          </p:cNvSpPr>
+          <p:nvPr>
+            <p:ph type="title"/>
+          </p:nvPr>
+        </p:nvSpPr>
+        <p:spPr>
+          <a:xfrm>
+            <a:off x="838200" y="365126"/>
+            <a:ext cx="10515600" cy="714738"/>
+          </a:xfrm>
+        </p:spPr>
+        <p:txBody>
+          <a:bodyPr/>
+          <a:lstStyle/>
+          <a:p>
+            <a:r>
+              <a:rPr lang="en-US" dirty="0" smtClean="0"/>
+              <a:t>Brunch</a:t>
+            </a:r>
+            <a:endParaRPr lang="en-US" dirty="0"/>
+          </a:p>
+        </p:txBody>
+      </p:sp>
+      <p:sp>
+        <p:nvSpPr>
+          <p:cNvPr id="3" name="Content Placeholder 2"/>
+          <p:cNvSpPr>
+            <a:spLocks noGrp="1"/>
+          </p:cNvSpPr>
+          <p:nvPr>
+            <p:ph idx="1"/>
+          </p:nvPr>
+        </p:nvSpPr>
+        <p:spPr>
+          <a:xfrm>
+            <a:off x="838200" y="1826114"/>
+            <a:ext cx="10515600" cy="3318454"/>
+          </a:xfrm>
+        </p:spPr>
+        <p:txBody>
+          <a:bodyPr/>
+          <a:lstStyle/>
+          <a:p>
+            <a:endParaRPr lang="fr-FR" dirty="0" smtClean="0"/>
+          </a:p>
+          <a:p>
+            <a:r>
+              <a:rPr lang="en-US" dirty="0" smtClean="0"/>
+              <a:t>Good and quality project</a:t>
+            </a:r>
+          </a:p>
+          <a:p>
+            <a:endParaRPr lang="en-US" dirty="0" smtClean="0"/>
+          </a:p>
+          <a:p>
+            <a:r>
+              <a:rPr lang="en-US" dirty="0" smtClean="0"/>
+              <a:t>But it takes its time to grow, strange for this sort of potential</a:t>
+            </a:r>
+          </a:p>
+          <a:p>
+            <a:endParaRPr lang="en-US" dirty="0" smtClean="0"/>
+          </a:p>
+          <a:p>
+            <a:r>
+              <a:rPr lang="en-US" dirty="0" smtClean="0"/>
+              <a:t>It leaks only the rate of growth</a:t>
+            </a:r>
+          </a:p>
+          <a:p>
+            <a:endParaRPr lang="fr-FR" dirty="0"/>
+          </a:p>
+        </p:txBody>
+      </p:sp>
+    </p:spTree>
+    <p:extLst>
+      <p:ext uri="{BB962C8B-B14F-4D97-AF65-F5344CB8AC3E}">
+        <p14:creationId xmlns:p14="http://schemas.microsoft.com/office/powerpoint/2010/main" val="3550927524"/>
+      </p:ext>
+    </p:extLst>
+  </p:cSld>
+  <p:clrMapOvr>
+    <a:masterClrMapping/>
+  </p:clrMapOvr>
+</p:sld>
+</file>
+
+<file path=ppt/slides/slide27.xml><?xml version="1.0" encoding="utf-8"?>
+<p:sld xmlns:a="http://schemas.openxmlformats.org/drawingml/2006/main" xmlns:r="http://schemas.openxmlformats.org/officeDocument/2006/relationships" xmlns:p="http://schemas.openxmlformats.org/presentationml/2006/main">
+  <p:cSld>
+    <p:spTree>
+      <p:nvGrpSpPr>
+        <p:cNvPr id="1" name=""/>
+        <p:cNvGrpSpPr/>
+        <p:nvPr/>
+      </p:nvGrpSpPr>
+      <p:grpSpPr>
+        <a:xfrm>
+          <a:off x="0" y="0"/>
+          <a:ext cx="0" cy="0"/>
+          <a:chOff x="0" y="0"/>
+          <a:chExt cx="0" cy="0"/>
+        </a:xfrm>
+      </p:grpSpPr>
+      <p:sp>
+        <p:nvSpPr>
+          <p:cNvPr id="3" name="Content Placeholder 2"/>
+          <p:cNvSpPr>
+            <a:spLocks noGrp="1"/>
+          </p:cNvSpPr>
+          <p:nvPr>
+            <p:ph idx="1"/>
+          </p:nvPr>
+        </p:nvSpPr>
+        <p:spPr>
+          <a:xfrm>
+            <a:off x="1" y="4156349"/>
+            <a:ext cx="12191999" cy="679269"/>
           </a:xfrm>
         </p:spPr>
         <p:txBody>
@@ -7001,12 +8297,36 @@
             </a:pPr>
             <a:r>
               <a:rPr lang="en-US" sz="4400" dirty="0" smtClean="0"/>
-              <a:t>Questions ?</a:t>
+              <a:t>Gulp wins!</a:t>
             </a:r>
             <a:endParaRPr lang="en-US" sz="4400" dirty="0"/>
           </a:p>
         </p:txBody>
       </p:sp>
+      <p:pic>
+        <p:nvPicPr>
+          <p:cNvPr id="2" name="Picture 1"/>
+          <p:cNvPicPr>
+            <a:picLocks noChangeAspect="1"/>
+          </p:cNvPicPr>
+          <p:nvPr/>
+        </p:nvPicPr>
+        <p:blipFill>
+          <a:blip r:embed="rId2"/>
+          <a:stretch>
+            <a:fillRect/>
+          </a:stretch>
+        </p:blipFill>
+        <p:spPr>
+          <a:xfrm>
+            <a:off x="5248156" y="1169286"/>
+            <a:ext cx="1695687" cy="2810267"/>
+          </a:xfrm>
+          <a:prstGeom prst="rect">
+            <a:avLst/>
+          </a:prstGeom>
+        </p:spPr>
+      </p:pic>
     </p:spTree>
     <p:extLst>
       <p:ext uri="{BB962C8B-B14F-4D97-AF65-F5344CB8AC3E}">
@@ -7017,6 +8337,664 @@
   <p:clrMapOvr>
     <a:masterClrMapping/>
   </p:clrMapOvr>
+</p:sld>
+</file>
+
+<file path=ppt/slides/slide28.xml><?xml version="1.0" encoding="utf-8"?>
+<p:sld xmlns:a="http://schemas.openxmlformats.org/drawingml/2006/main" xmlns:r="http://schemas.openxmlformats.org/officeDocument/2006/relationships" xmlns:p="http://schemas.openxmlformats.org/presentationml/2006/main">
+  <p:cSld>
+    <p:spTree>
+      <p:nvGrpSpPr>
+        <p:cNvPr id="1" name=""/>
+        <p:cNvGrpSpPr/>
+        <p:nvPr/>
+      </p:nvGrpSpPr>
+      <p:grpSpPr>
+        <a:xfrm>
+          <a:off x="0" y="0"/>
+          <a:ext cx="0" cy="0"/>
+          <a:chOff x="0" y="0"/>
+          <a:chExt cx="0" cy="0"/>
+        </a:xfrm>
+      </p:grpSpPr>
+      <p:sp>
+        <p:nvSpPr>
+          <p:cNvPr id="2" name="Title 1"/>
+          <p:cNvSpPr>
+            <a:spLocks noGrp="1"/>
+          </p:cNvSpPr>
+          <p:nvPr>
+            <p:ph type="title"/>
+          </p:nvPr>
+        </p:nvSpPr>
+        <p:spPr>
+          <a:xfrm>
+            <a:off x="838200" y="365126"/>
+            <a:ext cx="10515600" cy="714738"/>
+          </a:xfrm>
+        </p:spPr>
+        <p:txBody>
+          <a:bodyPr/>
+          <a:lstStyle/>
+          <a:p>
+            <a:r>
+              <a:rPr lang="fr-FR" dirty="0" smtClean="0"/>
+              <a:t>Usage</a:t>
+            </a:r>
+            <a:endParaRPr lang="en-US" dirty="0"/>
+          </a:p>
+        </p:txBody>
+      </p:sp>
+      <p:pic>
+        <p:nvPicPr>
+          <p:cNvPr id="4" name="Picture 3"/>
+          <p:cNvPicPr>
+            <a:picLocks noChangeAspect="1"/>
+          </p:cNvPicPr>
+          <p:nvPr/>
+        </p:nvPicPr>
+        <p:blipFill>
+          <a:blip r:embed="rId3"/>
+          <a:stretch>
+            <a:fillRect/>
+          </a:stretch>
+        </p:blipFill>
+        <p:spPr>
+          <a:xfrm>
+            <a:off x="838200" y="1533241"/>
+            <a:ext cx="2915057" cy="885949"/>
+          </a:xfrm>
+          <a:prstGeom prst="rect">
+            <a:avLst/>
+          </a:prstGeom>
+        </p:spPr>
+      </p:pic>
+      <p:pic>
+        <p:nvPicPr>
+          <p:cNvPr id="6" name="Picture 5"/>
+          <p:cNvPicPr>
+            <a:picLocks noChangeAspect="1"/>
+          </p:cNvPicPr>
+          <p:nvPr/>
+        </p:nvPicPr>
+        <p:blipFill>
+          <a:blip r:embed="rId4"/>
+          <a:stretch>
+            <a:fillRect/>
+          </a:stretch>
+        </p:blipFill>
+        <p:spPr>
+          <a:xfrm>
+            <a:off x="838200" y="2831640"/>
+            <a:ext cx="2400635" cy="647790"/>
+          </a:xfrm>
+          <a:prstGeom prst="rect">
+            <a:avLst/>
+          </a:prstGeom>
+        </p:spPr>
+      </p:pic>
+      <p:pic>
+        <p:nvPicPr>
+          <p:cNvPr id="7" name="Picture 6"/>
+          <p:cNvPicPr>
+            <a:picLocks noChangeAspect="1"/>
+          </p:cNvPicPr>
+          <p:nvPr/>
+        </p:nvPicPr>
+        <p:blipFill>
+          <a:blip r:embed="rId5"/>
+          <a:stretch>
+            <a:fillRect/>
+          </a:stretch>
+        </p:blipFill>
+        <p:spPr>
+          <a:xfrm>
+            <a:off x="838200" y="3891880"/>
+            <a:ext cx="3477110" cy="1276528"/>
+          </a:xfrm>
+          <a:prstGeom prst="rect">
+            <a:avLst/>
+          </a:prstGeom>
+        </p:spPr>
+      </p:pic>
+      <p:pic>
+        <p:nvPicPr>
+          <p:cNvPr id="8" name="Picture 7"/>
+          <p:cNvPicPr>
+            <a:picLocks noChangeAspect="1"/>
+          </p:cNvPicPr>
+          <p:nvPr/>
+        </p:nvPicPr>
+        <p:blipFill>
+          <a:blip r:embed="rId6"/>
+          <a:stretch>
+            <a:fillRect/>
+          </a:stretch>
+        </p:blipFill>
+        <p:spPr>
+          <a:xfrm>
+            <a:off x="838200" y="5580858"/>
+            <a:ext cx="2981741" cy="295316"/>
+          </a:xfrm>
+          <a:prstGeom prst="rect">
+            <a:avLst/>
+          </a:prstGeom>
+        </p:spPr>
+      </p:pic>
+      <p:sp>
+        <p:nvSpPr>
+          <p:cNvPr id="10" name="TextBox 9"/>
+          <p:cNvSpPr txBox="1"/>
+          <p:nvPr/>
+        </p:nvSpPr>
+        <p:spPr>
+          <a:xfrm>
+            <a:off x="6853727" y="1533241"/>
+            <a:ext cx="3982340" cy="3785652"/>
+          </a:xfrm>
+          <a:prstGeom prst="rect">
+            <a:avLst/>
+          </a:prstGeom>
+          <a:noFill/>
+        </p:spPr>
+        <p:txBody>
+          <a:bodyPr wrap="square" rtlCol="0">
+            <a:spAutoFit/>
+          </a:bodyPr>
+          <a:lstStyle/>
+          <a:p>
+            <a:r>
+              <a:rPr lang="fr-FR" sz="2400" dirty="0" smtClean="0">
+                <a:latin typeface="+mj-lt"/>
+              </a:rPr>
+              <a:t>Top plugins</a:t>
+            </a:r>
+          </a:p>
+          <a:p>
+            <a:endParaRPr lang="fr-FR" dirty="0" smtClean="0"/>
+          </a:p>
+          <a:p>
+            <a:pPr marL="285750" indent="-285750">
+              <a:buFont typeface="Arial" panose="020B0604020202020204" pitchFamily="34" charset="0"/>
+              <a:buChar char="•"/>
+            </a:pPr>
+            <a:r>
+              <a:rPr lang="fr-FR" dirty="0" smtClean="0">
+                <a:latin typeface="+mj-lt"/>
+              </a:rPr>
+              <a:t>coffee</a:t>
+            </a:r>
+          </a:p>
+          <a:p>
+            <a:pPr marL="285750" indent="-285750">
+              <a:buFont typeface="Arial" panose="020B0604020202020204" pitchFamily="34" charset="0"/>
+              <a:buChar char="•"/>
+            </a:pPr>
+            <a:r>
+              <a:rPr lang="fr-FR" dirty="0" err="1">
+                <a:latin typeface="+mj-lt"/>
+              </a:rPr>
+              <a:t>l</a:t>
+            </a:r>
+            <a:r>
+              <a:rPr lang="fr-FR" dirty="0" err="1" smtClean="0">
+                <a:latin typeface="+mj-lt"/>
+              </a:rPr>
+              <a:t>ess</a:t>
+            </a:r>
+            <a:endParaRPr lang="fr-FR" dirty="0" smtClean="0">
+              <a:latin typeface="+mj-lt"/>
+            </a:endParaRPr>
+          </a:p>
+          <a:p>
+            <a:pPr marL="285750" indent="-285750">
+              <a:buFont typeface="Arial" panose="020B0604020202020204" pitchFamily="34" charset="0"/>
+              <a:buChar char="•"/>
+            </a:pPr>
+            <a:r>
+              <a:rPr lang="fr-FR" dirty="0" err="1" smtClean="0">
+                <a:latin typeface="+mj-lt"/>
+              </a:rPr>
+              <a:t>watch</a:t>
+            </a:r>
+            <a:endParaRPr lang="fr-FR" dirty="0" smtClean="0">
+              <a:latin typeface="+mj-lt"/>
+            </a:endParaRPr>
+          </a:p>
+          <a:p>
+            <a:pPr marL="285750" indent="-285750">
+              <a:buFont typeface="Arial" panose="020B0604020202020204" pitchFamily="34" charset="0"/>
+              <a:buChar char="•"/>
+            </a:pPr>
+            <a:r>
+              <a:rPr lang="fr-FR" dirty="0" err="1" smtClean="0">
+                <a:latin typeface="+mj-lt"/>
+              </a:rPr>
+              <a:t>concat</a:t>
+            </a:r>
+            <a:endParaRPr lang="fr-FR" dirty="0" smtClean="0">
+              <a:latin typeface="+mj-lt"/>
+            </a:endParaRPr>
+          </a:p>
+          <a:p>
+            <a:pPr marL="285750" indent="-285750">
+              <a:buFont typeface="Arial" panose="020B0604020202020204" pitchFamily="34" charset="0"/>
+              <a:buChar char="•"/>
+            </a:pPr>
+            <a:r>
+              <a:rPr lang="fr-FR" dirty="0" err="1">
+                <a:latin typeface="+mj-lt"/>
+              </a:rPr>
+              <a:t>c</a:t>
+            </a:r>
+            <a:r>
+              <a:rPr lang="fr-FR" dirty="0" err="1" smtClean="0">
+                <a:latin typeface="+mj-lt"/>
+              </a:rPr>
+              <a:t>hanged</a:t>
+            </a:r>
+            <a:endParaRPr lang="fr-FR" dirty="0" smtClean="0">
+              <a:latin typeface="+mj-lt"/>
+            </a:endParaRPr>
+          </a:p>
+          <a:p>
+            <a:pPr marL="285750" indent="-285750">
+              <a:buFont typeface="Arial" panose="020B0604020202020204" pitchFamily="34" charset="0"/>
+              <a:buChar char="•"/>
+            </a:pPr>
+            <a:r>
+              <a:rPr lang="fr-FR" dirty="0" err="1">
+                <a:latin typeface="+mj-lt"/>
+              </a:rPr>
+              <a:t>j</a:t>
+            </a:r>
+            <a:r>
+              <a:rPr lang="fr-FR" dirty="0" err="1" smtClean="0">
+                <a:latin typeface="+mj-lt"/>
+              </a:rPr>
+              <a:t>asmine</a:t>
+            </a:r>
+            <a:endParaRPr lang="fr-FR" dirty="0" smtClean="0">
+              <a:latin typeface="+mj-lt"/>
+            </a:endParaRPr>
+          </a:p>
+          <a:p>
+            <a:pPr marL="285750" indent="-285750">
+              <a:buFont typeface="Arial" panose="020B0604020202020204" pitchFamily="34" charset="0"/>
+              <a:buChar char="•"/>
+            </a:pPr>
+            <a:r>
+              <a:rPr lang="fr-FR" dirty="0" err="1" smtClean="0">
+                <a:latin typeface="+mj-lt"/>
+              </a:rPr>
+              <a:t>cached</a:t>
+            </a:r>
+            <a:endParaRPr lang="fr-FR" dirty="0" smtClean="0">
+              <a:latin typeface="+mj-lt"/>
+            </a:endParaRPr>
+          </a:p>
+          <a:p>
+            <a:pPr marL="285750" indent="-285750">
+              <a:buFont typeface="Arial" panose="020B0604020202020204" pitchFamily="34" charset="0"/>
+              <a:buChar char="•"/>
+            </a:pPr>
+            <a:endParaRPr lang="fr-FR" dirty="0" smtClean="0">
+              <a:latin typeface="+mj-lt"/>
+            </a:endParaRPr>
+          </a:p>
+          <a:p>
+            <a:pPr marL="285750" indent="-285750">
+              <a:buFont typeface="Arial" panose="020B0604020202020204" pitchFamily="34" charset="0"/>
+              <a:buChar char="•"/>
+            </a:pPr>
+            <a:endParaRPr lang="fr-FR" dirty="0"/>
+          </a:p>
+          <a:p>
+            <a:endParaRPr lang="fr-FR" dirty="0" smtClean="0"/>
+          </a:p>
+          <a:p>
+            <a:endParaRPr lang="en-US" dirty="0"/>
+          </a:p>
+        </p:txBody>
+      </p:sp>
+    </p:spTree>
+    <p:extLst>
+      <p:ext uri="{BB962C8B-B14F-4D97-AF65-F5344CB8AC3E}">
+        <p14:creationId xmlns:p14="http://schemas.microsoft.com/office/powerpoint/2010/main" val="2005970463"/>
+      </p:ext>
+    </p:extLst>
+  </p:cSld>
+  <p:clrMapOvr>
+    <a:masterClrMapping/>
+  </p:clrMapOvr>
+  <p:timing>
+    <p:tnLst>
+      <p:par>
+        <p:cTn id="1" dur="indefinite" restart="never" nodeType="tmRoot">
+          <p:childTnLst>
+            <p:seq concurrent="1" nextAc="seek">
+              <p:cTn id="2" dur="indefinite" nodeType="mainSeq">
+                <p:childTnLst>
+                  <p:par>
+                    <p:cTn id="3" fill="hold">
+                      <p:stCondLst>
+                        <p:cond delay="indefinite"/>
+                      </p:stCondLst>
+                      <p:childTnLst>
+                        <p:par>
+                          <p:cTn id="4" fill="hold">
+                            <p:stCondLst>
+                              <p:cond delay="0"/>
+                            </p:stCondLst>
+                            <p:childTnLst>
+                              <p:par>
+                                <p:cTn id="5" presetID="1" presetClass="entr" presetSubtype="0" fill="hold" nodeType="clickEffect">
+                                  <p:stCondLst>
+                                    <p:cond delay="0"/>
+                                  </p:stCondLst>
+                                  <p:childTnLst>
+                                    <p:set>
+                                      <p:cBhvr>
+                                        <p:cTn id="6" dur="1" fill="hold">
+                                          <p:stCondLst>
+                                            <p:cond delay="0"/>
+                                          </p:stCondLst>
+                                        </p:cTn>
+                                        <p:tgtEl>
+                                          <p:spTgt spid="4"/>
+                                        </p:tgtEl>
+                                        <p:attrNameLst>
+                                          <p:attrName>style.visibility</p:attrName>
+                                        </p:attrNameLst>
+                                      </p:cBhvr>
+                                      <p:to>
+                                        <p:strVal val="visible"/>
+                                      </p:to>
+                                    </p:set>
+                                  </p:childTnLst>
+                                </p:cTn>
+                              </p:par>
+                            </p:childTnLst>
+                          </p:cTn>
+                        </p:par>
+                      </p:childTnLst>
+                    </p:cTn>
+                  </p:par>
+                  <p:par>
+                    <p:cTn id="7" fill="hold">
+                      <p:stCondLst>
+                        <p:cond delay="indefinite"/>
+                      </p:stCondLst>
+                      <p:childTnLst>
+                        <p:par>
+                          <p:cTn id="8" fill="hold">
+                            <p:stCondLst>
+                              <p:cond delay="0"/>
+                            </p:stCondLst>
+                            <p:childTnLst>
+                              <p:par>
+                                <p:cTn id="9" presetID="1" presetClass="entr" presetSubtype="0" fill="hold" nodeType="clickEffect">
+                                  <p:stCondLst>
+                                    <p:cond delay="0"/>
+                                  </p:stCondLst>
+                                  <p:childTnLst>
+                                    <p:set>
+                                      <p:cBhvr>
+                                        <p:cTn id="10" dur="1" fill="hold">
+                                          <p:stCondLst>
+                                            <p:cond delay="0"/>
+                                          </p:stCondLst>
+                                        </p:cTn>
+                                        <p:tgtEl>
+                                          <p:spTgt spid="6"/>
+                                        </p:tgtEl>
+                                        <p:attrNameLst>
+                                          <p:attrName>style.visibility</p:attrName>
+                                        </p:attrNameLst>
+                                      </p:cBhvr>
+                                      <p:to>
+                                        <p:strVal val="visible"/>
+                                      </p:to>
+                                    </p:set>
+                                  </p:childTnLst>
+                                </p:cTn>
+                              </p:par>
+                            </p:childTnLst>
+                          </p:cTn>
+                        </p:par>
+                      </p:childTnLst>
+                    </p:cTn>
+                  </p:par>
+                  <p:par>
+                    <p:cTn id="11" fill="hold">
+                      <p:stCondLst>
+                        <p:cond delay="indefinite"/>
+                      </p:stCondLst>
+                      <p:childTnLst>
+                        <p:par>
+                          <p:cTn id="12" fill="hold">
+                            <p:stCondLst>
+                              <p:cond delay="0"/>
+                            </p:stCondLst>
+                            <p:childTnLst>
+                              <p:par>
+                                <p:cTn id="13" presetID="1" presetClass="entr" presetSubtype="0" fill="hold" nodeType="clickEffect">
+                                  <p:stCondLst>
+                                    <p:cond delay="0"/>
+                                  </p:stCondLst>
+                                  <p:childTnLst>
+                                    <p:set>
+                                      <p:cBhvr>
+                                        <p:cTn id="14" dur="1" fill="hold">
+                                          <p:stCondLst>
+                                            <p:cond delay="0"/>
+                                          </p:stCondLst>
+                                        </p:cTn>
+                                        <p:tgtEl>
+                                          <p:spTgt spid="7"/>
+                                        </p:tgtEl>
+                                        <p:attrNameLst>
+                                          <p:attrName>style.visibility</p:attrName>
+                                        </p:attrNameLst>
+                                      </p:cBhvr>
+                                      <p:to>
+                                        <p:strVal val="visible"/>
+                                      </p:to>
+                                    </p:set>
+                                  </p:childTnLst>
+                                </p:cTn>
+                              </p:par>
+                            </p:childTnLst>
+                          </p:cTn>
+                        </p:par>
+                      </p:childTnLst>
+                    </p:cTn>
+                  </p:par>
+                  <p:par>
+                    <p:cTn id="15" fill="hold">
+                      <p:stCondLst>
+                        <p:cond delay="indefinite"/>
+                      </p:stCondLst>
+                      <p:childTnLst>
+                        <p:par>
+                          <p:cTn id="16" fill="hold">
+                            <p:stCondLst>
+                              <p:cond delay="0"/>
+                            </p:stCondLst>
+                            <p:childTnLst>
+                              <p:par>
+                                <p:cTn id="17" presetID="1" presetClass="entr" presetSubtype="0" fill="hold" nodeType="clickEffect">
+                                  <p:stCondLst>
+                                    <p:cond delay="0"/>
+                                  </p:stCondLst>
+                                  <p:childTnLst>
+                                    <p:set>
+                                      <p:cBhvr>
+                                        <p:cTn id="18" dur="1" fill="hold">
+                                          <p:stCondLst>
+                                            <p:cond delay="0"/>
+                                          </p:stCondLst>
+                                        </p:cTn>
+                                        <p:tgtEl>
+                                          <p:spTgt spid="8"/>
+                                        </p:tgtEl>
+                                        <p:attrNameLst>
+                                          <p:attrName>style.visibility</p:attrName>
+                                        </p:attrNameLst>
+                                      </p:cBhvr>
+                                      <p:to>
+                                        <p:strVal val="visible"/>
+                                      </p:to>
+                                    </p:set>
+                                  </p:childTnLst>
+                                </p:cTn>
+                              </p:par>
+                            </p:childTnLst>
+                          </p:cTn>
+                        </p:par>
+                      </p:childTnLst>
+                    </p:cTn>
+                  </p:par>
+                  <p:par>
+                    <p:cTn id="19" fill="hold">
+                      <p:stCondLst>
+                        <p:cond delay="indefinite"/>
+                      </p:stCondLst>
+                      <p:childTnLst>
+                        <p:par>
+                          <p:cTn id="20" fill="hold">
+                            <p:stCondLst>
+                              <p:cond delay="0"/>
+                            </p:stCondLst>
+                            <p:childTnLst>
+                              <p:par>
+                                <p:cTn id="21" presetID="1" presetClass="entr" presetSubtype="0" fill="hold" grpId="0" nodeType="clickEffect">
+                                  <p:stCondLst>
+                                    <p:cond delay="0"/>
+                                  </p:stCondLst>
+                                  <p:childTnLst>
+                                    <p:set>
+                                      <p:cBhvr>
+                                        <p:cTn id="22" dur="1" fill="hold">
+                                          <p:stCondLst>
+                                            <p:cond delay="0"/>
+                                          </p:stCondLst>
+                                        </p:cTn>
+                                        <p:tgtEl>
+                                          <p:spTgt spid="10"/>
+                                        </p:tgtEl>
+                                        <p:attrNameLst>
+                                          <p:attrName>style.visibility</p:attrName>
+                                        </p:attrNameLst>
+                                      </p:cBhvr>
+                                      <p:to>
+                                        <p:strVal val="visible"/>
+                                      </p:to>
+                                    </p:set>
+                                  </p:childTnLst>
+                                </p:cTn>
+                              </p:par>
+                            </p:childTnLst>
+                          </p:cTn>
+                        </p:par>
+                      </p:childTnLst>
+                    </p:cTn>
+                  </p:par>
+                </p:childTnLst>
+              </p:cTn>
+              <p:prevCondLst>
+                <p:cond evt="onPrev" delay="0">
+                  <p:tgtEl>
+                    <p:sldTgt/>
+                  </p:tgtEl>
+                </p:cond>
+              </p:prevCondLst>
+              <p:nextCondLst>
+                <p:cond evt="onNext" delay="0">
+                  <p:tgtEl>
+                    <p:sldTgt/>
+                  </p:tgtEl>
+                </p:cond>
+              </p:nextCondLst>
+            </p:seq>
+          </p:childTnLst>
+        </p:cTn>
+      </p:par>
+    </p:tnLst>
+    <p:bldLst>
+      <p:bldP spid="10" grpId="0"/>
+    </p:bldLst>
+  </p:timing>
+</p:sld>
+</file>
+
+<file path=ppt/slides/slide29.xml><?xml version="1.0" encoding="utf-8"?>
+<p:sld xmlns:a="http://schemas.openxmlformats.org/drawingml/2006/main" xmlns:r="http://schemas.openxmlformats.org/officeDocument/2006/relationships" xmlns:p="http://schemas.openxmlformats.org/presentationml/2006/main">
+  <p:cSld>
+    <p:spTree>
+      <p:nvGrpSpPr>
+        <p:cNvPr id="1" name=""/>
+        <p:cNvGrpSpPr/>
+        <p:nvPr/>
+      </p:nvGrpSpPr>
+      <p:grpSpPr>
+        <a:xfrm>
+          <a:off x="0" y="0"/>
+          <a:ext cx="0" cy="0"/>
+          <a:chOff x="0" y="0"/>
+          <a:chExt cx="0" cy="0"/>
+        </a:xfrm>
+      </p:grpSpPr>
+      <p:sp>
+        <p:nvSpPr>
+          <p:cNvPr id="3" name="Content Placeholder 2"/>
+          <p:cNvSpPr>
+            <a:spLocks noGrp="1"/>
+          </p:cNvSpPr>
+          <p:nvPr>
+            <p:ph idx="1"/>
+          </p:nvPr>
+        </p:nvSpPr>
+        <p:spPr>
+          <a:xfrm>
+            <a:off x="0" y="2908663"/>
+            <a:ext cx="12191999" cy="679269"/>
+          </a:xfrm>
+        </p:spPr>
+        <p:txBody>
+          <a:bodyPr>
+            <a:noAutofit/>
+          </a:bodyPr>
+          <a:lstStyle/>
+          <a:p>
+            <a:pPr marL="0" indent="0" algn="ctr">
+              <a:buNone/>
+            </a:pPr>
+            <a:r>
+              <a:rPr lang="en-US" sz="4400" dirty="0" smtClean="0"/>
+              <a:t>Questions ?</a:t>
+            </a:r>
+            <a:endParaRPr lang="en-US" sz="4400" dirty="0"/>
+          </a:p>
+        </p:txBody>
+      </p:sp>
+    </p:spTree>
+    <p:extLst>
+      <p:ext uri="{BB962C8B-B14F-4D97-AF65-F5344CB8AC3E}">
+        <p14:creationId xmlns:p14="http://schemas.microsoft.com/office/powerpoint/2010/main" val="2656763244"/>
+      </p:ext>
+    </p:extLst>
+  </p:cSld>
+  <p:clrMapOvr>
+    <a:masterClrMapping/>
+  </p:clrMapOvr>
+  <p:timing>
+    <p:tnLst>
+      <p:par>
+        <p:cTn id="1" dur="indefinite" restart="never" nodeType="tmRoot"/>
+      </p:par>
+    </p:tnLst>
+  </p:timing>
 </p:sld>
 </file>
 

</xml_diff>